<commit_message>
a fuck ton of shit
</commit_message>
<xml_diff>
--- a/VietnamecSimulator.pptx
+++ b/VietnamecSimulator.pptx
@@ -9,6 +9,9 @@
     <p:sldId id="258" r:id="rId3"/>
     <p:sldId id="257" r:id="rId4"/>
     <p:sldId id="259" r:id="rId5"/>
+    <p:sldId id="260" r:id="rId6"/>
+    <p:sldId id="261" r:id="rId7"/>
+    <p:sldId id="262" r:id="rId8"/>
   </p:sldIdLst>
   <p:sldSz cx="12192000" cy="6858000"/>
   <p:notesSz cx="6858000" cy="9144000"/>
@@ -264,7 +267,7 @@
           <a:p>
             <a:fld id="{BA5FE871-04E0-5340-A77A-88A0D6B20BA6}" type="datetimeFigureOut">
               <a:rPr lang="en-CZ" smtClean="0"/>
-              <a:t>16.01.2025</a:t>
+              <a:t>01/16/2025</a:t>
             </a:fld>
             <a:endParaRPr lang="en-CZ"/>
           </a:p>
@@ -464,7 +467,7 @@
           <a:p>
             <a:fld id="{BA5FE871-04E0-5340-A77A-88A0D6B20BA6}" type="datetimeFigureOut">
               <a:rPr lang="en-CZ" smtClean="0"/>
-              <a:t>16.01.2025</a:t>
+              <a:t>01/16/2025</a:t>
             </a:fld>
             <a:endParaRPr lang="en-CZ"/>
           </a:p>
@@ -674,7 +677,7 @@
           <a:p>
             <a:fld id="{BA5FE871-04E0-5340-A77A-88A0D6B20BA6}" type="datetimeFigureOut">
               <a:rPr lang="en-CZ" smtClean="0"/>
-              <a:t>16.01.2025</a:t>
+              <a:t>01/16/2025</a:t>
             </a:fld>
             <a:endParaRPr lang="en-CZ"/>
           </a:p>
@@ -874,7 +877,7 @@
           <a:p>
             <a:fld id="{BA5FE871-04E0-5340-A77A-88A0D6B20BA6}" type="datetimeFigureOut">
               <a:rPr lang="en-CZ" smtClean="0"/>
-              <a:t>16.01.2025</a:t>
+              <a:t>01/16/2025</a:t>
             </a:fld>
             <a:endParaRPr lang="en-CZ"/>
           </a:p>
@@ -1150,7 +1153,7 @@
           <a:p>
             <a:fld id="{BA5FE871-04E0-5340-A77A-88A0D6B20BA6}" type="datetimeFigureOut">
               <a:rPr lang="en-CZ" smtClean="0"/>
-              <a:t>16.01.2025</a:t>
+              <a:t>01/16/2025</a:t>
             </a:fld>
             <a:endParaRPr lang="en-CZ"/>
           </a:p>
@@ -1418,7 +1421,7 @@
           <a:p>
             <a:fld id="{BA5FE871-04E0-5340-A77A-88A0D6B20BA6}" type="datetimeFigureOut">
               <a:rPr lang="en-CZ" smtClean="0"/>
-              <a:t>16.01.2025</a:t>
+              <a:t>01/16/2025</a:t>
             </a:fld>
             <a:endParaRPr lang="en-CZ"/>
           </a:p>
@@ -1833,7 +1836,7 @@
           <a:p>
             <a:fld id="{BA5FE871-04E0-5340-A77A-88A0D6B20BA6}" type="datetimeFigureOut">
               <a:rPr lang="en-CZ" smtClean="0"/>
-              <a:t>16.01.2025</a:t>
+              <a:t>01/16/2025</a:t>
             </a:fld>
             <a:endParaRPr lang="en-CZ"/>
           </a:p>
@@ -1975,7 +1978,7 @@
           <a:p>
             <a:fld id="{BA5FE871-04E0-5340-A77A-88A0D6B20BA6}" type="datetimeFigureOut">
               <a:rPr lang="en-CZ" smtClean="0"/>
-              <a:t>16.01.2025</a:t>
+              <a:t>01/16/2025</a:t>
             </a:fld>
             <a:endParaRPr lang="en-CZ"/>
           </a:p>
@@ -2088,7 +2091,7 @@
           <a:p>
             <a:fld id="{BA5FE871-04E0-5340-A77A-88A0D6B20BA6}" type="datetimeFigureOut">
               <a:rPr lang="en-CZ" smtClean="0"/>
-              <a:t>16.01.2025</a:t>
+              <a:t>01/16/2025</a:t>
             </a:fld>
             <a:endParaRPr lang="en-CZ"/>
           </a:p>
@@ -2401,7 +2404,7 @@
           <a:p>
             <a:fld id="{BA5FE871-04E0-5340-A77A-88A0D6B20BA6}" type="datetimeFigureOut">
               <a:rPr lang="en-CZ" smtClean="0"/>
-              <a:t>16.01.2025</a:t>
+              <a:t>01/16/2025</a:t>
             </a:fld>
             <a:endParaRPr lang="en-CZ"/>
           </a:p>
@@ -2690,7 +2693,7 @@
           <a:p>
             <a:fld id="{BA5FE871-04E0-5340-A77A-88A0D6B20BA6}" type="datetimeFigureOut">
               <a:rPr lang="en-CZ" smtClean="0"/>
-              <a:t>16.01.2025</a:t>
+              <a:t>01/16/2025</a:t>
             </a:fld>
             <a:endParaRPr lang="en-CZ"/>
           </a:p>
@@ -2933,7 +2936,7 @@
           <a:p>
             <a:fld id="{BA5FE871-04E0-5340-A77A-88A0D6B20BA6}" type="datetimeFigureOut">
               <a:rPr lang="en-CZ" smtClean="0"/>
-              <a:t>16.01.2025</a:t>
+              <a:t>01/16/2025</a:t>
             </a:fld>
             <a:endParaRPr lang="en-CZ"/>
           </a:p>
@@ -5373,10 +5376,10 @@
       </p:grpSpPr>
       <p:sp useBgFill="1">
         <p:nvSpPr>
-          <p:cNvPr id="13" name="Rectangle 12">
-            <a:extLst>
-              <a:ext uri="{FF2B5EF4-FFF2-40B4-BE49-F238E27FC236}">
-                <a16:creationId xmlns:a16="http://schemas.microsoft.com/office/drawing/2014/main" id="{C9A36457-A5F4-4103-A443-02581C09185B}"/>
+          <p:cNvPr id="29" name="Rectangle 18">
+            <a:extLst>
+              <a:ext uri="{FF2B5EF4-FFF2-40B4-BE49-F238E27FC236}">
+                <a16:creationId xmlns:a16="http://schemas.microsoft.com/office/drawing/2014/main" id="{934F1179-B481-4F9E-BCA3-AFB972070F83}"/>
               </a:ext>
               <a:ext uri="{C183D7F6-B498-43B3-948B-1728B52AA6E4}">
                 <adec:decorative xmlns:adec="http://schemas.microsoft.com/office/drawing/2017/decorative" val="1"/>
@@ -5402,25 +5405,9 @@
           <a:prstGeom prst="rect">
             <a:avLst/>
           </a:prstGeom>
-          <a:ln w="12700" cap="flat" cmpd="sng" algn="ctr">
+          <a:ln>
             <a:noFill/>
-            <a:prstDash val="solid"/>
-            <a:miter lim="800000"/>
           </a:ln>
-          <a:effectLst/>
-          <a:extLst>
-            <a:ext uri="{91240B29-F687-4F45-9708-019B960494DF}">
-              <a14:hiddenLine xmlns:a14="http://schemas.microsoft.com/office/drawing/2010/main" w="12700" cap="flat" cmpd="sng" algn="ctr">
-                <a:solidFill>
-                  <a:schemeClr val="accent1">
-                    <a:shade val="50000"/>
-                  </a:schemeClr>
-                </a:solidFill>
-                <a:prstDash val="solid"/>
-                <a:miter lim="800000"/>
-              </a14:hiddenLine>
-            </a:ext>
-          </a:extLst>
         </p:spPr>
         <p:style>
           <a:lnRef idx="2">
@@ -5449,10 +5436,10 @@
       </p:sp>
       <p:sp>
         <p:nvSpPr>
-          <p:cNvPr id="14" name="Freeform: Shape 9">
-            <a:extLst>
-              <a:ext uri="{FF2B5EF4-FFF2-40B4-BE49-F238E27FC236}">
-                <a16:creationId xmlns:a16="http://schemas.microsoft.com/office/drawing/2014/main" id="{DC5FB7E8-B636-40FA-BE8D-48145C0F5C57}"/>
+          <p:cNvPr id="30" name="Right Triangle 20">
+            <a:extLst>
+              <a:ext uri="{FF2B5EF4-FFF2-40B4-BE49-F238E27FC236}">
+                <a16:creationId xmlns:a16="http://schemas.microsoft.com/office/drawing/2014/main" id="{827DC2C4-B485-428A-BF4A-472D2967F47F}"/>
               </a:ext>
               <a:ext uri="{C183D7F6-B498-43B3-948B-1728B52AA6E4}">
                 <adec:decorative xmlns:adec="http://schemas.microsoft.com/office/drawing/2017/decorative" val="1"/>
@@ -5471,2301 +5458,15 @@
           </p:nvPr>
         </p:nvSpPr>
         <p:spPr>
-          <a:xfrm>
-            <a:off x="0" y="4"/>
-            <a:ext cx="12192000" cy="2295238"/>
+          <a:xfrm flipH="1">
+            <a:off x="8576720" y="3335867"/>
+            <a:ext cx="3291840" cy="3200400"/>
           </a:xfrm>
-          <a:custGeom>
+          <a:prstGeom prst="rtTriangle">
             <a:avLst/>
-            <a:gdLst>
-              <a:gd name="connsiteX0" fmla="*/ 12160143 w 12192000"/>
-              <a:gd name="connsiteY0" fmla="*/ 831692 h 2079137"/>
-              <a:gd name="connsiteX1" fmla="*/ 12159112 w 12192000"/>
-              <a:gd name="connsiteY1" fmla="*/ 833361 h 2079137"/>
-              <a:gd name="connsiteX2" fmla="*/ 12158912 w 12192000"/>
-              <a:gd name="connsiteY2" fmla="*/ 832430 h 2079137"/>
-              <a:gd name="connsiteX3" fmla="*/ 0 w 12192000"/>
-              <a:gd name="connsiteY3" fmla="*/ 0 h 2079137"/>
-              <a:gd name="connsiteX4" fmla="*/ 12192000 w 12192000"/>
-              <a:gd name="connsiteY4" fmla="*/ 0 h 2079137"/>
-              <a:gd name="connsiteX5" fmla="*/ 12192000 w 12192000"/>
-              <a:gd name="connsiteY5" fmla="*/ 558063 h 2079137"/>
-              <a:gd name="connsiteX6" fmla="*/ 12189259 w 12192000"/>
-              <a:gd name="connsiteY6" fmla="*/ 810508 h 2079137"/>
-              <a:gd name="connsiteX7" fmla="*/ 12170847 w 12192000"/>
-              <a:gd name="connsiteY7" fmla="*/ 825280 h 2079137"/>
-              <a:gd name="connsiteX8" fmla="*/ 12160143 w 12192000"/>
-              <a:gd name="connsiteY8" fmla="*/ 831692 h 2079137"/>
-              <a:gd name="connsiteX9" fmla="*/ 12163806 w 12192000"/>
-              <a:gd name="connsiteY9" fmla="*/ 825759 h 2079137"/>
-              <a:gd name="connsiteX10" fmla="*/ 12056557 w 12192000"/>
-              <a:gd name="connsiteY10" fmla="*/ 810176 h 2079137"/>
-              <a:gd name="connsiteX11" fmla="*/ 11900316 w 12192000"/>
-              <a:gd name="connsiteY11" fmla="*/ 789618 h 2079137"/>
-              <a:gd name="connsiteX12" fmla="*/ 11791206 w 12192000"/>
-              <a:gd name="connsiteY12" fmla="*/ 824176 h 2079137"/>
-              <a:gd name="connsiteX13" fmla="*/ 11659257 w 12192000"/>
-              <a:gd name="connsiteY13" fmla="*/ 800841 h 2079137"/>
-              <a:gd name="connsiteX14" fmla="*/ 11569789 w 12192000"/>
-              <a:gd name="connsiteY14" fmla="*/ 797135 h 2079137"/>
-              <a:gd name="connsiteX15" fmla="*/ 11367885 w 12192000"/>
-              <a:gd name="connsiteY15" fmla="*/ 791985 h 2079137"/>
-              <a:gd name="connsiteX16" fmla="*/ 11174663 w 12192000"/>
-              <a:gd name="connsiteY16" fmla="*/ 788721 h 2079137"/>
-              <a:gd name="connsiteX17" fmla="*/ 11068220 w 12192000"/>
-              <a:gd name="connsiteY17" fmla="*/ 786994 h 2079137"/>
-              <a:gd name="connsiteX18" fmla="*/ 10893266 w 12192000"/>
-              <a:gd name="connsiteY18" fmla="*/ 794013 h 2079137"/>
-              <a:gd name="connsiteX19" fmla="*/ 10844025 w 12192000"/>
-              <a:gd name="connsiteY19" fmla="*/ 789857 h 2079137"/>
-              <a:gd name="connsiteX20" fmla="*/ 10814353 w 12192000"/>
-              <a:gd name="connsiteY20" fmla="*/ 789010 h 2079137"/>
-              <a:gd name="connsiteX21" fmla="*/ 10748393 w 12192000"/>
-              <a:gd name="connsiteY21" fmla="*/ 806738 h 2079137"/>
-              <a:gd name="connsiteX22" fmla="*/ 10468256 w 12192000"/>
-              <a:gd name="connsiteY22" fmla="*/ 778733 h 2079137"/>
-              <a:gd name="connsiteX23" fmla="*/ 10256131 w 12192000"/>
-              <a:gd name="connsiteY23" fmla="*/ 788332 h 2079137"/>
-              <a:gd name="connsiteX24" fmla="*/ 10177442 w 12192000"/>
-              <a:gd name="connsiteY24" fmla="*/ 777371 h 2079137"/>
-              <a:gd name="connsiteX25" fmla="*/ 10006086 w 12192000"/>
-              <a:gd name="connsiteY25" fmla="*/ 792651 h 2079137"/>
-              <a:gd name="connsiteX26" fmla="*/ 9952382 w 12192000"/>
-              <a:gd name="connsiteY26" fmla="*/ 815411 h 2079137"/>
-              <a:gd name="connsiteX27" fmla="*/ 9926457 w 12192000"/>
-              <a:gd name="connsiteY27" fmla="*/ 827295 h 2079137"/>
-              <a:gd name="connsiteX28" fmla="*/ 9843405 w 12192000"/>
-              <a:gd name="connsiteY28" fmla="*/ 867046 h 2079137"/>
-              <a:gd name="connsiteX29" fmla="*/ 9830866 w 12192000"/>
-              <a:gd name="connsiteY29" fmla="*/ 875047 h 2079137"/>
-              <a:gd name="connsiteX30" fmla="*/ 9801807 w 12192000"/>
-              <a:gd name="connsiteY30" fmla="*/ 872272 h 2079137"/>
-              <a:gd name="connsiteX31" fmla="*/ 9785653 w 12192000"/>
-              <a:gd name="connsiteY31" fmla="*/ 861743 h 2079137"/>
-              <a:gd name="connsiteX32" fmla="*/ 9781177 w 12192000"/>
-              <a:gd name="connsiteY32" fmla="*/ 864820 h 2079137"/>
-              <a:gd name="connsiteX33" fmla="*/ 9768640 w 12192000"/>
-              <a:gd name="connsiteY33" fmla="*/ 869379 h 2079137"/>
-              <a:gd name="connsiteX34" fmla="*/ 9712211 w 12192000"/>
-              <a:gd name="connsiteY34" fmla="*/ 900283 h 2079137"/>
-              <a:gd name="connsiteX35" fmla="*/ 9689465 w 12192000"/>
-              <a:gd name="connsiteY35" fmla="*/ 899268 h 2079137"/>
-              <a:gd name="connsiteX36" fmla="*/ 9600339 w 12192000"/>
-              <a:gd name="connsiteY36" fmla="*/ 922112 h 2079137"/>
-              <a:gd name="connsiteX37" fmla="*/ 9582850 w 12192000"/>
-              <a:gd name="connsiteY37" fmla="*/ 925510 h 2079137"/>
-              <a:gd name="connsiteX38" fmla="*/ 9549638 w 12192000"/>
-              <a:gd name="connsiteY38" fmla="*/ 940845 h 2079137"/>
-              <a:gd name="connsiteX39" fmla="*/ 9539471 w 12192000"/>
-              <a:gd name="connsiteY39" fmla="*/ 941799 h 2079137"/>
-              <a:gd name="connsiteX40" fmla="*/ 9505592 w 12192000"/>
-              <a:gd name="connsiteY40" fmla="*/ 955533 h 2079137"/>
-              <a:gd name="connsiteX41" fmla="*/ 9432569 w 12192000"/>
-              <a:gd name="connsiteY41" fmla="*/ 985377 h 2079137"/>
-              <a:gd name="connsiteX42" fmla="*/ 9414216 w 12192000"/>
-              <a:gd name="connsiteY42" fmla="*/ 992655 h 2079137"/>
-              <a:gd name="connsiteX43" fmla="*/ 9397106 w 12192000"/>
-              <a:gd name="connsiteY43" fmla="*/ 992980 h 2079137"/>
-              <a:gd name="connsiteX44" fmla="*/ 9305108 w 12192000"/>
-              <a:gd name="connsiteY44" fmla="*/ 1007767 h 2079137"/>
-              <a:gd name="connsiteX45" fmla="*/ 9282434 w 12192000"/>
-              <a:gd name="connsiteY45" fmla="*/ 1007523 h 2079137"/>
-              <a:gd name="connsiteX46" fmla="*/ 9271941 w 12192000"/>
-              <a:gd name="connsiteY46" fmla="*/ 1002839 h 2079137"/>
-              <a:gd name="connsiteX47" fmla="*/ 9238227 w 12192000"/>
-              <a:gd name="connsiteY47" fmla="*/ 1017668 h 2079137"/>
-              <a:gd name="connsiteX48" fmla="*/ 9184265 w 12192000"/>
-              <a:gd name="connsiteY48" fmla="*/ 1031275 h 2079137"/>
-              <a:gd name="connsiteX49" fmla="*/ 9159000 w 12192000"/>
-              <a:gd name="connsiteY49" fmla="*/ 1039569 h 2079137"/>
-              <a:gd name="connsiteX50" fmla="*/ 9137031 w 12192000"/>
-              <a:gd name="connsiteY50" fmla="*/ 1038699 h 2079137"/>
-              <a:gd name="connsiteX51" fmla="*/ 9015702 w 12192000"/>
-              <a:gd name="connsiteY51" fmla="*/ 1051400 h 2079137"/>
-              <a:gd name="connsiteX52" fmla="*/ 8971403 w 12192000"/>
-              <a:gd name="connsiteY52" fmla="*/ 1040542 h 2079137"/>
-              <a:gd name="connsiteX53" fmla="*/ 8961826 w 12192000"/>
-              <a:gd name="connsiteY53" fmla="*/ 1045364 h 2079137"/>
-              <a:gd name="connsiteX54" fmla="*/ 8888623 w 12192000"/>
-              <a:gd name="connsiteY54" fmla="*/ 1053908 h 2079137"/>
-              <a:gd name="connsiteX55" fmla="*/ 8841066 w 12192000"/>
-              <a:gd name="connsiteY55" fmla="*/ 1060421 h 2079137"/>
-              <a:gd name="connsiteX56" fmla="*/ 8752342 w 12192000"/>
-              <a:gd name="connsiteY56" fmla="*/ 1080646 h 2079137"/>
-              <a:gd name="connsiteX57" fmla="*/ 8699139 w 12192000"/>
-              <a:gd name="connsiteY57" fmla="*/ 1087885 h 2079137"/>
-              <a:gd name="connsiteX58" fmla="*/ 8667273 w 12192000"/>
-              <a:gd name="connsiteY58" fmla="*/ 1092062 h 2079137"/>
-              <a:gd name="connsiteX59" fmla="*/ 8586064 w 12192000"/>
-              <a:gd name="connsiteY59" fmla="*/ 1114603 h 2079137"/>
-              <a:gd name="connsiteX60" fmla="*/ 8460312 w 12192000"/>
-              <a:gd name="connsiteY60" fmla="*/ 1179878 h 2079137"/>
-              <a:gd name="connsiteX61" fmla="*/ 8419023 w 12192000"/>
-              <a:gd name="connsiteY61" fmla="*/ 1191748 h 2079137"/>
-              <a:gd name="connsiteX62" fmla="*/ 8410939 w 12192000"/>
-              <a:gd name="connsiteY62" fmla="*/ 1189696 h 2079137"/>
-              <a:gd name="connsiteX63" fmla="*/ 8362040 w 12192000"/>
-              <a:gd name="connsiteY63" fmla="*/ 1220820 h 2079137"/>
-              <a:gd name="connsiteX64" fmla="*/ 8273677 w 12192000"/>
-              <a:gd name="connsiteY64" fmla="*/ 1236495 h 2079137"/>
-              <a:gd name="connsiteX65" fmla="*/ 8204283 w 12192000"/>
-              <a:gd name="connsiteY65" fmla="*/ 1243537 h 2079137"/>
-              <a:gd name="connsiteX66" fmla="*/ 8166550 w 12192000"/>
-              <a:gd name="connsiteY66" fmla="*/ 1249551 h 2079137"/>
-              <a:gd name="connsiteX67" fmla="*/ 8137785 w 12192000"/>
-              <a:gd name="connsiteY67" fmla="*/ 1251636 h 2079137"/>
-              <a:gd name="connsiteX68" fmla="*/ 8071596 w 12192000"/>
-              <a:gd name="connsiteY68" fmla="*/ 1269274 h 2079137"/>
-              <a:gd name="connsiteX69" fmla="*/ 7964816 w 12192000"/>
-              <a:gd name="connsiteY69" fmla="*/ 1303668 h 2079137"/>
-              <a:gd name="connsiteX70" fmla="*/ 7941495 w 12192000"/>
-              <a:gd name="connsiteY70" fmla="*/ 1309821 h 2079137"/>
-              <a:gd name="connsiteX71" fmla="*/ 7919123 w 12192000"/>
-              <a:gd name="connsiteY71" fmla="*/ 1310466 h 2079137"/>
-              <a:gd name="connsiteX72" fmla="*/ 7911902 w 12192000"/>
-              <a:gd name="connsiteY72" fmla="*/ 1306569 h 2079137"/>
-              <a:gd name="connsiteX73" fmla="*/ 7898703 w 12192000"/>
-              <a:gd name="connsiteY73" fmla="*/ 1309208 h 2079137"/>
-              <a:gd name="connsiteX74" fmla="*/ 7894703 w 12192000"/>
-              <a:gd name="connsiteY74" fmla="*/ 1308939 h 2079137"/>
-              <a:gd name="connsiteX75" fmla="*/ 7872267 w 12192000"/>
-              <a:gd name="connsiteY75" fmla="*/ 1308370 h 2079137"/>
-              <a:gd name="connsiteX76" fmla="*/ 7836454 w 12192000"/>
-              <a:gd name="connsiteY76" fmla="*/ 1331265 h 2079137"/>
-              <a:gd name="connsiteX77" fmla="*/ 7782451 w 12192000"/>
-              <a:gd name="connsiteY77" fmla="*/ 1339601 h 2079137"/>
-              <a:gd name="connsiteX78" fmla="*/ 7542969 w 12192000"/>
-              <a:gd name="connsiteY78" fmla="*/ 1372495 h 2079137"/>
-              <a:gd name="connsiteX79" fmla="*/ 7476832 w 12192000"/>
-              <a:gd name="connsiteY79" fmla="*/ 1431655 h 2079137"/>
-              <a:gd name="connsiteX80" fmla="*/ 7370237 w 12192000"/>
-              <a:gd name="connsiteY80" fmla="*/ 1474339 h 2079137"/>
-              <a:gd name="connsiteX81" fmla="*/ 7222223 w 12192000"/>
-              <a:gd name="connsiteY81" fmla="*/ 1510199 h 2079137"/>
-              <a:gd name="connsiteX82" fmla="*/ 7215703 w 12192000"/>
-              <a:gd name="connsiteY82" fmla="*/ 1520424 h 2079137"/>
-              <a:gd name="connsiteX83" fmla="*/ 7204548 w 12192000"/>
-              <a:gd name="connsiteY83" fmla="*/ 1528145 h 2079137"/>
-              <a:gd name="connsiteX84" fmla="*/ 7202038 w 12192000"/>
-              <a:gd name="connsiteY84" fmla="*/ 1527954 h 2079137"/>
-              <a:gd name="connsiteX85" fmla="*/ 7173860 w 12192000"/>
-              <a:gd name="connsiteY85" fmla="*/ 1541605 h 2079137"/>
-              <a:gd name="connsiteX86" fmla="*/ 7155079 w 12192000"/>
-              <a:gd name="connsiteY86" fmla="*/ 1552495 h 2079137"/>
-              <a:gd name="connsiteX87" fmla="*/ 7149757 w 12192000"/>
-              <a:gd name="connsiteY87" fmla="*/ 1552732 h 2079137"/>
-              <a:gd name="connsiteX88" fmla="*/ 7104804 w 12192000"/>
-              <a:gd name="connsiteY88" fmla="*/ 1565792 h 2079137"/>
-              <a:gd name="connsiteX89" fmla="*/ 7082824 w 12192000"/>
-              <a:gd name="connsiteY89" fmla="*/ 1567947 h 2079137"/>
-              <a:gd name="connsiteX90" fmla="*/ 7021520 w 12192000"/>
-              <a:gd name="connsiteY90" fmla="*/ 1562334 h 2079137"/>
-              <a:gd name="connsiteX91" fmla="*/ 6988956 w 12192000"/>
-              <a:gd name="connsiteY91" fmla="*/ 1576442 h 2079137"/>
-              <a:gd name="connsiteX92" fmla="*/ 6981922 w 12192000"/>
-              <a:gd name="connsiteY92" fmla="*/ 1578821 h 2079137"/>
-              <a:gd name="connsiteX93" fmla="*/ 6981583 w 12192000"/>
-              <a:gd name="connsiteY93" fmla="*/ 1578678 h 2079137"/>
-              <a:gd name="connsiteX94" fmla="*/ 6973762 w 12192000"/>
-              <a:gd name="connsiteY94" fmla="*/ 1580811 h 2079137"/>
-              <a:gd name="connsiteX95" fmla="*/ 6969093 w 12192000"/>
-              <a:gd name="connsiteY95" fmla="*/ 1583157 h 2079137"/>
-              <a:gd name="connsiteX96" fmla="*/ 6890037 w 12192000"/>
-              <a:gd name="connsiteY96" fmla="*/ 1575825 h 2079137"/>
-              <a:gd name="connsiteX97" fmla="*/ 6785054 w 12192000"/>
-              <a:gd name="connsiteY97" fmla="*/ 1582200 h 2079137"/>
-              <a:gd name="connsiteX98" fmla="*/ 6681692 w 12192000"/>
-              <a:gd name="connsiteY98" fmla="*/ 1591296 h 2079137"/>
-              <a:gd name="connsiteX99" fmla="*/ 6644556 w 12192000"/>
-              <a:gd name="connsiteY99" fmla="*/ 1595940 h 2079137"/>
-              <a:gd name="connsiteX100" fmla="*/ 6577106 w 12192000"/>
-              <a:gd name="connsiteY100" fmla="*/ 1598261 h 2079137"/>
-              <a:gd name="connsiteX101" fmla="*/ 6544183 w 12192000"/>
-              <a:gd name="connsiteY101" fmla="*/ 1596149 h 2079137"/>
-              <a:gd name="connsiteX102" fmla="*/ 6540921 w 12192000"/>
-              <a:gd name="connsiteY102" fmla="*/ 1593857 h 2079137"/>
-              <a:gd name="connsiteX103" fmla="*/ 6535046 w 12192000"/>
-              <a:gd name="connsiteY103" fmla="*/ 1593283 h 2079137"/>
-              <a:gd name="connsiteX104" fmla="*/ 6519853 w 12192000"/>
-              <a:gd name="connsiteY104" fmla="*/ 1595771 h 2079137"/>
-              <a:gd name="connsiteX105" fmla="*/ 6514280 w 12192000"/>
-              <a:gd name="connsiteY105" fmla="*/ 1597376 h 2079137"/>
-              <a:gd name="connsiteX106" fmla="*/ 6505824 w 12192000"/>
-              <a:gd name="connsiteY106" fmla="*/ 1598298 h 2079137"/>
-              <a:gd name="connsiteX107" fmla="*/ 6505573 w 12192000"/>
-              <a:gd name="connsiteY107" fmla="*/ 1598109 h 2079137"/>
-              <a:gd name="connsiteX108" fmla="*/ 6497741 w 12192000"/>
-              <a:gd name="connsiteY108" fmla="*/ 1599392 h 2079137"/>
-              <a:gd name="connsiteX109" fmla="*/ 6459992 w 12192000"/>
-              <a:gd name="connsiteY109" fmla="*/ 1608358 h 2079137"/>
-              <a:gd name="connsiteX110" fmla="*/ 6404572 w 12192000"/>
-              <a:gd name="connsiteY110" fmla="*/ 1593771 h 2079137"/>
-              <a:gd name="connsiteX111" fmla="*/ 6382671 w 12192000"/>
-              <a:gd name="connsiteY111" fmla="*/ 1592612 h 2079137"/>
-              <a:gd name="connsiteX112" fmla="*/ 6369843 w 12192000"/>
-              <a:gd name="connsiteY112" fmla="*/ 1590015 h 2079137"/>
-              <a:gd name="connsiteX113" fmla="*/ 6269740 w 12192000"/>
-              <a:gd name="connsiteY113" fmla="*/ 1614633 h 2079137"/>
-              <a:gd name="connsiteX114" fmla="*/ 6255405 w 12192000"/>
-              <a:gd name="connsiteY114" fmla="*/ 1620529 h 2079137"/>
-              <a:gd name="connsiteX115" fmla="*/ 6244248 w 12192000"/>
-              <a:gd name="connsiteY115" fmla="*/ 1629561 h 2079137"/>
-              <a:gd name="connsiteX116" fmla="*/ 6086396 w 12192000"/>
-              <a:gd name="connsiteY116" fmla="*/ 1642666 h 2079137"/>
-              <a:gd name="connsiteX117" fmla="*/ 5867429 w 12192000"/>
-              <a:gd name="connsiteY117" fmla="*/ 1695554 h 2079137"/>
-              <a:gd name="connsiteX118" fmla="*/ 5772864 w 12192000"/>
-              <a:gd name="connsiteY118" fmla="*/ 1689002 h 2079137"/>
-              <a:gd name="connsiteX119" fmla="*/ 5629833 w 12192000"/>
-              <a:gd name="connsiteY119" fmla="*/ 1713273 h 2079137"/>
-              <a:gd name="connsiteX120" fmla="*/ 5504771 w 12192000"/>
-              <a:gd name="connsiteY120" fmla="*/ 1725744 h 2079137"/>
-              <a:gd name="connsiteX121" fmla="*/ 5490967 w 12192000"/>
-              <a:gd name="connsiteY121" fmla="*/ 1726367 h 2079137"/>
-              <a:gd name="connsiteX122" fmla="*/ 5486015 w 12192000"/>
-              <a:gd name="connsiteY122" fmla="*/ 1721481 h 2079137"/>
-              <a:gd name="connsiteX123" fmla="*/ 5439364 w 12192000"/>
-              <a:gd name="connsiteY123" fmla="*/ 1721349 h 2079137"/>
-              <a:gd name="connsiteX124" fmla="*/ 5350025 w 12192000"/>
-              <a:gd name="connsiteY124" fmla="*/ 1729885 h 2079137"/>
-              <a:gd name="connsiteX125" fmla="*/ 5336104 w 12192000"/>
-              <a:gd name="connsiteY125" fmla="*/ 1734377 h 2079137"/>
-              <a:gd name="connsiteX126" fmla="*/ 5245234 w 12192000"/>
-              <a:gd name="connsiteY126" fmla="*/ 1738520 h 2079137"/>
-              <a:gd name="connsiteX127" fmla="*/ 5182955 w 12192000"/>
-              <a:gd name="connsiteY127" fmla="*/ 1744622 h 2079137"/>
-              <a:gd name="connsiteX128" fmla="*/ 5169506 w 12192000"/>
-              <a:gd name="connsiteY128" fmla="*/ 1748993 h 2079137"/>
-              <a:gd name="connsiteX129" fmla="*/ 5154299 w 12192000"/>
-              <a:gd name="connsiteY129" fmla="*/ 1744080 h 2079137"/>
-              <a:gd name="connsiteX130" fmla="*/ 5149917 w 12192000"/>
-              <a:gd name="connsiteY130" fmla="*/ 1739727 h 2079137"/>
-              <a:gd name="connsiteX131" fmla="*/ 5100319 w 12192000"/>
-              <a:gd name="connsiteY131" fmla="*/ 1745797 h 2079137"/>
-              <a:gd name="connsiteX132" fmla="*/ 5094361 w 12192000"/>
-              <a:gd name="connsiteY132" fmla="*/ 1745767 h 2079137"/>
-              <a:gd name="connsiteX133" fmla="*/ 5053410 w 12192000"/>
-              <a:gd name="connsiteY133" fmla="*/ 1742790 h 2079137"/>
-              <a:gd name="connsiteX134" fmla="*/ 4992711 w 12192000"/>
-              <a:gd name="connsiteY134" fmla="*/ 1734075 h 2079137"/>
-              <a:gd name="connsiteX135" fmla="*/ 4930098 w 12192000"/>
-              <a:gd name="connsiteY135" fmla="*/ 1717312 h 2079137"/>
-              <a:gd name="connsiteX136" fmla="*/ 4893834 w 12192000"/>
-              <a:gd name="connsiteY136" fmla="*/ 1710028 h 2079137"/>
-              <a:gd name="connsiteX137" fmla="*/ 4868730 w 12192000"/>
-              <a:gd name="connsiteY137" fmla="*/ 1702384 h 2079137"/>
-              <a:gd name="connsiteX138" fmla="*/ 4797925 w 12192000"/>
-              <a:gd name="connsiteY138" fmla="*/ 1695535 h 2079137"/>
-              <a:gd name="connsiteX139" fmla="*/ 4677670 w 12192000"/>
-              <a:gd name="connsiteY139" fmla="*/ 1689453 h 2079137"/>
-              <a:gd name="connsiteX140" fmla="*/ 4634248 w 12192000"/>
-              <a:gd name="connsiteY140" fmla="*/ 1680227 h 2079137"/>
-              <a:gd name="connsiteX141" fmla="*/ 4632434 w 12192000"/>
-              <a:gd name="connsiteY141" fmla="*/ 1674607 h 2079137"/>
-              <a:gd name="connsiteX142" fmla="*/ 4619204 w 12192000"/>
-              <a:gd name="connsiteY142" fmla="*/ 1672507 h 2079137"/>
-              <a:gd name="connsiteX143" fmla="*/ 4616283 w 12192000"/>
-              <a:gd name="connsiteY143" fmla="*/ 1670977 h 2079137"/>
-              <a:gd name="connsiteX144" fmla="*/ 4598926 w 12192000"/>
-              <a:gd name="connsiteY144" fmla="*/ 1663178 h 2079137"/>
-              <a:gd name="connsiteX145" fmla="*/ 4547069 w 12192000"/>
-              <a:gd name="connsiteY145" fmla="*/ 1670642 h 2079137"/>
-              <a:gd name="connsiteX146" fmla="*/ 4523516 w 12192000"/>
-              <a:gd name="connsiteY146" fmla="*/ 1669785 h 2079137"/>
-              <a:gd name="connsiteX147" fmla="*/ 4500586 w 12192000"/>
-              <a:gd name="connsiteY147" fmla="*/ 1675912 h 2079137"/>
-              <a:gd name="connsiteX148" fmla="*/ 4488196 w 12192000"/>
-              <a:gd name="connsiteY148" fmla="*/ 1683463 h 2079137"/>
-              <a:gd name="connsiteX149" fmla="*/ 4445463 w 12192000"/>
-              <a:gd name="connsiteY149" fmla="*/ 1695634 h 2079137"/>
-              <a:gd name="connsiteX150" fmla="*/ 4446550 w 12192000"/>
-              <a:gd name="connsiteY150" fmla="*/ 1680538 h 2079137"/>
-              <a:gd name="connsiteX151" fmla="*/ 4365375 w 12192000"/>
-              <a:gd name="connsiteY151" fmla="*/ 1697935 h 2079137"/>
-              <a:gd name="connsiteX152" fmla="*/ 4305123 w 12192000"/>
-              <a:gd name="connsiteY152" fmla="*/ 1714185 h 2079137"/>
-              <a:gd name="connsiteX153" fmla="*/ 4292665 w 12192000"/>
-              <a:gd name="connsiteY153" fmla="*/ 1720703 h 2079137"/>
-              <a:gd name="connsiteX154" fmla="*/ 4276789 w 12192000"/>
-              <a:gd name="connsiteY154" fmla="*/ 1718367 h 2079137"/>
-              <a:gd name="connsiteX155" fmla="*/ 4271683 w 12192000"/>
-              <a:gd name="connsiteY155" fmla="*/ 1714801 h 2079137"/>
-              <a:gd name="connsiteX156" fmla="*/ 4223918 w 12192000"/>
-              <a:gd name="connsiteY156" fmla="*/ 1728936 h 2079137"/>
-              <a:gd name="connsiteX157" fmla="*/ 4218039 w 12192000"/>
-              <a:gd name="connsiteY157" fmla="*/ 1729885 h 2079137"/>
-              <a:gd name="connsiteX158" fmla="*/ 4177153 w 12192000"/>
-              <a:gd name="connsiteY158" fmla="*/ 1733691 h 2079137"/>
-              <a:gd name="connsiteX159" fmla="*/ 4051032 w 12192000"/>
-              <a:gd name="connsiteY159" fmla="*/ 1728886 h 2079137"/>
-              <a:gd name="connsiteX160" fmla="*/ 4013978 w 12192000"/>
-              <a:gd name="connsiteY160" fmla="*/ 1727679 h 2079137"/>
-              <a:gd name="connsiteX161" fmla="*/ 3987857 w 12192000"/>
-              <a:gd name="connsiteY161" fmla="*/ 1724282 h 2079137"/>
-              <a:gd name="connsiteX162" fmla="*/ 3916852 w 12192000"/>
-              <a:gd name="connsiteY162" fmla="*/ 1729184 h 2079137"/>
-              <a:gd name="connsiteX163" fmla="*/ 3797263 w 12192000"/>
-              <a:gd name="connsiteY163" fmla="*/ 1742976 h 2079137"/>
-              <a:gd name="connsiteX164" fmla="*/ 3752806 w 12192000"/>
-              <a:gd name="connsiteY164" fmla="*/ 1741033 h 2079137"/>
-              <a:gd name="connsiteX165" fmla="*/ 3749997 w 12192000"/>
-              <a:gd name="connsiteY165" fmla="*/ 1735799 h 2079137"/>
-              <a:gd name="connsiteX166" fmla="*/ 3736582 w 12192000"/>
-              <a:gd name="connsiteY166" fmla="*/ 1735907 h 2079137"/>
-              <a:gd name="connsiteX167" fmla="*/ 3733428 w 12192000"/>
-              <a:gd name="connsiteY167" fmla="*/ 1734881 h 2079137"/>
-              <a:gd name="connsiteX168" fmla="*/ 3714911 w 12192000"/>
-              <a:gd name="connsiteY168" fmla="*/ 1730056 h 2079137"/>
-              <a:gd name="connsiteX169" fmla="*/ 3665172 w 12192000"/>
-              <a:gd name="connsiteY169" fmla="*/ 1745936 h 2079137"/>
-              <a:gd name="connsiteX170" fmla="*/ 3552006 w 12192000"/>
-              <a:gd name="connsiteY170" fmla="*/ 1755220 h 2079137"/>
-              <a:gd name="connsiteX171" fmla="*/ 3390301 w 12192000"/>
-              <a:gd name="connsiteY171" fmla="*/ 1762546 h 2079137"/>
-              <a:gd name="connsiteX172" fmla="*/ 3264312 w 12192000"/>
-              <a:gd name="connsiteY172" fmla="*/ 1774620 h 2079137"/>
-              <a:gd name="connsiteX173" fmla="*/ 3106901 w 12192000"/>
-              <a:gd name="connsiteY173" fmla="*/ 1804264 h 2079137"/>
-              <a:gd name="connsiteX174" fmla="*/ 2993303 w 12192000"/>
-              <a:gd name="connsiteY174" fmla="*/ 1806542 h 2079137"/>
-              <a:gd name="connsiteX175" fmla="*/ 2979115 w 12192000"/>
-              <a:gd name="connsiteY175" fmla="*/ 1815432 h 2079137"/>
-              <a:gd name="connsiteX176" fmla="*/ 2963118 w 12192000"/>
-              <a:gd name="connsiteY176" fmla="*/ 1820962 h 2079137"/>
-              <a:gd name="connsiteX177" fmla="*/ 2961156 w 12192000"/>
-              <a:gd name="connsiteY177" fmla="*/ 1820297 h 2079137"/>
-              <a:gd name="connsiteX178" fmla="*/ 2925719 w 12192000"/>
-              <a:gd name="connsiteY178" fmla="*/ 1828468 h 2079137"/>
-              <a:gd name="connsiteX179" fmla="*/ 2857951 w 12192000"/>
-              <a:gd name="connsiteY179" fmla="*/ 1842496 h 2079137"/>
-              <a:gd name="connsiteX180" fmla="*/ 2857427 w 12192000"/>
-              <a:gd name="connsiteY180" fmla="*/ 1841591 h 2079137"/>
-              <a:gd name="connsiteX181" fmla="*/ 2846731 w 12192000"/>
-              <a:gd name="connsiteY181" fmla="*/ 1839316 h 2079137"/>
-              <a:gd name="connsiteX182" fmla="*/ 2826290 w 12192000"/>
-              <a:gd name="connsiteY182" fmla="*/ 1837274 h 2079137"/>
-              <a:gd name="connsiteX183" fmla="*/ 2779146 w 12192000"/>
-              <a:gd name="connsiteY183" fmla="*/ 1820071 h 2079137"/>
-              <a:gd name="connsiteX184" fmla="*/ 2739608 w 12192000"/>
-              <a:gd name="connsiteY184" fmla="*/ 1827861 h 2079137"/>
-              <a:gd name="connsiteX185" fmla="*/ 2731631 w 12192000"/>
-              <a:gd name="connsiteY185" fmla="*/ 1828881 h 2079137"/>
-              <a:gd name="connsiteX186" fmla="*/ 2731464 w 12192000"/>
-              <a:gd name="connsiteY186" fmla="*/ 1828677 h 2079137"/>
-              <a:gd name="connsiteX187" fmla="*/ 2723037 w 12192000"/>
-              <a:gd name="connsiteY187" fmla="*/ 1829303 h 2079137"/>
-              <a:gd name="connsiteX188" fmla="*/ 2701616 w 12192000"/>
-              <a:gd name="connsiteY188" fmla="*/ 1832725 h 2079137"/>
-              <a:gd name="connsiteX189" fmla="*/ 2696239 w 12192000"/>
-              <a:gd name="connsiteY189" fmla="*/ 1831904 h 2079137"/>
-              <a:gd name="connsiteX190" fmla="*/ 2663445 w 12192000"/>
-              <a:gd name="connsiteY190" fmla="*/ 1825958 h 2079137"/>
-              <a:gd name="connsiteX191" fmla="*/ 2560925 w 12192000"/>
-              <a:gd name="connsiteY191" fmla="*/ 1829094 h 2079137"/>
-              <a:gd name="connsiteX192" fmla="*/ 2458739 w 12192000"/>
-              <a:gd name="connsiteY192" fmla="*/ 1834479 h 2079137"/>
-              <a:gd name="connsiteX193" fmla="*/ 2356074 w 12192000"/>
-              <a:gd name="connsiteY193" fmla="*/ 1836991 h 2079137"/>
-              <a:gd name="connsiteX194" fmla="*/ 2304241 w 12192000"/>
-              <a:gd name="connsiteY194" fmla="*/ 1822021 h 2079137"/>
-              <a:gd name="connsiteX195" fmla="*/ 2298362 w 12192000"/>
-              <a:gd name="connsiteY195" fmla="*/ 1822125 h 2079137"/>
-              <a:gd name="connsiteX196" fmla="*/ 2283527 w 12192000"/>
-              <a:gd name="connsiteY196" fmla="*/ 1826361 h 2079137"/>
-              <a:gd name="connsiteX197" fmla="*/ 2278150 w 12192000"/>
-              <a:gd name="connsiteY197" fmla="*/ 1828604 h 2079137"/>
-              <a:gd name="connsiteX198" fmla="*/ 2269853 w 12192000"/>
-              <a:gd name="connsiteY198" fmla="*/ 1830502 h 2079137"/>
-              <a:gd name="connsiteX199" fmla="*/ 2269585 w 12192000"/>
-              <a:gd name="connsiteY199" fmla="*/ 1830341 h 2079137"/>
-              <a:gd name="connsiteX200" fmla="*/ 2225332 w 12192000"/>
-              <a:gd name="connsiteY200" fmla="*/ 1845825 h 2079137"/>
-              <a:gd name="connsiteX201" fmla="*/ 2169048 w 12192000"/>
-              <a:gd name="connsiteY201" fmla="*/ 1837658 h 2079137"/>
-              <a:gd name="connsiteX202" fmla="*/ 2147231 w 12192000"/>
-              <a:gd name="connsiteY202" fmla="*/ 1839027 h 2079137"/>
-              <a:gd name="connsiteX203" fmla="*/ 2135241 w 12192000"/>
-              <a:gd name="connsiteY203" fmla="*/ 1838652 h 2079137"/>
-              <a:gd name="connsiteX204" fmla="*/ 2099215 w 12192000"/>
-              <a:gd name="connsiteY204" fmla="*/ 1850768 h 2079137"/>
-              <a:gd name="connsiteX205" fmla="*/ 2094046 w 12192000"/>
-              <a:gd name="connsiteY205" fmla="*/ 1850806 h 2079137"/>
-              <a:gd name="connsiteX206" fmla="*/ 2071850 w 12192000"/>
-              <a:gd name="connsiteY206" fmla="*/ 1861319 h 2079137"/>
-              <a:gd name="connsiteX207" fmla="*/ 2039607 w 12192000"/>
-              <a:gd name="connsiteY207" fmla="*/ 1874318 h 2079137"/>
-              <a:gd name="connsiteX208" fmla="*/ 2037289 w 12192000"/>
-              <a:gd name="connsiteY208" fmla="*/ 1874025 h 2079137"/>
-              <a:gd name="connsiteX209" fmla="*/ 2023615 w 12192000"/>
-              <a:gd name="connsiteY209" fmla="*/ 1881562 h 2079137"/>
-              <a:gd name="connsiteX210" fmla="*/ 1957176 w 12192000"/>
-              <a:gd name="connsiteY210" fmla="*/ 1898709 h 2079137"/>
-              <a:gd name="connsiteX211" fmla="*/ 1858081 w 12192000"/>
-              <a:gd name="connsiteY211" fmla="*/ 1923144 h 2079137"/>
-              <a:gd name="connsiteX212" fmla="*/ 1738865 w 12192000"/>
-              <a:gd name="connsiteY212" fmla="*/ 1944965 h 2079137"/>
-              <a:gd name="connsiteX213" fmla="*/ 1616692 w 12192000"/>
-              <a:gd name="connsiteY213" fmla="*/ 1989107 h 2079137"/>
-              <a:gd name="connsiteX214" fmla="*/ 1411898 w 12192000"/>
-              <a:gd name="connsiteY214" fmla="*/ 2046254 h 2079137"/>
-              <a:gd name="connsiteX215" fmla="*/ 1375780 w 12192000"/>
-              <a:gd name="connsiteY215" fmla="*/ 2047961 h 2079137"/>
-              <a:gd name="connsiteX216" fmla="*/ 1375707 w 12192000"/>
-              <a:gd name="connsiteY216" fmla="*/ 2047981 h 2079137"/>
-              <a:gd name="connsiteX217" fmla="*/ 1285585 w 12192000"/>
-              <a:gd name="connsiteY217" fmla="*/ 2047113 h 2079137"/>
-              <a:gd name="connsiteX218" fmla="*/ 1263658 w 12192000"/>
-              <a:gd name="connsiteY218" fmla="*/ 2041397 h 2079137"/>
-              <a:gd name="connsiteX219" fmla="*/ 1170403 w 12192000"/>
-              <a:gd name="connsiteY219" fmla="*/ 2033399 h 2079137"/>
-              <a:gd name="connsiteX220" fmla="*/ 1153718 w 12192000"/>
-              <a:gd name="connsiteY220" fmla="*/ 2029576 h 2079137"/>
-              <a:gd name="connsiteX221" fmla="*/ 1133937 w 12192000"/>
-              <a:gd name="connsiteY221" fmla="*/ 2032149 h 2079137"/>
-              <a:gd name="connsiteX222" fmla="*/ 1054999 w 12192000"/>
-              <a:gd name="connsiteY222" fmla="*/ 2043242 h 2079137"/>
-              <a:gd name="connsiteX223" fmla="*/ 1018405 w 12192000"/>
-              <a:gd name="connsiteY223" fmla="*/ 2048281 h 2079137"/>
-              <a:gd name="connsiteX224" fmla="*/ 1016563 w 12192000"/>
-              <a:gd name="connsiteY224" fmla="*/ 2051718 h 2079137"/>
-              <a:gd name="connsiteX225" fmla="*/ 1008284 w 12192000"/>
-              <a:gd name="connsiteY225" fmla="*/ 2046742 h 2079137"/>
-              <a:gd name="connsiteX226" fmla="*/ 981974 w 12192000"/>
-              <a:gd name="connsiteY226" fmla="*/ 2048363 h 2079137"/>
-              <a:gd name="connsiteX227" fmla="*/ 971903 w 12192000"/>
-              <a:gd name="connsiteY227" fmla="*/ 2053484 h 2079137"/>
-              <a:gd name="connsiteX228" fmla="*/ 954015 w 12192000"/>
-              <a:gd name="connsiteY228" fmla="*/ 2052529 h 2079137"/>
-              <a:gd name="connsiteX229" fmla="*/ 839571 w 12192000"/>
-              <a:gd name="connsiteY229" fmla="*/ 2046509 h 2079137"/>
-              <a:gd name="connsiteX230" fmla="*/ 823321 w 12192000"/>
-              <a:gd name="connsiteY230" fmla="*/ 2054296 h 2079137"/>
-              <a:gd name="connsiteX231" fmla="*/ 800990 w 12192000"/>
-              <a:gd name="connsiteY231" fmla="*/ 2051523 h 2079137"/>
-              <a:gd name="connsiteX232" fmla="*/ 776439 w 12192000"/>
-              <a:gd name="connsiteY232" fmla="*/ 2062634 h 2079137"/>
-              <a:gd name="connsiteX233" fmla="*/ 763041 w 12192000"/>
-              <a:gd name="connsiteY233" fmla="*/ 2063995 h 2079137"/>
-              <a:gd name="connsiteX234" fmla="*/ 757863 w 12192000"/>
-              <a:gd name="connsiteY234" fmla="*/ 2065877 h 2079137"/>
-              <a:gd name="connsiteX235" fmla="*/ 745053 w 12192000"/>
-              <a:gd name="connsiteY235" fmla="*/ 2051831 h 2079137"/>
-              <a:gd name="connsiteX236" fmla="*/ 722609 w 12192000"/>
-              <a:gd name="connsiteY236" fmla="*/ 2049504 h 2079137"/>
-              <a:gd name="connsiteX237" fmla="*/ 717618 w 12192000"/>
-              <a:gd name="connsiteY237" fmla="*/ 2042131 h 2079137"/>
-              <a:gd name="connsiteX238" fmla="*/ 703285 w 12192000"/>
-              <a:gd name="connsiteY238" fmla="*/ 2046808 h 2079137"/>
-              <a:gd name="connsiteX239" fmla="*/ 680199 w 12192000"/>
-              <a:gd name="connsiteY239" fmla="*/ 2051947 h 2079137"/>
-              <a:gd name="connsiteX240" fmla="*/ 667351 w 12192000"/>
-              <a:gd name="connsiteY240" fmla="*/ 2054469 h 2079137"/>
-              <a:gd name="connsiteX241" fmla="*/ 660961 w 12192000"/>
-              <a:gd name="connsiteY241" fmla="*/ 2049404 h 2079137"/>
-              <a:gd name="connsiteX242" fmla="*/ 638282 w 12192000"/>
-              <a:gd name="connsiteY242" fmla="*/ 2060093 h 2079137"/>
-              <a:gd name="connsiteX243" fmla="*/ 583551 w 12192000"/>
-              <a:gd name="connsiteY243" fmla="*/ 2070197 h 2079137"/>
-              <a:gd name="connsiteX244" fmla="*/ 525274 w 12192000"/>
-              <a:gd name="connsiteY244" fmla="*/ 2079137 h 2079137"/>
-              <a:gd name="connsiteX245" fmla="*/ 405635 w 12192000"/>
-              <a:gd name="connsiteY245" fmla="*/ 2059339 h 2079137"/>
-              <a:gd name="connsiteX246" fmla="*/ 281555 w 12192000"/>
-              <a:gd name="connsiteY246" fmla="*/ 2022847 h 2079137"/>
-              <a:gd name="connsiteX247" fmla="*/ 98513 w 12192000"/>
-              <a:gd name="connsiteY247" fmla="*/ 1969504 h 2079137"/>
-              <a:gd name="connsiteX248" fmla="*/ 56191 w 12192000"/>
-              <a:gd name="connsiteY248" fmla="*/ 1950709 h 2079137"/>
-              <a:gd name="connsiteX249" fmla="*/ 0 w 12192000"/>
-              <a:gd name="connsiteY249" fmla="*/ 1935789 h 2079137"/>
-            </a:gdLst>
-            <a:ahLst/>
-            <a:cxnLst>
-              <a:cxn ang="0">
-                <a:pos x="connsiteX0" y="connsiteY0"/>
-              </a:cxn>
-              <a:cxn ang="0">
-                <a:pos x="connsiteX1" y="connsiteY1"/>
-              </a:cxn>
-              <a:cxn ang="0">
-                <a:pos x="connsiteX2" y="connsiteY2"/>
-              </a:cxn>
-              <a:cxn ang="0">
-                <a:pos x="connsiteX3" y="connsiteY3"/>
-              </a:cxn>
-              <a:cxn ang="0">
-                <a:pos x="connsiteX4" y="connsiteY4"/>
-              </a:cxn>
-              <a:cxn ang="0">
-                <a:pos x="connsiteX5" y="connsiteY5"/>
-              </a:cxn>
-              <a:cxn ang="0">
-                <a:pos x="connsiteX6" y="connsiteY6"/>
-              </a:cxn>
-              <a:cxn ang="0">
-                <a:pos x="connsiteX7" y="connsiteY7"/>
-              </a:cxn>
-              <a:cxn ang="0">
-                <a:pos x="connsiteX8" y="connsiteY8"/>
-              </a:cxn>
-              <a:cxn ang="0">
-                <a:pos x="connsiteX9" y="connsiteY9"/>
-              </a:cxn>
-              <a:cxn ang="0">
-                <a:pos x="connsiteX10" y="connsiteY10"/>
-              </a:cxn>
-              <a:cxn ang="0">
-                <a:pos x="connsiteX11" y="connsiteY11"/>
-              </a:cxn>
-              <a:cxn ang="0">
-                <a:pos x="connsiteX12" y="connsiteY12"/>
-              </a:cxn>
-              <a:cxn ang="0">
-                <a:pos x="connsiteX13" y="connsiteY13"/>
-              </a:cxn>
-              <a:cxn ang="0">
-                <a:pos x="connsiteX14" y="connsiteY14"/>
-              </a:cxn>
-              <a:cxn ang="0">
-                <a:pos x="connsiteX15" y="connsiteY15"/>
-              </a:cxn>
-              <a:cxn ang="0">
-                <a:pos x="connsiteX16" y="connsiteY16"/>
-              </a:cxn>
-              <a:cxn ang="0">
-                <a:pos x="connsiteX17" y="connsiteY17"/>
-              </a:cxn>
-              <a:cxn ang="0">
-                <a:pos x="connsiteX18" y="connsiteY18"/>
-              </a:cxn>
-              <a:cxn ang="0">
-                <a:pos x="connsiteX19" y="connsiteY19"/>
-              </a:cxn>
-              <a:cxn ang="0">
-                <a:pos x="connsiteX20" y="connsiteY20"/>
-              </a:cxn>
-              <a:cxn ang="0">
-                <a:pos x="connsiteX21" y="connsiteY21"/>
-              </a:cxn>
-              <a:cxn ang="0">
-                <a:pos x="connsiteX22" y="connsiteY22"/>
-              </a:cxn>
-              <a:cxn ang="0">
-                <a:pos x="connsiteX23" y="connsiteY23"/>
-              </a:cxn>
-              <a:cxn ang="0">
-                <a:pos x="connsiteX24" y="connsiteY24"/>
-              </a:cxn>
-              <a:cxn ang="0">
-                <a:pos x="connsiteX25" y="connsiteY25"/>
-              </a:cxn>
-              <a:cxn ang="0">
-                <a:pos x="connsiteX26" y="connsiteY26"/>
-              </a:cxn>
-              <a:cxn ang="0">
-                <a:pos x="connsiteX27" y="connsiteY27"/>
-              </a:cxn>
-              <a:cxn ang="0">
-                <a:pos x="connsiteX28" y="connsiteY28"/>
-              </a:cxn>
-              <a:cxn ang="0">
-                <a:pos x="connsiteX29" y="connsiteY29"/>
-              </a:cxn>
-              <a:cxn ang="0">
-                <a:pos x="connsiteX30" y="connsiteY30"/>
-              </a:cxn>
-              <a:cxn ang="0">
-                <a:pos x="connsiteX31" y="connsiteY31"/>
-              </a:cxn>
-              <a:cxn ang="0">
-                <a:pos x="connsiteX32" y="connsiteY32"/>
-              </a:cxn>
-              <a:cxn ang="0">
-                <a:pos x="connsiteX33" y="connsiteY33"/>
-              </a:cxn>
-              <a:cxn ang="0">
-                <a:pos x="connsiteX34" y="connsiteY34"/>
-              </a:cxn>
-              <a:cxn ang="0">
-                <a:pos x="connsiteX35" y="connsiteY35"/>
-              </a:cxn>
-              <a:cxn ang="0">
-                <a:pos x="connsiteX36" y="connsiteY36"/>
-              </a:cxn>
-              <a:cxn ang="0">
-                <a:pos x="connsiteX37" y="connsiteY37"/>
-              </a:cxn>
-              <a:cxn ang="0">
-                <a:pos x="connsiteX38" y="connsiteY38"/>
-              </a:cxn>
-              <a:cxn ang="0">
-                <a:pos x="connsiteX39" y="connsiteY39"/>
-              </a:cxn>
-              <a:cxn ang="0">
-                <a:pos x="connsiteX40" y="connsiteY40"/>
-              </a:cxn>
-              <a:cxn ang="0">
-                <a:pos x="connsiteX41" y="connsiteY41"/>
-              </a:cxn>
-              <a:cxn ang="0">
-                <a:pos x="connsiteX42" y="connsiteY42"/>
-              </a:cxn>
-              <a:cxn ang="0">
-                <a:pos x="connsiteX43" y="connsiteY43"/>
-              </a:cxn>
-              <a:cxn ang="0">
-                <a:pos x="connsiteX44" y="connsiteY44"/>
-              </a:cxn>
-              <a:cxn ang="0">
-                <a:pos x="connsiteX45" y="connsiteY45"/>
-              </a:cxn>
-              <a:cxn ang="0">
-                <a:pos x="connsiteX46" y="connsiteY46"/>
-              </a:cxn>
-              <a:cxn ang="0">
-                <a:pos x="connsiteX47" y="connsiteY47"/>
-              </a:cxn>
-              <a:cxn ang="0">
-                <a:pos x="connsiteX48" y="connsiteY48"/>
-              </a:cxn>
-              <a:cxn ang="0">
-                <a:pos x="connsiteX49" y="connsiteY49"/>
-              </a:cxn>
-              <a:cxn ang="0">
-                <a:pos x="connsiteX50" y="connsiteY50"/>
-              </a:cxn>
-              <a:cxn ang="0">
-                <a:pos x="connsiteX51" y="connsiteY51"/>
-              </a:cxn>
-              <a:cxn ang="0">
-                <a:pos x="connsiteX52" y="connsiteY52"/>
-              </a:cxn>
-              <a:cxn ang="0">
-                <a:pos x="connsiteX53" y="connsiteY53"/>
-              </a:cxn>
-              <a:cxn ang="0">
-                <a:pos x="connsiteX54" y="connsiteY54"/>
-              </a:cxn>
-              <a:cxn ang="0">
-                <a:pos x="connsiteX55" y="connsiteY55"/>
-              </a:cxn>
-              <a:cxn ang="0">
-                <a:pos x="connsiteX56" y="connsiteY56"/>
-              </a:cxn>
-              <a:cxn ang="0">
-                <a:pos x="connsiteX57" y="connsiteY57"/>
-              </a:cxn>
-              <a:cxn ang="0">
-                <a:pos x="connsiteX58" y="connsiteY58"/>
-              </a:cxn>
-              <a:cxn ang="0">
-                <a:pos x="connsiteX59" y="connsiteY59"/>
-              </a:cxn>
-              <a:cxn ang="0">
-                <a:pos x="connsiteX60" y="connsiteY60"/>
-              </a:cxn>
-              <a:cxn ang="0">
-                <a:pos x="connsiteX61" y="connsiteY61"/>
-              </a:cxn>
-              <a:cxn ang="0">
-                <a:pos x="connsiteX62" y="connsiteY62"/>
-              </a:cxn>
-              <a:cxn ang="0">
-                <a:pos x="connsiteX63" y="connsiteY63"/>
-              </a:cxn>
-              <a:cxn ang="0">
-                <a:pos x="connsiteX64" y="connsiteY64"/>
-              </a:cxn>
-              <a:cxn ang="0">
-                <a:pos x="connsiteX65" y="connsiteY65"/>
-              </a:cxn>
-              <a:cxn ang="0">
-                <a:pos x="connsiteX66" y="connsiteY66"/>
-              </a:cxn>
-              <a:cxn ang="0">
-                <a:pos x="connsiteX67" y="connsiteY67"/>
-              </a:cxn>
-              <a:cxn ang="0">
-                <a:pos x="connsiteX68" y="connsiteY68"/>
-              </a:cxn>
-              <a:cxn ang="0">
-                <a:pos x="connsiteX69" y="connsiteY69"/>
-              </a:cxn>
-              <a:cxn ang="0">
-                <a:pos x="connsiteX70" y="connsiteY70"/>
-              </a:cxn>
-              <a:cxn ang="0">
-                <a:pos x="connsiteX71" y="connsiteY71"/>
-              </a:cxn>
-              <a:cxn ang="0">
-                <a:pos x="connsiteX72" y="connsiteY72"/>
-              </a:cxn>
-              <a:cxn ang="0">
-                <a:pos x="connsiteX73" y="connsiteY73"/>
-              </a:cxn>
-              <a:cxn ang="0">
-                <a:pos x="connsiteX74" y="connsiteY74"/>
-              </a:cxn>
-              <a:cxn ang="0">
-                <a:pos x="connsiteX75" y="connsiteY75"/>
-              </a:cxn>
-              <a:cxn ang="0">
-                <a:pos x="connsiteX76" y="connsiteY76"/>
-              </a:cxn>
-              <a:cxn ang="0">
-                <a:pos x="connsiteX77" y="connsiteY77"/>
-              </a:cxn>
-              <a:cxn ang="0">
-                <a:pos x="connsiteX78" y="connsiteY78"/>
-              </a:cxn>
-              <a:cxn ang="0">
-                <a:pos x="connsiteX79" y="connsiteY79"/>
-              </a:cxn>
-              <a:cxn ang="0">
-                <a:pos x="connsiteX80" y="connsiteY80"/>
-              </a:cxn>
-              <a:cxn ang="0">
-                <a:pos x="connsiteX81" y="connsiteY81"/>
-              </a:cxn>
-              <a:cxn ang="0">
-                <a:pos x="connsiteX82" y="connsiteY82"/>
-              </a:cxn>
-              <a:cxn ang="0">
-                <a:pos x="connsiteX83" y="connsiteY83"/>
-              </a:cxn>
-              <a:cxn ang="0">
-                <a:pos x="connsiteX84" y="connsiteY84"/>
-              </a:cxn>
-              <a:cxn ang="0">
-                <a:pos x="connsiteX85" y="connsiteY85"/>
-              </a:cxn>
-              <a:cxn ang="0">
-                <a:pos x="connsiteX86" y="connsiteY86"/>
-              </a:cxn>
-              <a:cxn ang="0">
-                <a:pos x="connsiteX87" y="connsiteY87"/>
-              </a:cxn>
-              <a:cxn ang="0">
-                <a:pos x="connsiteX88" y="connsiteY88"/>
-              </a:cxn>
-              <a:cxn ang="0">
-                <a:pos x="connsiteX89" y="connsiteY89"/>
-              </a:cxn>
-              <a:cxn ang="0">
-                <a:pos x="connsiteX90" y="connsiteY90"/>
-              </a:cxn>
-              <a:cxn ang="0">
-                <a:pos x="connsiteX91" y="connsiteY91"/>
-              </a:cxn>
-              <a:cxn ang="0">
-                <a:pos x="connsiteX92" y="connsiteY92"/>
-              </a:cxn>
-              <a:cxn ang="0">
-                <a:pos x="connsiteX93" y="connsiteY93"/>
-              </a:cxn>
-              <a:cxn ang="0">
-                <a:pos x="connsiteX94" y="connsiteY94"/>
-              </a:cxn>
-              <a:cxn ang="0">
-                <a:pos x="connsiteX95" y="connsiteY95"/>
-              </a:cxn>
-              <a:cxn ang="0">
-                <a:pos x="connsiteX96" y="connsiteY96"/>
-              </a:cxn>
-              <a:cxn ang="0">
-                <a:pos x="connsiteX97" y="connsiteY97"/>
-              </a:cxn>
-              <a:cxn ang="0">
-                <a:pos x="connsiteX98" y="connsiteY98"/>
-              </a:cxn>
-              <a:cxn ang="0">
-                <a:pos x="connsiteX99" y="connsiteY99"/>
-              </a:cxn>
-              <a:cxn ang="0">
-                <a:pos x="connsiteX100" y="connsiteY100"/>
-              </a:cxn>
-              <a:cxn ang="0">
-                <a:pos x="connsiteX101" y="connsiteY101"/>
-              </a:cxn>
-              <a:cxn ang="0">
-                <a:pos x="connsiteX102" y="connsiteY102"/>
-              </a:cxn>
-              <a:cxn ang="0">
-                <a:pos x="connsiteX103" y="connsiteY103"/>
-              </a:cxn>
-              <a:cxn ang="0">
-                <a:pos x="connsiteX104" y="connsiteY104"/>
-              </a:cxn>
-              <a:cxn ang="0">
-                <a:pos x="connsiteX105" y="connsiteY105"/>
-              </a:cxn>
-              <a:cxn ang="0">
-                <a:pos x="connsiteX106" y="connsiteY106"/>
-              </a:cxn>
-              <a:cxn ang="0">
-                <a:pos x="connsiteX107" y="connsiteY107"/>
-              </a:cxn>
-              <a:cxn ang="0">
-                <a:pos x="connsiteX108" y="connsiteY108"/>
-              </a:cxn>
-              <a:cxn ang="0">
-                <a:pos x="connsiteX109" y="connsiteY109"/>
-              </a:cxn>
-              <a:cxn ang="0">
-                <a:pos x="connsiteX110" y="connsiteY110"/>
-              </a:cxn>
-              <a:cxn ang="0">
-                <a:pos x="connsiteX111" y="connsiteY111"/>
-              </a:cxn>
-              <a:cxn ang="0">
-                <a:pos x="connsiteX112" y="connsiteY112"/>
-              </a:cxn>
-              <a:cxn ang="0">
-                <a:pos x="connsiteX113" y="connsiteY113"/>
-              </a:cxn>
-              <a:cxn ang="0">
-                <a:pos x="connsiteX114" y="connsiteY114"/>
-              </a:cxn>
-              <a:cxn ang="0">
-                <a:pos x="connsiteX115" y="connsiteY115"/>
-              </a:cxn>
-              <a:cxn ang="0">
-                <a:pos x="connsiteX116" y="connsiteY116"/>
-              </a:cxn>
-              <a:cxn ang="0">
-                <a:pos x="connsiteX117" y="connsiteY117"/>
-              </a:cxn>
-              <a:cxn ang="0">
-                <a:pos x="connsiteX118" y="connsiteY118"/>
-              </a:cxn>
-              <a:cxn ang="0">
-                <a:pos x="connsiteX119" y="connsiteY119"/>
-              </a:cxn>
-              <a:cxn ang="0">
-                <a:pos x="connsiteX120" y="connsiteY120"/>
-              </a:cxn>
-              <a:cxn ang="0">
-                <a:pos x="connsiteX121" y="connsiteY121"/>
-              </a:cxn>
-              <a:cxn ang="0">
-                <a:pos x="connsiteX122" y="connsiteY122"/>
-              </a:cxn>
-              <a:cxn ang="0">
-                <a:pos x="connsiteX123" y="connsiteY123"/>
-              </a:cxn>
-              <a:cxn ang="0">
-                <a:pos x="connsiteX124" y="connsiteY124"/>
-              </a:cxn>
-              <a:cxn ang="0">
-                <a:pos x="connsiteX125" y="connsiteY125"/>
-              </a:cxn>
-              <a:cxn ang="0">
-                <a:pos x="connsiteX126" y="connsiteY126"/>
-              </a:cxn>
-              <a:cxn ang="0">
-                <a:pos x="connsiteX127" y="connsiteY127"/>
-              </a:cxn>
-              <a:cxn ang="0">
-                <a:pos x="connsiteX128" y="connsiteY128"/>
-              </a:cxn>
-              <a:cxn ang="0">
-                <a:pos x="connsiteX129" y="connsiteY129"/>
-              </a:cxn>
-              <a:cxn ang="0">
-                <a:pos x="connsiteX130" y="connsiteY130"/>
-              </a:cxn>
-              <a:cxn ang="0">
-                <a:pos x="connsiteX131" y="connsiteY131"/>
-              </a:cxn>
-              <a:cxn ang="0">
-                <a:pos x="connsiteX132" y="connsiteY132"/>
-              </a:cxn>
-              <a:cxn ang="0">
-                <a:pos x="connsiteX133" y="connsiteY133"/>
-              </a:cxn>
-              <a:cxn ang="0">
-                <a:pos x="connsiteX134" y="connsiteY134"/>
-              </a:cxn>
-              <a:cxn ang="0">
-                <a:pos x="connsiteX135" y="connsiteY135"/>
-              </a:cxn>
-              <a:cxn ang="0">
-                <a:pos x="connsiteX136" y="connsiteY136"/>
-              </a:cxn>
-              <a:cxn ang="0">
-                <a:pos x="connsiteX137" y="connsiteY137"/>
-              </a:cxn>
-              <a:cxn ang="0">
-                <a:pos x="connsiteX138" y="connsiteY138"/>
-              </a:cxn>
-              <a:cxn ang="0">
-                <a:pos x="connsiteX139" y="connsiteY139"/>
-              </a:cxn>
-              <a:cxn ang="0">
-                <a:pos x="connsiteX140" y="connsiteY140"/>
-              </a:cxn>
-              <a:cxn ang="0">
-                <a:pos x="connsiteX141" y="connsiteY141"/>
-              </a:cxn>
-              <a:cxn ang="0">
-                <a:pos x="connsiteX142" y="connsiteY142"/>
-              </a:cxn>
-              <a:cxn ang="0">
-                <a:pos x="connsiteX143" y="connsiteY143"/>
-              </a:cxn>
-              <a:cxn ang="0">
-                <a:pos x="connsiteX144" y="connsiteY144"/>
-              </a:cxn>
-              <a:cxn ang="0">
-                <a:pos x="connsiteX145" y="connsiteY145"/>
-              </a:cxn>
-              <a:cxn ang="0">
-                <a:pos x="connsiteX146" y="connsiteY146"/>
-              </a:cxn>
-              <a:cxn ang="0">
-                <a:pos x="connsiteX147" y="connsiteY147"/>
-              </a:cxn>
-              <a:cxn ang="0">
-                <a:pos x="connsiteX148" y="connsiteY148"/>
-              </a:cxn>
-              <a:cxn ang="0">
-                <a:pos x="connsiteX149" y="connsiteY149"/>
-              </a:cxn>
-              <a:cxn ang="0">
-                <a:pos x="connsiteX150" y="connsiteY150"/>
-              </a:cxn>
-              <a:cxn ang="0">
-                <a:pos x="connsiteX151" y="connsiteY151"/>
-              </a:cxn>
-              <a:cxn ang="0">
-                <a:pos x="connsiteX152" y="connsiteY152"/>
-              </a:cxn>
-              <a:cxn ang="0">
-                <a:pos x="connsiteX153" y="connsiteY153"/>
-              </a:cxn>
-              <a:cxn ang="0">
-                <a:pos x="connsiteX154" y="connsiteY154"/>
-              </a:cxn>
-              <a:cxn ang="0">
-                <a:pos x="connsiteX155" y="connsiteY155"/>
-              </a:cxn>
-              <a:cxn ang="0">
-                <a:pos x="connsiteX156" y="connsiteY156"/>
-              </a:cxn>
-              <a:cxn ang="0">
-                <a:pos x="connsiteX157" y="connsiteY157"/>
-              </a:cxn>
-              <a:cxn ang="0">
-                <a:pos x="connsiteX158" y="connsiteY158"/>
-              </a:cxn>
-              <a:cxn ang="0">
-                <a:pos x="connsiteX159" y="connsiteY159"/>
-              </a:cxn>
-              <a:cxn ang="0">
-                <a:pos x="connsiteX160" y="connsiteY160"/>
-              </a:cxn>
-              <a:cxn ang="0">
-                <a:pos x="connsiteX161" y="connsiteY161"/>
-              </a:cxn>
-              <a:cxn ang="0">
-                <a:pos x="connsiteX162" y="connsiteY162"/>
-              </a:cxn>
-              <a:cxn ang="0">
-                <a:pos x="connsiteX163" y="connsiteY163"/>
-              </a:cxn>
-              <a:cxn ang="0">
-                <a:pos x="connsiteX164" y="connsiteY164"/>
-              </a:cxn>
-              <a:cxn ang="0">
-                <a:pos x="connsiteX165" y="connsiteY165"/>
-              </a:cxn>
-              <a:cxn ang="0">
-                <a:pos x="connsiteX166" y="connsiteY166"/>
-              </a:cxn>
-              <a:cxn ang="0">
-                <a:pos x="connsiteX167" y="connsiteY167"/>
-              </a:cxn>
-              <a:cxn ang="0">
-                <a:pos x="connsiteX168" y="connsiteY168"/>
-              </a:cxn>
-              <a:cxn ang="0">
-                <a:pos x="connsiteX169" y="connsiteY169"/>
-              </a:cxn>
-              <a:cxn ang="0">
-                <a:pos x="connsiteX170" y="connsiteY170"/>
-              </a:cxn>
-              <a:cxn ang="0">
-                <a:pos x="connsiteX171" y="connsiteY171"/>
-              </a:cxn>
-              <a:cxn ang="0">
-                <a:pos x="connsiteX172" y="connsiteY172"/>
-              </a:cxn>
-              <a:cxn ang="0">
-                <a:pos x="connsiteX173" y="connsiteY173"/>
-              </a:cxn>
-              <a:cxn ang="0">
-                <a:pos x="connsiteX174" y="connsiteY174"/>
-              </a:cxn>
-              <a:cxn ang="0">
-                <a:pos x="connsiteX175" y="connsiteY175"/>
-              </a:cxn>
-              <a:cxn ang="0">
-                <a:pos x="connsiteX176" y="connsiteY176"/>
-              </a:cxn>
-              <a:cxn ang="0">
-                <a:pos x="connsiteX177" y="connsiteY177"/>
-              </a:cxn>
-              <a:cxn ang="0">
-                <a:pos x="connsiteX178" y="connsiteY178"/>
-              </a:cxn>
-              <a:cxn ang="0">
-                <a:pos x="connsiteX179" y="connsiteY179"/>
-              </a:cxn>
-              <a:cxn ang="0">
-                <a:pos x="connsiteX180" y="connsiteY180"/>
-              </a:cxn>
-              <a:cxn ang="0">
-                <a:pos x="connsiteX181" y="connsiteY181"/>
-              </a:cxn>
-              <a:cxn ang="0">
-                <a:pos x="connsiteX182" y="connsiteY182"/>
-              </a:cxn>
-              <a:cxn ang="0">
-                <a:pos x="connsiteX183" y="connsiteY183"/>
-              </a:cxn>
-              <a:cxn ang="0">
-                <a:pos x="connsiteX184" y="connsiteY184"/>
-              </a:cxn>
-              <a:cxn ang="0">
-                <a:pos x="connsiteX185" y="connsiteY185"/>
-              </a:cxn>
-              <a:cxn ang="0">
-                <a:pos x="connsiteX186" y="connsiteY186"/>
-              </a:cxn>
-              <a:cxn ang="0">
-                <a:pos x="connsiteX187" y="connsiteY187"/>
-              </a:cxn>
-              <a:cxn ang="0">
-                <a:pos x="connsiteX188" y="connsiteY188"/>
-              </a:cxn>
-              <a:cxn ang="0">
-                <a:pos x="connsiteX189" y="connsiteY189"/>
-              </a:cxn>
-              <a:cxn ang="0">
-                <a:pos x="connsiteX190" y="connsiteY190"/>
-              </a:cxn>
-              <a:cxn ang="0">
-                <a:pos x="connsiteX191" y="connsiteY191"/>
-              </a:cxn>
-              <a:cxn ang="0">
-                <a:pos x="connsiteX192" y="connsiteY192"/>
-              </a:cxn>
-              <a:cxn ang="0">
-                <a:pos x="connsiteX193" y="connsiteY193"/>
-              </a:cxn>
-              <a:cxn ang="0">
-                <a:pos x="connsiteX194" y="connsiteY194"/>
-              </a:cxn>
-              <a:cxn ang="0">
-                <a:pos x="connsiteX195" y="connsiteY195"/>
-              </a:cxn>
-              <a:cxn ang="0">
-                <a:pos x="connsiteX196" y="connsiteY196"/>
-              </a:cxn>
-              <a:cxn ang="0">
-                <a:pos x="connsiteX197" y="connsiteY197"/>
-              </a:cxn>
-              <a:cxn ang="0">
-                <a:pos x="connsiteX198" y="connsiteY198"/>
-              </a:cxn>
-              <a:cxn ang="0">
-                <a:pos x="connsiteX199" y="connsiteY199"/>
-              </a:cxn>
-              <a:cxn ang="0">
-                <a:pos x="connsiteX200" y="connsiteY200"/>
-              </a:cxn>
-              <a:cxn ang="0">
-                <a:pos x="connsiteX201" y="connsiteY201"/>
-              </a:cxn>
-              <a:cxn ang="0">
-                <a:pos x="connsiteX202" y="connsiteY202"/>
-              </a:cxn>
-              <a:cxn ang="0">
-                <a:pos x="connsiteX203" y="connsiteY203"/>
-              </a:cxn>
-              <a:cxn ang="0">
-                <a:pos x="connsiteX204" y="connsiteY204"/>
-              </a:cxn>
-              <a:cxn ang="0">
-                <a:pos x="connsiteX205" y="connsiteY205"/>
-              </a:cxn>
-              <a:cxn ang="0">
-                <a:pos x="connsiteX206" y="connsiteY206"/>
-              </a:cxn>
-              <a:cxn ang="0">
-                <a:pos x="connsiteX207" y="connsiteY207"/>
-              </a:cxn>
-              <a:cxn ang="0">
-                <a:pos x="connsiteX208" y="connsiteY208"/>
-              </a:cxn>
-              <a:cxn ang="0">
-                <a:pos x="connsiteX209" y="connsiteY209"/>
-              </a:cxn>
-              <a:cxn ang="0">
-                <a:pos x="connsiteX210" y="connsiteY210"/>
-              </a:cxn>
-              <a:cxn ang="0">
-                <a:pos x="connsiteX211" y="connsiteY211"/>
-              </a:cxn>
-              <a:cxn ang="0">
-                <a:pos x="connsiteX212" y="connsiteY212"/>
-              </a:cxn>
-              <a:cxn ang="0">
-                <a:pos x="connsiteX213" y="connsiteY213"/>
-              </a:cxn>
-              <a:cxn ang="0">
-                <a:pos x="connsiteX214" y="connsiteY214"/>
-              </a:cxn>
-              <a:cxn ang="0">
-                <a:pos x="connsiteX215" y="connsiteY215"/>
-              </a:cxn>
-              <a:cxn ang="0">
-                <a:pos x="connsiteX216" y="connsiteY216"/>
-              </a:cxn>
-              <a:cxn ang="0">
-                <a:pos x="connsiteX217" y="connsiteY217"/>
-              </a:cxn>
-              <a:cxn ang="0">
-                <a:pos x="connsiteX218" y="connsiteY218"/>
-              </a:cxn>
-              <a:cxn ang="0">
-                <a:pos x="connsiteX219" y="connsiteY219"/>
-              </a:cxn>
-              <a:cxn ang="0">
-                <a:pos x="connsiteX220" y="connsiteY220"/>
-              </a:cxn>
-              <a:cxn ang="0">
-                <a:pos x="connsiteX221" y="connsiteY221"/>
-              </a:cxn>
-              <a:cxn ang="0">
-                <a:pos x="connsiteX222" y="connsiteY222"/>
-              </a:cxn>
-              <a:cxn ang="0">
-                <a:pos x="connsiteX223" y="connsiteY223"/>
-              </a:cxn>
-              <a:cxn ang="0">
-                <a:pos x="connsiteX224" y="connsiteY224"/>
-              </a:cxn>
-              <a:cxn ang="0">
-                <a:pos x="connsiteX225" y="connsiteY225"/>
-              </a:cxn>
-              <a:cxn ang="0">
-                <a:pos x="connsiteX226" y="connsiteY226"/>
-              </a:cxn>
-              <a:cxn ang="0">
-                <a:pos x="connsiteX227" y="connsiteY227"/>
-              </a:cxn>
-              <a:cxn ang="0">
-                <a:pos x="connsiteX228" y="connsiteY228"/>
-              </a:cxn>
-              <a:cxn ang="0">
-                <a:pos x="connsiteX229" y="connsiteY229"/>
-              </a:cxn>
-              <a:cxn ang="0">
-                <a:pos x="connsiteX230" y="connsiteY230"/>
-              </a:cxn>
-              <a:cxn ang="0">
-                <a:pos x="connsiteX231" y="connsiteY231"/>
-              </a:cxn>
-              <a:cxn ang="0">
-                <a:pos x="connsiteX232" y="connsiteY232"/>
-              </a:cxn>
-              <a:cxn ang="0">
-                <a:pos x="connsiteX233" y="connsiteY233"/>
-              </a:cxn>
-              <a:cxn ang="0">
-                <a:pos x="connsiteX234" y="connsiteY234"/>
-              </a:cxn>
-              <a:cxn ang="0">
-                <a:pos x="connsiteX235" y="connsiteY235"/>
-              </a:cxn>
-              <a:cxn ang="0">
-                <a:pos x="connsiteX236" y="connsiteY236"/>
-              </a:cxn>
-              <a:cxn ang="0">
-                <a:pos x="connsiteX237" y="connsiteY237"/>
-              </a:cxn>
-              <a:cxn ang="0">
-                <a:pos x="connsiteX238" y="connsiteY238"/>
-              </a:cxn>
-              <a:cxn ang="0">
-                <a:pos x="connsiteX239" y="connsiteY239"/>
-              </a:cxn>
-              <a:cxn ang="0">
-                <a:pos x="connsiteX240" y="connsiteY240"/>
-              </a:cxn>
-              <a:cxn ang="0">
-                <a:pos x="connsiteX241" y="connsiteY241"/>
-              </a:cxn>
-              <a:cxn ang="0">
-                <a:pos x="connsiteX242" y="connsiteY242"/>
-              </a:cxn>
-              <a:cxn ang="0">
-                <a:pos x="connsiteX243" y="connsiteY243"/>
-              </a:cxn>
-              <a:cxn ang="0">
-                <a:pos x="connsiteX244" y="connsiteY244"/>
-              </a:cxn>
-              <a:cxn ang="0">
-                <a:pos x="connsiteX245" y="connsiteY245"/>
-              </a:cxn>
-              <a:cxn ang="0">
-                <a:pos x="connsiteX246" y="connsiteY246"/>
-              </a:cxn>
-              <a:cxn ang="0">
-                <a:pos x="connsiteX247" y="connsiteY247"/>
-              </a:cxn>
-              <a:cxn ang="0">
-                <a:pos x="connsiteX248" y="connsiteY248"/>
-              </a:cxn>
-              <a:cxn ang="0">
-                <a:pos x="connsiteX249" y="connsiteY249"/>
-              </a:cxn>
-            </a:cxnLst>
-            <a:rect l="l" t="t" r="r" b="b"/>
-            <a:pathLst>
-              <a:path w="12192000" h="2079137">
-                <a:moveTo>
-                  <a:pt x="12160143" y="831692"/>
-                </a:moveTo>
-                <a:lnTo>
-                  <a:pt x="12159112" y="833361"/>
-                </a:lnTo>
-                <a:cubicBezTo>
-                  <a:pt x="12157915" y="833832"/>
-                  <a:pt x="12157402" y="833649"/>
-                  <a:pt x="12158912" y="832430"/>
-                </a:cubicBezTo>
-                <a:close/>
-                <a:moveTo>
-                  <a:pt x="0" y="0"/>
-                </a:moveTo>
-                <a:lnTo>
-                  <a:pt x="12192000" y="0"/>
-                </a:lnTo>
-                <a:lnTo>
-                  <a:pt x="12192000" y="558063"/>
-                </a:lnTo>
-                <a:lnTo>
-                  <a:pt x="12189259" y="810508"/>
-                </a:lnTo>
-                <a:lnTo>
-                  <a:pt x="12170847" y="825280"/>
-                </a:lnTo>
-                <a:lnTo>
-                  <a:pt x="12160143" y="831692"/>
-                </a:lnTo>
-                <a:lnTo>
-                  <a:pt x="12163806" y="825759"/>
-                </a:lnTo>
-                <a:cubicBezTo>
-                  <a:pt x="12125449" y="821525"/>
-                  <a:pt x="12082203" y="824698"/>
-                  <a:pt x="12056557" y="810176"/>
-                </a:cubicBezTo>
-                <a:cubicBezTo>
-                  <a:pt x="12050902" y="790976"/>
-                  <a:pt x="11923731" y="799312"/>
-                  <a:pt x="11900316" y="789618"/>
-                </a:cubicBezTo>
-                <a:cubicBezTo>
-                  <a:pt x="11841702" y="803374"/>
-                  <a:pt x="11823963" y="832645"/>
-                  <a:pt x="11791206" y="824176"/>
-                </a:cubicBezTo>
-                <a:cubicBezTo>
-                  <a:pt x="11768977" y="817380"/>
-                  <a:pt x="11683857" y="828947"/>
-                  <a:pt x="11659257" y="800841"/>
-                </a:cubicBezTo>
-                <a:cubicBezTo>
-                  <a:pt x="11617173" y="818107"/>
-                  <a:pt x="11602556" y="790694"/>
-                  <a:pt x="11569789" y="797135"/>
-                </a:cubicBezTo>
-                <a:cubicBezTo>
-                  <a:pt x="11498310" y="795094"/>
-                  <a:pt x="11458472" y="819882"/>
-                  <a:pt x="11367885" y="791985"/>
-                </a:cubicBezTo>
-                <a:cubicBezTo>
-                  <a:pt x="11325508" y="798158"/>
-                  <a:pt x="11266580" y="755023"/>
-                  <a:pt x="11174663" y="788721"/>
-                </a:cubicBezTo>
-                <a:cubicBezTo>
-                  <a:pt x="11122703" y="792192"/>
-                  <a:pt x="11150009" y="775410"/>
-                  <a:pt x="11068220" y="786994"/>
-                </a:cubicBezTo>
-                <a:cubicBezTo>
-                  <a:pt x="11046931" y="759861"/>
-                  <a:pt x="10919185" y="793102"/>
-                  <a:pt x="10893266" y="794013"/>
-                </a:cubicBezTo>
-                <a:cubicBezTo>
-                  <a:pt x="10874184" y="776189"/>
-                  <a:pt x="10862860" y="788743"/>
-                  <a:pt x="10844025" y="789857"/>
-                </a:cubicBezTo>
-                <a:cubicBezTo>
-                  <a:pt x="10836453" y="779294"/>
-                  <a:pt x="10820690" y="778184"/>
-                  <a:pt x="10814353" y="789010"/>
-                </a:cubicBezTo>
-                <a:cubicBezTo>
-                  <a:pt x="10819669" y="816016"/>
-                  <a:pt x="10754019" y="789067"/>
-                  <a:pt x="10748393" y="806738"/>
-                </a:cubicBezTo>
-                <a:cubicBezTo>
-                  <a:pt x="10687156" y="807873"/>
-                  <a:pt x="10550299" y="781800"/>
-                  <a:pt x="10468256" y="778733"/>
-                </a:cubicBezTo>
-                <a:cubicBezTo>
-                  <a:pt x="10436666" y="770025"/>
-                  <a:pt x="10371995" y="797252"/>
-                  <a:pt x="10256131" y="788332"/>
-                </a:cubicBezTo>
-                <a:cubicBezTo>
-                  <a:pt x="10240995" y="781626"/>
-                  <a:pt x="10182664" y="765742"/>
-                  <a:pt x="10177442" y="777371"/>
-                </a:cubicBezTo>
-                <a:cubicBezTo>
-                  <a:pt x="10141447" y="775683"/>
-                  <a:pt x="10030323" y="810071"/>
-                  <a:pt x="10006086" y="792651"/>
-                </a:cubicBezTo>
-                <a:cubicBezTo>
-                  <a:pt x="10009448" y="818833"/>
-                  <a:pt x="9960389" y="791426"/>
-                  <a:pt x="9952382" y="815411"/>
-                </a:cubicBezTo>
-                <a:lnTo>
-                  <a:pt x="9926457" y="827295"/>
-                </a:lnTo>
-                <a:lnTo>
-                  <a:pt x="9843405" y="867046"/>
-                </a:lnTo>
-                <a:lnTo>
-                  <a:pt x="9830866" y="875047"/>
-                </a:lnTo>
-                <a:lnTo>
-                  <a:pt x="9801807" y="872272"/>
-                </a:lnTo>
-                <a:lnTo>
-                  <a:pt x="9785653" y="861743"/>
-                </a:lnTo>
-                <a:lnTo>
-                  <a:pt x="9781177" y="864820"/>
-                </a:lnTo>
-                <a:cubicBezTo>
-                  <a:pt x="9776153" y="871003"/>
-                  <a:pt x="9773556" y="874842"/>
-                  <a:pt x="9768640" y="869379"/>
-                </a:cubicBezTo>
-                <a:lnTo>
-                  <a:pt x="9712211" y="900283"/>
-                </a:lnTo>
-                <a:cubicBezTo>
-                  <a:pt x="9706243" y="902750"/>
-                  <a:pt x="9698952" y="902954"/>
-                  <a:pt x="9689465" y="899268"/>
-                </a:cubicBezTo>
-                <a:cubicBezTo>
-                  <a:pt x="9670819" y="902906"/>
-                  <a:pt x="9618108" y="917739"/>
-                  <a:pt x="9600339" y="922112"/>
-                </a:cubicBezTo>
-                <a:lnTo>
-                  <a:pt x="9582850" y="925510"/>
-                </a:lnTo>
-                <a:cubicBezTo>
-                  <a:pt x="9574400" y="928631"/>
-                  <a:pt x="9556868" y="938130"/>
-                  <a:pt x="9549638" y="940845"/>
-                </a:cubicBezTo>
-                <a:cubicBezTo>
-                  <a:pt x="9543792" y="942327"/>
-                  <a:pt x="9546812" y="939351"/>
-                  <a:pt x="9539471" y="941799"/>
-                </a:cubicBezTo>
-                <a:cubicBezTo>
-                  <a:pt x="9538994" y="947702"/>
-                  <a:pt x="9536009" y="953248"/>
-                  <a:pt x="9505592" y="955533"/>
-                </a:cubicBezTo>
-                <a:cubicBezTo>
-                  <a:pt x="9486013" y="968563"/>
-                  <a:pt x="9460860" y="978842"/>
-                  <a:pt x="9432569" y="985377"/>
-                </a:cubicBezTo>
-                <a:cubicBezTo>
-                  <a:pt x="9426990" y="980335"/>
-                  <a:pt x="9418918" y="990185"/>
-                  <a:pt x="9414216" y="992655"/>
-                </a:cubicBezTo>
-                <a:cubicBezTo>
-                  <a:pt x="9412644" y="989014"/>
-                  <a:pt x="9400057" y="989255"/>
-                  <a:pt x="9397106" y="992980"/>
-                </a:cubicBezTo>
-                <a:cubicBezTo>
-                  <a:pt x="9314093" y="1020862"/>
-                  <a:pt x="9349678" y="978420"/>
-                  <a:pt x="9305108" y="1007767"/>
-                </a:cubicBezTo>
-                <a:cubicBezTo>
-                  <a:pt x="9296670" y="1010324"/>
-                  <a:pt x="9289251" y="1009612"/>
-                  <a:pt x="9282434" y="1007523"/>
-                </a:cubicBezTo>
-                <a:lnTo>
-                  <a:pt x="9271941" y="1002839"/>
-                </a:lnTo>
-                <a:lnTo>
-                  <a:pt x="9238227" y="1017668"/>
-                </a:lnTo>
-                <a:cubicBezTo>
-                  <a:pt x="9221294" y="1023415"/>
-                  <a:pt x="9203166" y="1027997"/>
-                  <a:pt x="9184265" y="1031275"/>
-                </a:cubicBezTo>
-                <a:cubicBezTo>
-                  <a:pt x="9178371" y="1024135"/>
-                  <a:pt x="9165618" y="1036637"/>
-                  <a:pt x="9159000" y="1039569"/>
-                </a:cubicBezTo>
-                <a:cubicBezTo>
-                  <a:pt x="9157881" y="1034602"/>
-                  <a:pt x="9141725" y="1033964"/>
-                  <a:pt x="9137031" y="1038699"/>
-                </a:cubicBezTo>
-                <a:cubicBezTo>
-                  <a:pt x="9023973" y="1069523"/>
-                  <a:pt x="9079946" y="1015706"/>
-                  <a:pt x="9015702" y="1051400"/>
-                </a:cubicBezTo>
-                <a:lnTo>
-                  <a:pt x="8971403" y="1040542"/>
-                </a:lnTo>
-                <a:lnTo>
-                  <a:pt x="8961826" y="1045364"/>
-                </a:lnTo>
-                <a:cubicBezTo>
-                  <a:pt x="8922837" y="1050010"/>
-                  <a:pt x="8909116" y="1040754"/>
-                  <a:pt x="8888623" y="1053908"/>
-                </a:cubicBezTo>
-                <a:cubicBezTo>
-                  <a:pt x="8850424" y="1035587"/>
-                  <a:pt x="8865892" y="1054194"/>
-                  <a:pt x="8841066" y="1060421"/>
-                </a:cubicBezTo>
-                <a:cubicBezTo>
-                  <a:pt x="8818353" y="1064878"/>
-                  <a:pt x="8775995" y="1076068"/>
-                  <a:pt x="8752342" y="1080646"/>
-                </a:cubicBezTo>
-                <a:cubicBezTo>
-                  <a:pt x="8736966" y="1099406"/>
-                  <a:pt x="8723186" y="1079948"/>
-                  <a:pt x="8699139" y="1087885"/>
-                </a:cubicBezTo>
-                <a:cubicBezTo>
-                  <a:pt x="8688630" y="1095506"/>
-                  <a:pt x="8680324" y="1097539"/>
-                  <a:pt x="8667273" y="1092062"/>
-                </a:cubicBezTo>
-                <a:cubicBezTo>
-                  <a:pt x="8619205" y="1128818"/>
-                  <a:pt x="8634590" y="1097116"/>
-                  <a:pt x="8586064" y="1114603"/>
-                </a:cubicBezTo>
-                <a:cubicBezTo>
-                  <a:pt x="8544721" y="1131913"/>
-                  <a:pt x="8496602" y="1145520"/>
-                  <a:pt x="8460312" y="1179878"/>
-                </a:cubicBezTo>
-                <a:cubicBezTo>
-                  <a:pt x="8454266" y="1189140"/>
-                  <a:pt x="8435781" y="1194455"/>
-                  <a:pt x="8419023" y="1191748"/>
-                </a:cubicBezTo>
-                <a:cubicBezTo>
-                  <a:pt x="8416138" y="1191283"/>
-                  <a:pt x="8413416" y="1190591"/>
-                  <a:pt x="8410939" y="1189696"/>
-                </a:cubicBezTo>
-                <a:cubicBezTo>
-                  <a:pt x="8390077" y="1213458"/>
-                  <a:pt x="8370324" y="1205397"/>
-                  <a:pt x="8362040" y="1220820"/>
-                </a:cubicBezTo>
-                <a:cubicBezTo>
-                  <a:pt x="8320616" y="1231942"/>
-                  <a:pt x="8281663" y="1222882"/>
-                  <a:pt x="8273677" y="1236495"/>
-                </a:cubicBezTo>
-                <a:cubicBezTo>
-                  <a:pt x="8251358" y="1238573"/>
-                  <a:pt x="8216738" y="1228341"/>
-                  <a:pt x="8204283" y="1243537"/>
-                </a:cubicBezTo>
-                <a:cubicBezTo>
-                  <a:pt x="8198634" y="1233135"/>
-                  <a:pt x="8181550" y="1254947"/>
-                  <a:pt x="8166550" y="1249551"/>
-                </a:cubicBezTo>
-                <a:cubicBezTo>
-                  <a:pt x="8155570" y="1244572"/>
-                  <a:pt x="8147825" y="1250027"/>
-                  <a:pt x="8137785" y="1251636"/>
-                </a:cubicBezTo>
-                <a:cubicBezTo>
-                  <a:pt x="8123427" y="1248361"/>
-                  <a:pt x="8081662" y="1261833"/>
-                  <a:pt x="8071596" y="1269274"/>
-                </a:cubicBezTo>
-                <a:cubicBezTo>
-                  <a:pt x="8048949" y="1293759"/>
-                  <a:pt x="7983924" y="1284712"/>
-                  <a:pt x="7964816" y="1303668"/>
-                </a:cubicBezTo>
-                <a:cubicBezTo>
-                  <a:pt x="7957137" y="1306992"/>
-                  <a:pt x="7949335" y="1308861"/>
-                  <a:pt x="7941495" y="1309821"/>
-                </a:cubicBezTo>
-                <a:lnTo>
-                  <a:pt x="7919123" y="1310466"/>
-                </a:lnTo>
-                <a:lnTo>
-                  <a:pt x="7911902" y="1306569"/>
-                </a:lnTo>
-                <a:lnTo>
-                  <a:pt x="7898703" y="1309208"/>
-                </a:lnTo>
-                <a:lnTo>
-                  <a:pt x="7894703" y="1308939"/>
-                </a:lnTo>
-                <a:lnTo>
-                  <a:pt x="7872267" y="1308370"/>
-                </a:lnTo>
-                <a:cubicBezTo>
-                  <a:pt x="7886550" y="1330359"/>
-                  <a:pt x="7812648" y="1314851"/>
-                  <a:pt x="7836454" y="1331265"/>
-                </a:cubicBezTo>
-                <a:cubicBezTo>
-                  <a:pt x="7798907" y="1336933"/>
-                  <a:pt x="7831419" y="1351068"/>
-                  <a:pt x="7782451" y="1339601"/>
-                </a:cubicBezTo>
-                <a:cubicBezTo>
-                  <a:pt x="7727636" y="1365002"/>
-                  <a:pt x="7583002" y="1338768"/>
-                  <a:pt x="7542969" y="1372495"/>
-                </a:cubicBezTo>
-                <a:cubicBezTo>
-                  <a:pt x="7546396" y="1360942"/>
-                  <a:pt x="7492851" y="1424323"/>
-                  <a:pt x="7476832" y="1431655"/>
-                </a:cubicBezTo>
-                <a:cubicBezTo>
-                  <a:pt x="7439619" y="1443703"/>
-                  <a:pt x="7425596" y="1454661"/>
-                  <a:pt x="7370237" y="1474339"/>
-                </a:cubicBezTo>
-                <a:cubicBezTo>
-                  <a:pt x="7316246" y="1485928"/>
-                  <a:pt x="7281903" y="1512712"/>
-                  <a:pt x="7222223" y="1510199"/>
-                </a:cubicBezTo>
-                <a:cubicBezTo>
-                  <a:pt x="7221190" y="1514030"/>
-                  <a:pt x="7218885" y="1517398"/>
-                  <a:pt x="7215703" y="1520424"/>
-                </a:cubicBezTo>
-                <a:lnTo>
-                  <a:pt x="7204548" y="1528145"/>
-                </a:lnTo>
-                <a:lnTo>
-                  <a:pt x="7202038" y="1527954"/>
-                </a:lnTo>
-                <a:lnTo>
-                  <a:pt x="7173860" y="1541605"/>
-                </a:lnTo>
-                <a:lnTo>
-                  <a:pt x="7155079" y="1552495"/>
-                </a:lnTo>
-                <a:lnTo>
-                  <a:pt x="7149757" y="1552732"/>
-                </a:lnTo>
-                <a:cubicBezTo>
-                  <a:pt x="7141378" y="1554948"/>
-                  <a:pt x="7115959" y="1563256"/>
-                  <a:pt x="7104804" y="1565792"/>
-                </a:cubicBezTo>
-                <a:cubicBezTo>
-                  <a:pt x="7099811" y="1550850"/>
-                  <a:pt x="7096935" y="1561973"/>
-                  <a:pt x="7082824" y="1567947"/>
-                </a:cubicBezTo>
-                <a:cubicBezTo>
-                  <a:pt x="7071919" y="1546070"/>
-                  <a:pt x="7039417" y="1570606"/>
-                  <a:pt x="7021520" y="1562334"/>
-                </a:cubicBezTo>
-                <a:cubicBezTo>
-                  <a:pt x="7011400" y="1567217"/>
-                  <a:pt x="7000495" y="1571981"/>
-                  <a:pt x="6988956" y="1576442"/>
-                </a:cubicBezTo>
-                <a:lnTo>
-                  <a:pt x="6981922" y="1578821"/>
-                </a:lnTo>
-                <a:lnTo>
-                  <a:pt x="6981583" y="1578678"/>
-                </a:lnTo>
-                <a:cubicBezTo>
-                  <a:pt x="6979627" y="1578791"/>
-                  <a:pt x="6977153" y="1579421"/>
-                  <a:pt x="6973762" y="1580811"/>
-                </a:cubicBezTo>
-                <a:lnTo>
-                  <a:pt x="6969093" y="1583157"/>
-                </a:lnTo>
-                <a:lnTo>
-                  <a:pt x="6890037" y="1575825"/>
-                </a:lnTo>
-                <a:cubicBezTo>
-                  <a:pt x="6849459" y="1579997"/>
-                  <a:pt x="6820022" y="1566922"/>
-                  <a:pt x="6785054" y="1582200"/>
-                </a:cubicBezTo>
-                <a:cubicBezTo>
-                  <a:pt x="6747047" y="1586037"/>
-                  <a:pt x="6712794" y="1582954"/>
-                  <a:pt x="6681692" y="1591296"/>
-                </a:cubicBezTo>
-                <a:cubicBezTo>
-                  <a:pt x="6667557" y="1587501"/>
-                  <a:pt x="6654822" y="1586753"/>
-                  <a:pt x="6644556" y="1595940"/>
-                </a:cubicBezTo>
-                <a:cubicBezTo>
-                  <a:pt x="6608615" y="1597269"/>
-                  <a:pt x="6597697" y="1587005"/>
-                  <a:pt x="6577106" y="1598261"/>
-                </a:cubicBezTo>
-                <a:lnTo>
-                  <a:pt x="6544183" y="1596149"/>
-                </a:lnTo>
-                <a:lnTo>
-                  <a:pt x="6540921" y="1593857"/>
-                </a:lnTo>
-                <a:lnTo>
-                  <a:pt x="6535046" y="1593283"/>
-                </a:lnTo>
-                <a:lnTo>
-                  <a:pt x="6519853" y="1595771"/>
-                </a:lnTo>
-                <a:lnTo>
-                  <a:pt x="6514280" y="1597376"/>
-                </a:lnTo>
-                <a:cubicBezTo>
-                  <a:pt x="6510385" y="1598232"/>
-                  <a:pt x="6507735" y="1598481"/>
-                  <a:pt x="6505824" y="1598298"/>
-                </a:cubicBezTo>
-                <a:lnTo>
-                  <a:pt x="6505573" y="1598109"/>
-                </a:lnTo>
-                <a:lnTo>
-                  <a:pt x="6497741" y="1599392"/>
-                </a:lnTo>
-                <a:cubicBezTo>
-                  <a:pt x="6484628" y="1602044"/>
-                  <a:pt x="6471968" y="1605085"/>
-                  <a:pt x="6459992" y="1608358"/>
-                </a:cubicBezTo>
-                <a:cubicBezTo>
-                  <a:pt x="6447037" y="1597612"/>
-                  <a:pt x="6404274" y="1616787"/>
-                  <a:pt x="6404572" y="1593771"/>
-                </a:cubicBezTo>
-                <a:cubicBezTo>
-                  <a:pt x="6388277" y="1597519"/>
-                  <a:pt x="6380141" y="1607970"/>
-                  <a:pt x="6382671" y="1592612"/>
-                </a:cubicBezTo>
-                <a:lnTo>
-                  <a:pt x="6369843" y="1590015"/>
-                </a:lnTo>
-                <a:lnTo>
-                  <a:pt x="6269740" y="1614633"/>
-                </a:lnTo>
-                <a:lnTo>
-                  <a:pt x="6255405" y="1620529"/>
-                </a:lnTo>
-                <a:cubicBezTo>
-                  <a:pt x="6250911" y="1623016"/>
-                  <a:pt x="6247090" y="1625968"/>
-                  <a:pt x="6244248" y="1629561"/>
-                </a:cubicBezTo>
-                <a:cubicBezTo>
-                  <a:pt x="6188859" y="1618246"/>
-                  <a:pt x="6143250" y="1639346"/>
-                  <a:pt x="6086396" y="1642666"/>
-                </a:cubicBezTo>
-                <a:cubicBezTo>
-                  <a:pt x="6024311" y="1653696"/>
-                  <a:pt x="5889522" y="1686499"/>
-                  <a:pt x="5867429" y="1695554"/>
-                </a:cubicBezTo>
-                <a:cubicBezTo>
-                  <a:pt x="5848669" y="1700350"/>
-                  <a:pt x="5763994" y="1699795"/>
-                  <a:pt x="5772864" y="1689002"/>
-                </a:cubicBezTo>
-                <a:cubicBezTo>
-                  <a:pt x="5718480" y="1716048"/>
-                  <a:pt x="5694188" y="1696562"/>
-                  <a:pt x="5629833" y="1713273"/>
-                </a:cubicBezTo>
-                <a:lnTo>
-                  <a:pt x="5504771" y="1725744"/>
-                </a:lnTo>
-                <a:lnTo>
-                  <a:pt x="5490967" y="1726367"/>
-                </a:lnTo>
-                <a:lnTo>
-                  <a:pt x="5486015" y="1721481"/>
-                </a:lnTo>
-                <a:lnTo>
-                  <a:pt x="5439364" y="1721349"/>
-                </a:lnTo>
-                <a:cubicBezTo>
-                  <a:pt x="5418850" y="1733129"/>
-                  <a:pt x="5381503" y="1725668"/>
-                  <a:pt x="5350025" y="1729885"/>
-                </a:cubicBezTo>
-                <a:lnTo>
-                  <a:pt x="5336104" y="1734377"/>
-                </a:lnTo>
-                <a:lnTo>
-                  <a:pt x="5245234" y="1738520"/>
-                </a:lnTo>
-                <a:lnTo>
-                  <a:pt x="5182955" y="1744622"/>
-                </a:lnTo>
-                <a:lnTo>
-                  <a:pt x="5169506" y="1748993"/>
-                </a:lnTo>
-                <a:lnTo>
-                  <a:pt x="5154299" y="1744080"/>
-                </a:lnTo>
-                <a:cubicBezTo>
-                  <a:pt x="5152463" y="1742751"/>
-                  <a:pt x="5150989" y="1741283"/>
-                  <a:pt x="5149917" y="1739727"/>
-                </a:cubicBezTo>
-                <a:lnTo>
-                  <a:pt x="5100319" y="1745797"/>
-                </a:lnTo>
-                <a:lnTo>
-                  <a:pt x="5094361" y="1745767"/>
-                </a:lnTo>
-                <a:lnTo>
-                  <a:pt x="5053410" y="1742790"/>
-                </a:lnTo>
-                <a:lnTo>
-                  <a:pt x="4992711" y="1734075"/>
-                </a:lnTo>
-                <a:cubicBezTo>
-                  <a:pt x="4972764" y="1728527"/>
-                  <a:pt x="4955480" y="1708667"/>
-                  <a:pt x="4930098" y="1717312"/>
-                </a:cubicBezTo>
-                <a:cubicBezTo>
-                  <a:pt x="4936142" y="1706767"/>
-                  <a:pt x="4900350" y="1719438"/>
-                  <a:pt x="4893834" y="1710028"/>
-                </a:cubicBezTo>
-                <a:cubicBezTo>
-                  <a:pt x="4890113" y="1702277"/>
-                  <a:pt x="4878389" y="1704314"/>
-                  <a:pt x="4868730" y="1702384"/>
-                </a:cubicBezTo>
-                <a:cubicBezTo>
-                  <a:pt x="4860577" y="1694955"/>
-                  <a:pt x="4813519" y="1692594"/>
-                  <a:pt x="4797925" y="1695535"/>
-                </a:cubicBezTo>
-                <a:cubicBezTo>
-                  <a:pt x="4754973" y="1708626"/>
-                  <a:pt x="4712186" y="1679830"/>
-                  <a:pt x="4677670" y="1689453"/>
-                </a:cubicBezTo>
-                <a:cubicBezTo>
-                  <a:pt x="4650390" y="1686902"/>
-                  <a:pt x="4641786" y="1682702"/>
-                  <a:pt x="4634248" y="1680227"/>
-                </a:cubicBezTo>
-                <a:lnTo>
-                  <a:pt x="4632434" y="1674607"/>
-                </a:lnTo>
-                <a:lnTo>
-                  <a:pt x="4619204" y="1672507"/>
-                </a:lnTo>
-                <a:lnTo>
-                  <a:pt x="4616283" y="1670977"/>
-                </a:lnTo>
-                <a:cubicBezTo>
-                  <a:pt x="4610716" y="1668036"/>
-                  <a:pt x="4605090" y="1665277"/>
-                  <a:pt x="4598926" y="1663178"/>
-                </a:cubicBezTo>
-                <a:cubicBezTo>
-                  <a:pt x="4588025" y="1686237"/>
-                  <a:pt x="4544698" y="1649138"/>
-                  <a:pt x="4547069" y="1670642"/>
-                </a:cubicBezTo>
-                <a:lnTo>
-                  <a:pt x="4523516" y="1669785"/>
-                </a:lnTo>
-                <a:lnTo>
-                  <a:pt x="4500586" y="1675912"/>
-                </a:lnTo>
-                <a:lnTo>
-                  <a:pt x="4488196" y="1683463"/>
-                </a:lnTo>
-                <a:lnTo>
-                  <a:pt x="4445463" y="1695634"/>
-                </a:lnTo>
-                <a:lnTo>
-                  <a:pt x="4446550" y="1680538"/>
-                </a:lnTo>
-                <a:lnTo>
-                  <a:pt x="4365375" y="1697935"/>
-                </a:lnTo>
-                <a:lnTo>
-                  <a:pt x="4305123" y="1714185"/>
-                </a:lnTo>
-                <a:lnTo>
-                  <a:pt x="4292665" y="1720703"/>
-                </a:lnTo>
-                <a:lnTo>
-                  <a:pt x="4276789" y="1718367"/>
-                </a:lnTo>
-                <a:cubicBezTo>
-                  <a:pt x="4274740" y="1717359"/>
-                  <a:pt x="4273021" y="1716157"/>
-                  <a:pt x="4271683" y="1714801"/>
-                </a:cubicBezTo>
-                <a:lnTo>
-                  <a:pt x="4223918" y="1728936"/>
-                </a:lnTo>
-                <a:lnTo>
-                  <a:pt x="4218039" y="1729885"/>
-                </a:lnTo>
-                <a:lnTo>
-                  <a:pt x="4177153" y="1733691"/>
-                </a:lnTo>
-                <a:lnTo>
-                  <a:pt x="4051032" y="1728886"/>
-                </a:lnTo>
-                <a:cubicBezTo>
-                  <a:pt x="4055072" y="1717510"/>
-                  <a:pt x="4022108" y="1735873"/>
-                  <a:pt x="4013978" y="1727679"/>
-                </a:cubicBezTo>
-                <a:cubicBezTo>
-                  <a:pt x="4008905" y="1720660"/>
-                  <a:pt x="3997723" y="1724594"/>
-                  <a:pt x="3987857" y="1724282"/>
-                </a:cubicBezTo>
-                <a:cubicBezTo>
-                  <a:pt x="3978476" y="1718309"/>
-                  <a:pt x="3931683" y="1723723"/>
-                  <a:pt x="3916852" y="1729184"/>
-                </a:cubicBezTo>
-                <a:cubicBezTo>
-                  <a:pt x="3876910" y="1749138"/>
-                  <a:pt x="3829523" y="1727824"/>
-                  <a:pt x="3797263" y="1742976"/>
-                </a:cubicBezTo>
-                <a:cubicBezTo>
-                  <a:pt x="3769922" y="1744951"/>
-                  <a:pt x="3760682" y="1742230"/>
-                  <a:pt x="3752806" y="1741033"/>
-                </a:cubicBezTo>
-                <a:lnTo>
-                  <a:pt x="3749997" y="1735799"/>
-                </a:lnTo>
-                <a:lnTo>
-                  <a:pt x="3736582" y="1735907"/>
-                </a:lnTo>
-                <a:lnTo>
-                  <a:pt x="3733428" y="1734881"/>
-                </a:lnTo>
-                <a:cubicBezTo>
-                  <a:pt x="3727408" y="1732899"/>
-                  <a:pt x="3721365" y="1731108"/>
-                  <a:pt x="3714911" y="1730056"/>
-                </a:cubicBezTo>
-                <a:cubicBezTo>
-                  <a:pt x="3708355" y="1754554"/>
-                  <a:pt x="3658933" y="1725152"/>
-                  <a:pt x="3665172" y="1745936"/>
-                </a:cubicBezTo>
-                <a:cubicBezTo>
-                  <a:pt x="3628569" y="1744420"/>
-                  <a:pt x="3583742" y="1775884"/>
-                  <a:pt x="3552006" y="1755220"/>
-                </a:cubicBezTo>
-                <a:cubicBezTo>
-                  <a:pt x="3497522" y="1758390"/>
-                  <a:pt x="3448310" y="1757433"/>
-                  <a:pt x="3390301" y="1762546"/>
-                </a:cubicBezTo>
-                <a:cubicBezTo>
-                  <a:pt x="3345266" y="1774524"/>
-                  <a:pt x="3297039" y="1758531"/>
-                  <a:pt x="3264312" y="1774620"/>
-                </a:cubicBezTo>
-                <a:cubicBezTo>
-                  <a:pt x="3212634" y="1771139"/>
-                  <a:pt x="3147905" y="1780248"/>
-                  <a:pt x="3106901" y="1804264"/>
-                </a:cubicBezTo>
-                <a:cubicBezTo>
-                  <a:pt x="3051355" y="1805490"/>
-                  <a:pt x="3041708" y="1820368"/>
-                  <a:pt x="2993303" y="1806542"/>
-                </a:cubicBezTo>
-                <a:cubicBezTo>
-                  <a:pt x="2989182" y="1810139"/>
-                  <a:pt x="2984377" y="1813039"/>
-                  <a:pt x="2979115" y="1815432"/>
-                </a:cubicBezTo>
-                <a:lnTo>
-                  <a:pt x="2963118" y="1820962"/>
-                </a:lnTo>
-                <a:lnTo>
-                  <a:pt x="2961156" y="1820297"/>
-                </a:lnTo>
-                <a:lnTo>
-                  <a:pt x="2925719" y="1828468"/>
-                </a:lnTo>
-                <a:lnTo>
-                  <a:pt x="2857951" y="1842496"/>
-                </a:lnTo>
-                <a:lnTo>
-                  <a:pt x="2857427" y="1841591"/>
-                </a:lnTo>
-                <a:cubicBezTo>
-                  <a:pt x="2855386" y="1839734"/>
-                  <a:pt x="2852250" y="1838690"/>
-                  <a:pt x="2846731" y="1839316"/>
-                </a:cubicBezTo>
-                <a:cubicBezTo>
-                  <a:pt x="2855175" y="1823564"/>
-                  <a:pt x="2843311" y="1834035"/>
-                  <a:pt x="2826290" y="1837274"/>
-                </a:cubicBezTo>
-                <a:cubicBezTo>
-                  <a:pt x="2835609" y="1813530"/>
-                  <a:pt x="2787284" y="1831665"/>
-                  <a:pt x="2779146" y="1820071"/>
-                </a:cubicBezTo>
-                <a:cubicBezTo>
-                  <a:pt x="2766432" y="1822985"/>
-                  <a:pt x="2753158" y="1825635"/>
-                  <a:pt x="2739608" y="1827861"/>
-                </a:cubicBezTo>
-                <a:lnTo>
-                  <a:pt x="2731631" y="1828881"/>
-                </a:lnTo>
-                <a:cubicBezTo>
-                  <a:pt x="2731575" y="1828813"/>
-                  <a:pt x="2731521" y="1828744"/>
-                  <a:pt x="2731464" y="1828677"/>
-                </a:cubicBezTo>
-                <a:cubicBezTo>
-                  <a:pt x="2729715" y="1828415"/>
-                  <a:pt x="2727085" y="1828569"/>
-                  <a:pt x="2723037" y="1829303"/>
-                </a:cubicBezTo>
-                <a:lnTo>
-                  <a:pt x="2701616" y="1832725"/>
-                </a:lnTo>
-                <a:lnTo>
-                  <a:pt x="2696239" y="1831904"/>
-                </a:lnTo>
-                <a:lnTo>
-                  <a:pt x="2663445" y="1825958"/>
-                </a:lnTo>
-                <a:cubicBezTo>
-                  <a:pt x="2641260" y="1825904"/>
-                  <a:pt x="2595040" y="1827674"/>
-                  <a:pt x="2560925" y="1829094"/>
-                </a:cubicBezTo>
-                <a:cubicBezTo>
-                  <a:pt x="2527977" y="1836499"/>
-                  <a:pt x="2496507" y="1831991"/>
-                  <a:pt x="2458739" y="1834479"/>
-                </a:cubicBezTo>
-                <a:cubicBezTo>
-                  <a:pt x="2419379" y="1848893"/>
-                  <a:pt x="2396428" y="1834257"/>
-                  <a:pt x="2356074" y="1836991"/>
-                </a:cubicBezTo>
-                <a:cubicBezTo>
-                  <a:pt x="2323435" y="1857644"/>
-                  <a:pt x="2325610" y="1826053"/>
-                  <a:pt x="2304241" y="1822021"/>
-                </a:cubicBezTo>
-                <a:lnTo>
-                  <a:pt x="2298362" y="1822125"/>
-                </a:lnTo>
-                <a:lnTo>
-                  <a:pt x="2283527" y="1826361"/>
-                </a:lnTo>
-                <a:lnTo>
-                  <a:pt x="2278150" y="1828604"/>
-                </a:lnTo>
-                <a:cubicBezTo>
-                  <a:pt x="2274371" y="1829907"/>
-                  <a:pt x="2271762" y="1830461"/>
-                  <a:pt x="2269853" y="1830502"/>
-                </a:cubicBezTo>
-                <a:lnTo>
-                  <a:pt x="2269585" y="1830341"/>
-                </a:lnTo>
-                <a:lnTo>
-                  <a:pt x="2225332" y="1845825"/>
-                </a:lnTo>
-                <a:cubicBezTo>
-                  <a:pt x="2211505" y="1836594"/>
-                  <a:pt x="2170867" y="1860661"/>
-                  <a:pt x="2169048" y="1837658"/>
-                </a:cubicBezTo>
-                <a:cubicBezTo>
-                  <a:pt x="2153238" y="1843278"/>
-                  <a:pt x="2146132" y="1854645"/>
-                  <a:pt x="2147231" y="1839027"/>
-                </a:cubicBezTo>
-                <a:cubicBezTo>
-                  <a:pt x="2141901" y="1840465"/>
-                  <a:pt x="2138205" y="1840014"/>
-                  <a:pt x="2135241" y="1838652"/>
-                </a:cubicBezTo>
-                <a:lnTo>
-                  <a:pt x="2099215" y="1850768"/>
-                </a:lnTo>
-                <a:lnTo>
-                  <a:pt x="2094046" y="1850806"/>
-                </a:lnTo>
-                <a:lnTo>
-                  <a:pt x="2071850" y="1861319"/>
-                </a:lnTo>
-                <a:lnTo>
-                  <a:pt x="2039607" y="1874318"/>
-                </a:lnTo>
-                <a:lnTo>
-                  <a:pt x="2037289" y="1874025"/>
-                </a:lnTo>
-                <a:lnTo>
-                  <a:pt x="2023615" y="1881562"/>
-                </a:lnTo>
-                <a:cubicBezTo>
-                  <a:pt x="2019390" y="1884562"/>
-                  <a:pt x="1959668" y="1894795"/>
-                  <a:pt x="1957176" y="1898709"/>
-                </a:cubicBezTo>
-                <a:cubicBezTo>
-                  <a:pt x="1901224" y="1893805"/>
-                  <a:pt x="1914145" y="1913274"/>
-                  <a:pt x="1858081" y="1923144"/>
-                </a:cubicBezTo>
-                <a:cubicBezTo>
-                  <a:pt x="1819487" y="1923227"/>
-                  <a:pt x="1798952" y="1929741"/>
-                  <a:pt x="1738865" y="1944965"/>
-                </a:cubicBezTo>
-                <a:cubicBezTo>
-                  <a:pt x="1698633" y="1955957"/>
-                  <a:pt x="1670491" y="1978862"/>
-                  <a:pt x="1616692" y="1989107"/>
-                </a:cubicBezTo>
-                <a:cubicBezTo>
-                  <a:pt x="1565257" y="2022368"/>
-                  <a:pt x="1474172" y="2022156"/>
-                  <a:pt x="1411898" y="2046254"/>
-                </a:cubicBezTo>
-                <a:cubicBezTo>
-                  <a:pt x="1380237" y="2035952"/>
-                  <a:pt x="1386648" y="2042292"/>
-                  <a:pt x="1375780" y="2047961"/>
-                </a:cubicBezTo>
-                <a:cubicBezTo>
-                  <a:pt x="1375756" y="2047968"/>
-                  <a:pt x="1375731" y="2047974"/>
-                  <a:pt x="1375707" y="2047981"/>
-                </a:cubicBezTo>
-                <a:lnTo>
-                  <a:pt x="1285585" y="2047113"/>
-                </a:lnTo>
-                <a:cubicBezTo>
-                  <a:pt x="1279541" y="2043453"/>
-                  <a:pt x="1272537" y="2040974"/>
-                  <a:pt x="1263658" y="2041397"/>
-                </a:cubicBezTo>
-                <a:cubicBezTo>
-                  <a:pt x="1212454" y="2058890"/>
-                  <a:pt x="1258499" y="2026611"/>
-                  <a:pt x="1170403" y="2033399"/>
-                </a:cubicBezTo>
-                <a:cubicBezTo>
-                  <a:pt x="1166530" y="2036274"/>
-                  <a:pt x="1154254" y="2033463"/>
-                  <a:pt x="1153718" y="2029576"/>
-                </a:cubicBezTo>
-                <a:cubicBezTo>
-                  <a:pt x="1148486" y="2030819"/>
-                  <a:pt x="1137980" y="2038354"/>
-                  <a:pt x="1133937" y="2032149"/>
-                </a:cubicBezTo>
-                <a:cubicBezTo>
-                  <a:pt x="1104720" y="2031606"/>
-                  <a:pt x="1077532" y="2035424"/>
-                  <a:pt x="1054999" y="2043242"/>
-                </a:cubicBezTo>
-                <a:cubicBezTo>
-                  <a:pt x="1024875" y="2038090"/>
-                  <a:pt x="1020473" y="2042711"/>
-                  <a:pt x="1018405" y="2048281"/>
-                </a:cubicBezTo>
-                <a:lnTo>
-                  <a:pt x="1016563" y="2051718"/>
-                </a:lnTo>
-                <a:lnTo>
-                  <a:pt x="1008284" y="2046742"/>
-                </a:lnTo>
-                <a:cubicBezTo>
-                  <a:pt x="999244" y="2043620"/>
-                  <a:pt x="990505" y="2044937"/>
-                  <a:pt x="981974" y="2048363"/>
-                </a:cubicBezTo>
-                <a:lnTo>
-                  <a:pt x="971903" y="2053484"/>
-                </a:lnTo>
-                <a:lnTo>
-                  <a:pt x="954015" y="2052529"/>
-                </a:lnTo>
-                <a:cubicBezTo>
-                  <a:pt x="931960" y="2051365"/>
-                  <a:pt x="861352" y="2046214"/>
-                  <a:pt x="839571" y="2046509"/>
-                </a:cubicBezTo>
-                <a:lnTo>
-                  <a:pt x="823321" y="2054296"/>
-                </a:lnTo>
-                <a:lnTo>
-                  <a:pt x="800990" y="2051523"/>
-                </a:lnTo>
-                <a:cubicBezTo>
-                  <a:pt x="790723" y="2052171"/>
-                  <a:pt x="782268" y="2055403"/>
-                  <a:pt x="776439" y="2062634"/>
-                </a:cubicBezTo>
-                <a:cubicBezTo>
-                  <a:pt x="773155" y="2056184"/>
-                  <a:pt x="769593" y="2059253"/>
-                  <a:pt x="763041" y="2063995"/>
-                </a:cubicBezTo>
-                <a:lnTo>
-                  <a:pt x="757863" y="2065877"/>
-                </a:lnTo>
-                <a:lnTo>
-                  <a:pt x="745053" y="2051831"/>
-                </a:lnTo>
-                <a:lnTo>
-                  <a:pt x="722609" y="2049504"/>
-                </a:lnTo>
-                <a:lnTo>
-                  <a:pt x="717618" y="2042131"/>
-                </a:lnTo>
-                <a:lnTo>
-                  <a:pt x="703285" y="2046808"/>
-                </a:lnTo>
-                <a:cubicBezTo>
-                  <a:pt x="698219" y="2048137"/>
-                  <a:pt x="690058" y="2049926"/>
-                  <a:pt x="680199" y="2051947"/>
-                </a:cubicBezTo>
-                <a:lnTo>
-                  <a:pt x="667351" y="2054469"/>
-                </a:lnTo>
-                <a:lnTo>
-                  <a:pt x="660961" y="2049404"/>
-                </a:lnTo>
-                <a:lnTo>
-                  <a:pt x="638282" y="2060093"/>
-                </a:lnTo>
-                <a:lnTo>
-                  <a:pt x="583551" y="2070197"/>
-                </a:lnTo>
-                <a:cubicBezTo>
-                  <a:pt x="569268" y="2091365"/>
-                  <a:pt x="529124" y="2053106"/>
-                  <a:pt x="525274" y="2079137"/>
-                </a:cubicBezTo>
-                <a:cubicBezTo>
-                  <a:pt x="506495" y="2056498"/>
-                  <a:pt x="440091" y="2069666"/>
-                  <a:pt x="405635" y="2059339"/>
-                </a:cubicBezTo>
-                <a:cubicBezTo>
-                  <a:pt x="397410" y="2069278"/>
-                  <a:pt x="294416" y="2032966"/>
-                  <a:pt x="281555" y="2022847"/>
-                </a:cubicBezTo>
-                <a:cubicBezTo>
-                  <a:pt x="171589" y="1986245"/>
-                  <a:pt x="126791" y="1985528"/>
-                  <a:pt x="98513" y="1969504"/>
-                </a:cubicBezTo>
-                <a:cubicBezTo>
-                  <a:pt x="85544" y="1965247"/>
-                  <a:pt x="73324" y="1958000"/>
-                  <a:pt x="56191" y="1950709"/>
-                </a:cubicBezTo>
-                <a:lnTo>
-                  <a:pt x="0" y="1935789"/>
-                </a:lnTo>
-                <a:close/>
-              </a:path>
-            </a:pathLst>
-          </a:custGeom>
+          </a:prstGeom>
           <a:solidFill>
-            <a:srgbClr val="82766A">
-              <a:alpha val="15000"/>
-            </a:srgbClr>
+            <a:schemeClr val="accent4"/>
           </a:solidFill>
           <a:ln>
             <a:noFill/>
@@ -7788,103 +5489,20 @@
           </a:fontRef>
         </p:style>
         <p:txBody>
-          <a:bodyPr wrap="square" rtlCol="0" anchor="ctr">
-            <a:noAutofit/>
-          </a:bodyPr>
+          <a:bodyPr rtlCol="0" anchor="ctr"/>
           <a:lstStyle/>
           <a:p>
             <a:pPr algn="ctr"/>
-            <a:endParaRPr lang="en-US"/>
-          </a:p>
-        </p:txBody>
-      </p:sp>
-      <p:sp>
-        <p:nvSpPr>
-          <p:cNvPr id="2" name="Title 1">
-            <a:extLst>
-              <a:ext uri="{FF2B5EF4-FFF2-40B4-BE49-F238E27FC236}">
-                <a16:creationId xmlns:a16="http://schemas.microsoft.com/office/drawing/2014/main" id="{D7EA50A9-6E10-1C45-915D-DE60EBE882C7}"/>
-              </a:ext>
-            </a:extLst>
-          </p:cNvPr>
-          <p:cNvSpPr>
-            <a:spLocks noGrp="1"/>
-          </p:cNvSpPr>
-          <p:nvPr>
-            <p:ph type="title"/>
-          </p:nvPr>
-        </p:nvSpPr>
-        <p:spPr>
-          <a:xfrm>
-            <a:off x="1137036" y="548640"/>
-            <a:ext cx="9543405" cy="1188720"/>
-          </a:xfrm>
-        </p:spPr>
-        <p:txBody>
-          <a:bodyPr>
-            <a:normAutofit/>
-          </a:bodyPr>
-          <a:lstStyle/>
-          <a:p>
-            <a:r>
-              <a:rPr lang="en-CZ" dirty="0">
-                <a:solidFill>
-                  <a:schemeClr val="tx1">
-                    <a:lumMod val="85000"/>
-                    <a:lumOff val="15000"/>
-                  </a:schemeClr>
-                </a:solidFill>
-              </a:rPr>
-              <a:t>Proč ? </a:t>
-            </a:r>
-          </a:p>
-        </p:txBody>
-      </p:sp>
-      <p:sp>
-        <p:nvSpPr>
-          <p:cNvPr id="3" name="Content Placeholder 2">
-            <a:extLst>
-              <a:ext uri="{FF2B5EF4-FFF2-40B4-BE49-F238E27FC236}">
-                <a16:creationId xmlns:a16="http://schemas.microsoft.com/office/drawing/2014/main" id="{68C054DB-6FE5-3AD7-0DD7-88C74C71DB40}"/>
-              </a:ext>
-            </a:extLst>
-          </p:cNvPr>
-          <p:cNvSpPr>
-            <a:spLocks noGrp="1"/>
-          </p:cNvSpPr>
-          <p:nvPr>
-            <p:ph idx="1"/>
-          </p:nvPr>
-        </p:nvSpPr>
-        <p:spPr>
-          <a:xfrm>
-            <a:off x="1957987" y="2431765"/>
-            <a:ext cx="8276026" cy="3320031"/>
-          </a:xfrm>
-        </p:spPr>
-        <p:txBody>
-          <a:bodyPr anchor="ctr">
-            <a:normAutofit/>
-          </a:bodyPr>
-          <a:lstStyle/>
-          <a:p>
-            <a:endParaRPr lang="en-CZ" sz="2000">
-              <a:solidFill>
-                <a:schemeClr val="tx1">
-                  <a:lumMod val="85000"/>
-                  <a:lumOff val="15000"/>
-                </a:schemeClr>
-              </a:solidFill>
-            </a:endParaRPr>
-          </a:p>
-        </p:txBody>
-      </p:sp>
-      <p:sp>
-        <p:nvSpPr>
-          <p:cNvPr id="12" name="Freeform: Shape 11">
-            <a:extLst>
-              <a:ext uri="{FF2B5EF4-FFF2-40B4-BE49-F238E27FC236}">
-                <a16:creationId xmlns:a16="http://schemas.microsoft.com/office/drawing/2014/main" id="{142DCE2C-2863-46FA-9BE7-24365A24D9BA}"/>
+            <a:endParaRPr lang="en-US" dirty="0"/>
+          </a:p>
+        </p:txBody>
+      </p:sp>
+      <p:sp>
+        <p:nvSpPr>
+          <p:cNvPr id="31" name="Rectangle 22">
+            <a:extLst>
+              <a:ext uri="{FF2B5EF4-FFF2-40B4-BE49-F238E27FC236}">
+                <a16:creationId xmlns:a16="http://schemas.microsoft.com/office/drawing/2014/main" id="{EE04B5EB-F158-4507-90DD-BD23620C7CC9}"/>
               </a:ext>
               <a:ext uri="{C183D7F6-B498-43B3-948B-1728B52AA6E4}">
                 <adec:decorative xmlns:adec="http://schemas.microsoft.com/office/drawing/2017/decorative" val="1"/>
@@ -7904,1000 +5522,21 @@
         </p:nvSpPr>
         <p:spPr>
           <a:xfrm>
-            <a:off x="2224586" y="5970896"/>
-            <a:ext cx="9967416" cy="887104"/>
+            <a:off x="641774" y="623275"/>
+            <a:ext cx="10905053" cy="5607882"/>
           </a:xfrm>
-          <a:custGeom>
+          <a:prstGeom prst="rect">
             <a:avLst/>
-            <a:gdLst>
-              <a:gd name="connsiteX0" fmla="*/ 4686423 w 9517857"/>
-              <a:gd name="connsiteY0" fmla="*/ 247919 h 918356"/>
-              <a:gd name="connsiteX1" fmla="*/ 4689051 w 9517857"/>
-              <a:gd name="connsiteY1" fmla="*/ 250968 h 918356"/>
-              <a:gd name="connsiteX2" fmla="*/ 4687244 w 9517857"/>
-              <a:gd name="connsiteY2" fmla="*/ 251298 h 918356"/>
-              <a:gd name="connsiteX3" fmla="*/ 4685225 w 9517857"/>
-              <a:gd name="connsiteY3" fmla="*/ 246530 h 918356"/>
-              <a:gd name="connsiteX4" fmla="*/ 4686133 w 9517857"/>
-              <a:gd name="connsiteY4" fmla="*/ 246727 h 918356"/>
-              <a:gd name="connsiteX5" fmla="*/ 4686423 w 9517857"/>
-              <a:gd name="connsiteY5" fmla="*/ 247919 h 918356"/>
-              <a:gd name="connsiteX6" fmla="*/ 9517856 w 9517857"/>
-              <a:gd name="connsiteY6" fmla="*/ 0 h 918356"/>
-              <a:gd name="connsiteX7" fmla="*/ 9517857 w 9517857"/>
-              <a:gd name="connsiteY7" fmla="*/ 12 h 918356"/>
-              <a:gd name="connsiteX8" fmla="*/ 9517857 w 9517857"/>
-              <a:gd name="connsiteY8" fmla="*/ 918356 h 918356"/>
-              <a:gd name="connsiteX9" fmla="*/ 14604 w 9517857"/>
-              <a:gd name="connsiteY9" fmla="*/ 918356 h 918356"/>
-              <a:gd name="connsiteX10" fmla="*/ 12841 w 9517857"/>
-              <a:gd name="connsiteY10" fmla="*/ 917763 h 918356"/>
-              <a:gd name="connsiteX11" fmla="*/ 93 w 9517857"/>
-              <a:gd name="connsiteY11" fmla="*/ 912471 h 918356"/>
-              <a:gd name="connsiteX12" fmla="*/ 58674 w 9517857"/>
-              <a:gd name="connsiteY12" fmla="*/ 890322 h 918356"/>
-              <a:gd name="connsiteX13" fmla="*/ 275005 w 9517857"/>
-              <a:gd name="connsiteY13" fmla="*/ 807229 h 918356"/>
-              <a:gd name="connsiteX14" fmla="*/ 587824 w 9517857"/>
-              <a:gd name="connsiteY14" fmla="*/ 798195 h 918356"/>
-              <a:gd name="connsiteX15" fmla="*/ 651826 w 9517857"/>
-              <a:gd name="connsiteY15" fmla="*/ 738338 h 918356"/>
-              <a:gd name="connsiteX16" fmla="*/ 727985 w 9517857"/>
-              <a:gd name="connsiteY16" fmla="*/ 719826 h 918356"/>
-              <a:gd name="connsiteX17" fmla="*/ 778982 w 9517857"/>
-              <a:gd name="connsiteY17" fmla="*/ 710142 h 918356"/>
-              <a:gd name="connsiteX18" fmla="*/ 849944 w 9517857"/>
-              <a:gd name="connsiteY18" fmla="*/ 717987 h 918356"/>
-              <a:gd name="connsiteX19" fmla="*/ 921659 w 9517857"/>
-              <a:gd name="connsiteY19" fmla="*/ 712695 h 918356"/>
-              <a:gd name="connsiteX20" fmla="*/ 930946 w 9517857"/>
-              <a:gd name="connsiteY20" fmla="*/ 734046 h 918356"/>
-              <a:gd name="connsiteX21" fmla="*/ 986250 w 9517857"/>
-              <a:gd name="connsiteY21" fmla="*/ 713530 h 918356"/>
-              <a:gd name="connsiteX22" fmla="*/ 1013752 w 9517857"/>
-              <a:gd name="connsiteY22" fmla="*/ 713361 h 918356"/>
-              <a:gd name="connsiteX23" fmla="*/ 1023734 w 9517857"/>
-              <a:gd name="connsiteY23" fmla="*/ 718571 h 918356"/>
-              <a:gd name="connsiteX24" fmla="*/ 1063207 w 9517857"/>
-              <a:gd name="connsiteY24" fmla="*/ 715651 h 918356"/>
-              <a:gd name="connsiteX25" fmla="*/ 1081980 w 9517857"/>
-              <a:gd name="connsiteY25" fmla="*/ 738455 h 918356"/>
-              <a:gd name="connsiteX26" fmla="*/ 1218120 w 9517857"/>
-              <a:gd name="connsiteY26" fmla="*/ 713280 h 918356"/>
-              <a:gd name="connsiteX27" fmla="*/ 1397459 w 9517857"/>
-              <a:gd name="connsiteY27" fmla="*/ 691190 h 918356"/>
-              <a:gd name="connsiteX28" fmla="*/ 1580688 w 9517857"/>
-              <a:gd name="connsiteY28" fmla="*/ 693697 h 918356"/>
-              <a:gd name="connsiteX29" fmla="*/ 1772334 w 9517857"/>
-              <a:gd name="connsiteY29" fmla="*/ 710640 h 918356"/>
-              <a:gd name="connsiteX30" fmla="*/ 2002561 w 9517857"/>
-              <a:gd name="connsiteY30" fmla="*/ 659917 h 918356"/>
-              <a:gd name="connsiteX31" fmla="*/ 2135144 w 9517857"/>
-              <a:gd name="connsiteY31" fmla="*/ 636501 h 918356"/>
-              <a:gd name="connsiteX32" fmla="*/ 2440292 w 9517857"/>
-              <a:gd name="connsiteY32" fmla="*/ 593862 h 918356"/>
-              <a:gd name="connsiteX33" fmla="*/ 2547829 w 9517857"/>
-              <a:gd name="connsiteY33" fmla="*/ 566150 h 918356"/>
-              <a:gd name="connsiteX34" fmla="*/ 2658055 w 9517857"/>
-              <a:gd name="connsiteY34" fmla="*/ 578727 h 918356"/>
-              <a:gd name="connsiteX35" fmla="*/ 2693698 w 9517857"/>
-              <a:gd name="connsiteY35" fmla="*/ 560029 h 918356"/>
-              <a:gd name="connsiteX36" fmla="*/ 2699673 w 9517857"/>
-              <a:gd name="connsiteY36" fmla="*/ 556400 h 918356"/>
-              <a:gd name="connsiteX37" fmla="*/ 2727306 w 9517857"/>
-              <a:gd name="connsiteY37" fmla="*/ 550698 h 918356"/>
-              <a:gd name="connsiteX38" fmla="*/ 2730451 w 9517857"/>
-              <a:gd name="connsiteY38" fmla="*/ 538058 h 918356"/>
-              <a:gd name="connsiteX39" fmla="*/ 2768713 w 9517857"/>
-              <a:gd name="connsiteY39" fmla="*/ 521575 h 918356"/>
-              <a:gd name="connsiteX40" fmla="*/ 2820868 w 9517857"/>
-              <a:gd name="connsiteY40" fmla="*/ 514160 h 918356"/>
-              <a:gd name="connsiteX41" fmla="*/ 3073635 w 9517857"/>
-              <a:gd name="connsiteY41" fmla="*/ 491294 h 918356"/>
-              <a:gd name="connsiteX42" fmla="*/ 3222071 w 9517857"/>
-              <a:gd name="connsiteY42" fmla="*/ 470559 h 918356"/>
-              <a:gd name="connsiteX43" fmla="*/ 3274069 w 9517857"/>
-              <a:gd name="connsiteY43" fmla="*/ 451605 h 918356"/>
-              <a:gd name="connsiteX44" fmla="*/ 3349632 w 9517857"/>
-              <a:gd name="connsiteY44" fmla="*/ 432583 h 918356"/>
-              <a:gd name="connsiteX45" fmla="*/ 3479593 w 9517857"/>
-              <a:gd name="connsiteY45" fmla="*/ 390437 h 918356"/>
-              <a:gd name="connsiteX46" fmla="*/ 3660110 w 9517857"/>
-              <a:gd name="connsiteY46" fmla="*/ 348726 h 918356"/>
-              <a:gd name="connsiteX47" fmla="*/ 3750023 w 9517857"/>
-              <a:gd name="connsiteY47" fmla="*/ 370678 h 918356"/>
-              <a:gd name="connsiteX48" fmla="*/ 3844133 w 9517857"/>
-              <a:gd name="connsiteY48" fmla="*/ 360648 h 918356"/>
-              <a:gd name="connsiteX49" fmla="*/ 3913545 w 9517857"/>
-              <a:gd name="connsiteY49" fmla="*/ 344235 h 918356"/>
-              <a:gd name="connsiteX50" fmla="*/ 4266740 w 9517857"/>
-              <a:gd name="connsiteY50" fmla="*/ 361454 h 918356"/>
-              <a:gd name="connsiteX51" fmla="*/ 4430770 w 9517857"/>
-              <a:gd name="connsiteY51" fmla="*/ 342643 h 918356"/>
-              <a:gd name="connsiteX52" fmla="*/ 4512664 w 9517857"/>
-              <a:gd name="connsiteY52" fmla="*/ 319948 h 918356"/>
-              <a:gd name="connsiteX53" fmla="*/ 4616423 w 9517857"/>
-              <a:gd name="connsiteY53" fmla="*/ 290914 h 918356"/>
-              <a:gd name="connsiteX54" fmla="*/ 4691675 w 9517857"/>
-              <a:gd name="connsiteY54" fmla="*/ 254011 h 918356"/>
-              <a:gd name="connsiteX55" fmla="*/ 4689051 w 9517857"/>
-              <a:gd name="connsiteY55" fmla="*/ 250968 h 918356"/>
-              <a:gd name="connsiteX56" fmla="*/ 4719994 w 9517857"/>
-              <a:gd name="connsiteY56" fmla="*/ 245307 h 918356"/>
-              <a:gd name="connsiteX57" fmla="*/ 4752894 w 9517857"/>
-              <a:gd name="connsiteY57" fmla="*/ 239875 h 918356"/>
-              <a:gd name="connsiteX58" fmla="*/ 4769329 w 9517857"/>
-              <a:gd name="connsiteY58" fmla="*/ 233585 h 918356"/>
-              <a:gd name="connsiteX59" fmla="*/ 4775634 w 9517857"/>
-              <a:gd name="connsiteY59" fmla="*/ 234063 h 918356"/>
-              <a:gd name="connsiteX60" fmla="*/ 4790452 w 9517857"/>
-              <a:gd name="connsiteY60" fmla="*/ 233572 h 918356"/>
-              <a:gd name="connsiteX61" fmla="*/ 4789062 w 9517857"/>
-              <a:gd name="connsiteY61" fmla="*/ 241924 h 918356"/>
-              <a:gd name="connsiteX62" fmla="*/ 4827826 w 9517857"/>
-              <a:gd name="connsiteY62" fmla="*/ 246977 h 918356"/>
-              <a:gd name="connsiteX63" fmla="*/ 4892569 w 9517857"/>
-              <a:gd name="connsiteY63" fmla="*/ 249933 h 918356"/>
-              <a:gd name="connsiteX64" fmla="*/ 4896611 w 9517857"/>
-              <a:gd name="connsiteY64" fmla="*/ 240448 h 918356"/>
-              <a:gd name="connsiteX65" fmla="*/ 4917286 w 9517857"/>
-              <a:gd name="connsiteY65" fmla="*/ 243659 h 918356"/>
-              <a:gd name="connsiteX66" fmla="*/ 4981173 w 9517857"/>
-              <a:gd name="connsiteY66" fmla="*/ 247103 h 918356"/>
-              <a:gd name="connsiteX67" fmla="*/ 5060397 w 9517857"/>
-              <a:gd name="connsiteY67" fmla="*/ 263688 h 918356"/>
-              <a:gd name="connsiteX68" fmla="*/ 5252996 w 9517857"/>
-              <a:gd name="connsiteY68" fmla="*/ 270655 h 918356"/>
-              <a:gd name="connsiteX69" fmla="*/ 5358056 w 9517857"/>
-              <a:gd name="connsiteY69" fmla="*/ 247248 h 918356"/>
-              <a:gd name="connsiteX70" fmla="*/ 5426496 w 9517857"/>
-              <a:gd name="connsiteY70" fmla="*/ 235142 h 918356"/>
-              <a:gd name="connsiteX71" fmla="*/ 5497161 w 9517857"/>
-              <a:gd name="connsiteY71" fmla="*/ 228808 h 918356"/>
-              <a:gd name="connsiteX72" fmla="*/ 5826043 w 9517857"/>
-              <a:gd name="connsiteY72" fmla="*/ 148073 h 918356"/>
-              <a:gd name="connsiteX73" fmla="*/ 6013415 w 9517857"/>
-              <a:gd name="connsiteY73" fmla="*/ 137316 h 918356"/>
-              <a:gd name="connsiteX74" fmla="*/ 6080994 w 9517857"/>
-              <a:gd name="connsiteY74" fmla="*/ 142938 h 918356"/>
-              <a:gd name="connsiteX75" fmla="*/ 6194152 w 9517857"/>
-              <a:gd name="connsiteY75" fmla="*/ 151772 h 918356"/>
-              <a:gd name="connsiteX76" fmla="*/ 6281379 w 9517857"/>
-              <a:gd name="connsiteY76" fmla="*/ 181626 h 918356"/>
-              <a:gd name="connsiteX77" fmla="*/ 6374947 w 9517857"/>
-              <a:gd name="connsiteY77" fmla="*/ 179799 h 918356"/>
-              <a:gd name="connsiteX78" fmla="*/ 6448518 w 9517857"/>
-              <a:gd name="connsiteY78" fmla="*/ 164378 h 918356"/>
-              <a:gd name="connsiteX79" fmla="*/ 6544700 w 9517857"/>
-              <a:gd name="connsiteY79" fmla="*/ 167161 h 918356"/>
-              <a:gd name="connsiteX80" fmla="*/ 6648353 w 9517857"/>
-              <a:gd name="connsiteY80" fmla="*/ 172250 h 918356"/>
-              <a:gd name="connsiteX81" fmla="*/ 6736227 w 9517857"/>
-              <a:gd name="connsiteY81" fmla="*/ 173216 h 918356"/>
-              <a:gd name="connsiteX82" fmla="*/ 6977218 w 9517857"/>
-              <a:gd name="connsiteY82" fmla="*/ 184289 h 918356"/>
-              <a:gd name="connsiteX83" fmla="*/ 7065221 w 9517857"/>
-              <a:gd name="connsiteY83" fmla="*/ 227531 h 918356"/>
-              <a:gd name="connsiteX84" fmla="*/ 7366876 w 9517857"/>
-              <a:gd name="connsiteY84" fmla="*/ 248468 h 918356"/>
-              <a:gd name="connsiteX85" fmla="*/ 7565449 w 9517857"/>
-              <a:gd name="connsiteY85" fmla="*/ 258950 h 918356"/>
-              <a:gd name="connsiteX86" fmla="*/ 7599285 w 9517857"/>
-              <a:gd name="connsiteY86" fmla="*/ 266021 h 918356"/>
-              <a:gd name="connsiteX87" fmla="*/ 7644411 w 9517857"/>
-              <a:gd name="connsiteY87" fmla="*/ 258986 h 918356"/>
-              <a:gd name="connsiteX88" fmla="*/ 7825110 w 9517857"/>
-              <a:gd name="connsiteY88" fmla="*/ 229109 h 918356"/>
-              <a:gd name="connsiteX89" fmla="*/ 7965804 w 9517857"/>
-              <a:gd name="connsiteY89" fmla="*/ 190545 h 918356"/>
-              <a:gd name="connsiteX90" fmla="*/ 8147401 w 9517857"/>
-              <a:gd name="connsiteY90" fmla="*/ 205617 h 918356"/>
-              <a:gd name="connsiteX91" fmla="*/ 8256033 w 9517857"/>
-              <a:gd name="connsiteY91" fmla="*/ 193713 h 918356"/>
-              <a:gd name="connsiteX92" fmla="*/ 8410677 w 9517857"/>
-              <a:gd name="connsiteY92" fmla="*/ 172167 h 918356"/>
-              <a:gd name="connsiteX93" fmla="*/ 8617841 w 9517857"/>
-              <a:gd name="connsiteY93" fmla="*/ 155167 h 918356"/>
-              <a:gd name="connsiteX94" fmla="*/ 8715976 w 9517857"/>
-              <a:gd name="connsiteY94" fmla="*/ 178374 h 918356"/>
-              <a:gd name="connsiteX95" fmla="*/ 8778827 w 9517857"/>
-              <a:gd name="connsiteY95" fmla="*/ 172936 h 918356"/>
-              <a:gd name="connsiteX96" fmla="*/ 8840778 w 9517857"/>
-              <a:gd name="connsiteY96" fmla="*/ 143149 h 918356"/>
-              <a:gd name="connsiteX97" fmla="*/ 9010380 w 9517857"/>
-              <a:gd name="connsiteY97" fmla="*/ 91891 h 918356"/>
-              <a:gd name="connsiteX98" fmla="*/ 9110856 w 9517857"/>
-              <a:gd name="connsiteY98" fmla="*/ 70997 h 918356"/>
-              <a:gd name="connsiteX99" fmla="*/ 9268817 w 9517857"/>
-              <a:gd name="connsiteY99" fmla="*/ 53082 h 918356"/>
-              <a:gd name="connsiteX100" fmla="*/ 9316667 w 9517857"/>
-              <a:gd name="connsiteY100" fmla="*/ 45047 h 918356"/>
-              <a:gd name="connsiteX101" fmla="*/ 9428209 w 9517857"/>
-              <a:gd name="connsiteY101" fmla="*/ 29923 h 918356"/>
-            </a:gdLst>
-            <a:ahLst/>
-            <a:cxnLst>
-              <a:cxn ang="0">
-                <a:pos x="connsiteX0" y="connsiteY0"/>
-              </a:cxn>
-              <a:cxn ang="0">
-                <a:pos x="connsiteX1" y="connsiteY1"/>
-              </a:cxn>
-              <a:cxn ang="0">
-                <a:pos x="connsiteX2" y="connsiteY2"/>
-              </a:cxn>
-              <a:cxn ang="0">
-                <a:pos x="connsiteX3" y="connsiteY3"/>
-              </a:cxn>
-              <a:cxn ang="0">
-                <a:pos x="connsiteX4" y="connsiteY4"/>
-              </a:cxn>
-              <a:cxn ang="0">
-                <a:pos x="connsiteX5" y="connsiteY5"/>
-              </a:cxn>
-              <a:cxn ang="0">
-                <a:pos x="connsiteX6" y="connsiteY6"/>
-              </a:cxn>
-              <a:cxn ang="0">
-                <a:pos x="connsiteX7" y="connsiteY7"/>
-              </a:cxn>
-              <a:cxn ang="0">
-                <a:pos x="connsiteX8" y="connsiteY8"/>
-              </a:cxn>
-              <a:cxn ang="0">
-                <a:pos x="connsiteX9" y="connsiteY9"/>
-              </a:cxn>
-              <a:cxn ang="0">
-                <a:pos x="connsiteX10" y="connsiteY10"/>
-              </a:cxn>
-              <a:cxn ang="0">
-                <a:pos x="connsiteX11" y="connsiteY11"/>
-              </a:cxn>
-              <a:cxn ang="0">
-                <a:pos x="connsiteX12" y="connsiteY12"/>
-              </a:cxn>
-              <a:cxn ang="0">
-                <a:pos x="connsiteX13" y="connsiteY13"/>
-              </a:cxn>
-              <a:cxn ang="0">
-                <a:pos x="connsiteX14" y="connsiteY14"/>
-              </a:cxn>
-              <a:cxn ang="0">
-                <a:pos x="connsiteX15" y="connsiteY15"/>
-              </a:cxn>
-              <a:cxn ang="0">
-                <a:pos x="connsiteX16" y="connsiteY16"/>
-              </a:cxn>
-              <a:cxn ang="0">
-                <a:pos x="connsiteX17" y="connsiteY17"/>
-              </a:cxn>
-              <a:cxn ang="0">
-                <a:pos x="connsiteX18" y="connsiteY18"/>
-              </a:cxn>
-              <a:cxn ang="0">
-                <a:pos x="connsiteX19" y="connsiteY19"/>
-              </a:cxn>
-              <a:cxn ang="0">
-                <a:pos x="connsiteX20" y="connsiteY20"/>
-              </a:cxn>
-              <a:cxn ang="0">
-                <a:pos x="connsiteX21" y="connsiteY21"/>
-              </a:cxn>
-              <a:cxn ang="0">
-                <a:pos x="connsiteX22" y="connsiteY22"/>
-              </a:cxn>
-              <a:cxn ang="0">
-                <a:pos x="connsiteX23" y="connsiteY23"/>
-              </a:cxn>
-              <a:cxn ang="0">
-                <a:pos x="connsiteX24" y="connsiteY24"/>
-              </a:cxn>
-              <a:cxn ang="0">
-                <a:pos x="connsiteX25" y="connsiteY25"/>
-              </a:cxn>
-              <a:cxn ang="0">
-                <a:pos x="connsiteX26" y="connsiteY26"/>
-              </a:cxn>
-              <a:cxn ang="0">
-                <a:pos x="connsiteX27" y="connsiteY27"/>
-              </a:cxn>
-              <a:cxn ang="0">
-                <a:pos x="connsiteX28" y="connsiteY28"/>
-              </a:cxn>
-              <a:cxn ang="0">
-                <a:pos x="connsiteX29" y="connsiteY29"/>
-              </a:cxn>
-              <a:cxn ang="0">
-                <a:pos x="connsiteX30" y="connsiteY30"/>
-              </a:cxn>
-              <a:cxn ang="0">
-                <a:pos x="connsiteX31" y="connsiteY31"/>
-              </a:cxn>
-              <a:cxn ang="0">
-                <a:pos x="connsiteX32" y="connsiteY32"/>
-              </a:cxn>
-              <a:cxn ang="0">
-                <a:pos x="connsiteX33" y="connsiteY33"/>
-              </a:cxn>
-              <a:cxn ang="0">
-                <a:pos x="connsiteX34" y="connsiteY34"/>
-              </a:cxn>
-              <a:cxn ang="0">
-                <a:pos x="connsiteX35" y="connsiteY35"/>
-              </a:cxn>
-              <a:cxn ang="0">
-                <a:pos x="connsiteX36" y="connsiteY36"/>
-              </a:cxn>
-              <a:cxn ang="0">
-                <a:pos x="connsiteX37" y="connsiteY37"/>
-              </a:cxn>
-              <a:cxn ang="0">
-                <a:pos x="connsiteX38" y="connsiteY38"/>
-              </a:cxn>
-              <a:cxn ang="0">
-                <a:pos x="connsiteX39" y="connsiteY39"/>
-              </a:cxn>
-              <a:cxn ang="0">
-                <a:pos x="connsiteX40" y="connsiteY40"/>
-              </a:cxn>
-              <a:cxn ang="0">
-                <a:pos x="connsiteX41" y="connsiteY41"/>
-              </a:cxn>
-              <a:cxn ang="0">
-                <a:pos x="connsiteX42" y="connsiteY42"/>
-              </a:cxn>
-              <a:cxn ang="0">
-                <a:pos x="connsiteX43" y="connsiteY43"/>
-              </a:cxn>
-              <a:cxn ang="0">
-                <a:pos x="connsiteX44" y="connsiteY44"/>
-              </a:cxn>
-              <a:cxn ang="0">
-                <a:pos x="connsiteX45" y="connsiteY45"/>
-              </a:cxn>
-              <a:cxn ang="0">
-                <a:pos x="connsiteX46" y="connsiteY46"/>
-              </a:cxn>
-              <a:cxn ang="0">
-                <a:pos x="connsiteX47" y="connsiteY47"/>
-              </a:cxn>
-              <a:cxn ang="0">
-                <a:pos x="connsiteX48" y="connsiteY48"/>
-              </a:cxn>
-              <a:cxn ang="0">
-                <a:pos x="connsiteX49" y="connsiteY49"/>
-              </a:cxn>
-              <a:cxn ang="0">
-                <a:pos x="connsiteX50" y="connsiteY50"/>
-              </a:cxn>
-              <a:cxn ang="0">
-                <a:pos x="connsiteX51" y="connsiteY51"/>
-              </a:cxn>
-              <a:cxn ang="0">
-                <a:pos x="connsiteX52" y="connsiteY52"/>
-              </a:cxn>
-              <a:cxn ang="0">
-                <a:pos x="connsiteX53" y="connsiteY53"/>
-              </a:cxn>
-              <a:cxn ang="0">
-                <a:pos x="connsiteX54" y="connsiteY54"/>
-              </a:cxn>
-              <a:cxn ang="0">
-                <a:pos x="connsiteX55" y="connsiteY55"/>
-              </a:cxn>
-              <a:cxn ang="0">
-                <a:pos x="connsiteX56" y="connsiteY56"/>
-              </a:cxn>
-              <a:cxn ang="0">
-                <a:pos x="connsiteX57" y="connsiteY57"/>
-              </a:cxn>
-              <a:cxn ang="0">
-                <a:pos x="connsiteX58" y="connsiteY58"/>
-              </a:cxn>
-              <a:cxn ang="0">
-                <a:pos x="connsiteX59" y="connsiteY59"/>
-              </a:cxn>
-              <a:cxn ang="0">
-                <a:pos x="connsiteX60" y="connsiteY60"/>
-              </a:cxn>
-              <a:cxn ang="0">
-                <a:pos x="connsiteX61" y="connsiteY61"/>
-              </a:cxn>
-              <a:cxn ang="0">
-                <a:pos x="connsiteX62" y="connsiteY62"/>
-              </a:cxn>
-              <a:cxn ang="0">
-                <a:pos x="connsiteX63" y="connsiteY63"/>
-              </a:cxn>
-              <a:cxn ang="0">
-                <a:pos x="connsiteX64" y="connsiteY64"/>
-              </a:cxn>
-              <a:cxn ang="0">
-                <a:pos x="connsiteX65" y="connsiteY65"/>
-              </a:cxn>
-              <a:cxn ang="0">
-                <a:pos x="connsiteX66" y="connsiteY66"/>
-              </a:cxn>
-              <a:cxn ang="0">
-                <a:pos x="connsiteX67" y="connsiteY67"/>
-              </a:cxn>
-              <a:cxn ang="0">
-                <a:pos x="connsiteX68" y="connsiteY68"/>
-              </a:cxn>
-              <a:cxn ang="0">
-                <a:pos x="connsiteX69" y="connsiteY69"/>
-              </a:cxn>
-              <a:cxn ang="0">
-                <a:pos x="connsiteX70" y="connsiteY70"/>
-              </a:cxn>
-              <a:cxn ang="0">
-                <a:pos x="connsiteX71" y="connsiteY71"/>
-              </a:cxn>
-              <a:cxn ang="0">
-                <a:pos x="connsiteX72" y="connsiteY72"/>
-              </a:cxn>
-              <a:cxn ang="0">
-                <a:pos x="connsiteX73" y="connsiteY73"/>
-              </a:cxn>
-              <a:cxn ang="0">
-                <a:pos x="connsiteX74" y="connsiteY74"/>
-              </a:cxn>
-              <a:cxn ang="0">
-                <a:pos x="connsiteX75" y="connsiteY75"/>
-              </a:cxn>
-              <a:cxn ang="0">
-                <a:pos x="connsiteX76" y="connsiteY76"/>
-              </a:cxn>
-              <a:cxn ang="0">
-                <a:pos x="connsiteX77" y="connsiteY77"/>
-              </a:cxn>
-              <a:cxn ang="0">
-                <a:pos x="connsiteX78" y="connsiteY78"/>
-              </a:cxn>
-              <a:cxn ang="0">
-                <a:pos x="connsiteX79" y="connsiteY79"/>
-              </a:cxn>
-              <a:cxn ang="0">
-                <a:pos x="connsiteX80" y="connsiteY80"/>
-              </a:cxn>
-              <a:cxn ang="0">
-                <a:pos x="connsiteX81" y="connsiteY81"/>
-              </a:cxn>
-              <a:cxn ang="0">
-                <a:pos x="connsiteX82" y="connsiteY82"/>
-              </a:cxn>
-              <a:cxn ang="0">
-                <a:pos x="connsiteX83" y="connsiteY83"/>
-              </a:cxn>
-              <a:cxn ang="0">
-                <a:pos x="connsiteX84" y="connsiteY84"/>
-              </a:cxn>
-              <a:cxn ang="0">
-                <a:pos x="connsiteX85" y="connsiteY85"/>
-              </a:cxn>
-              <a:cxn ang="0">
-                <a:pos x="connsiteX86" y="connsiteY86"/>
-              </a:cxn>
-              <a:cxn ang="0">
-                <a:pos x="connsiteX87" y="connsiteY87"/>
-              </a:cxn>
-              <a:cxn ang="0">
-                <a:pos x="connsiteX88" y="connsiteY88"/>
-              </a:cxn>
-              <a:cxn ang="0">
-                <a:pos x="connsiteX89" y="connsiteY89"/>
-              </a:cxn>
-              <a:cxn ang="0">
-                <a:pos x="connsiteX90" y="connsiteY90"/>
-              </a:cxn>
-              <a:cxn ang="0">
-                <a:pos x="connsiteX91" y="connsiteY91"/>
-              </a:cxn>
-              <a:cxn ang="0">
-                <a:pos x="connsiteX92" y="connsiteY92"/>
-              </a:cxn>
-              <a:cxn ang="0">
-                <a:pos x="connsiteX93" y="connsiteY93"/>
-              </a:cxn>
-              <a:cxn ang="0">
-                <a:pos x="connsiteX94" y="connsiteY94"/>
-              </a:cxn>
-              <a:cxn ang="0">
-                <a:pos x="connsiteX95" y="connsiteY95"/>
-              </a:cxn>
-              <a:cxn ang="0">
-                <a:pos x="connsiteX96" y="connsiteY96"/>
-              </a:cxn>
-              <a:cxn ang="0">
-                <a:pos x="connsiteX97" y="connsiteY97"/>
-              </a:cxn>
-              <a:cxn ang="0">
-                <a:pos x="connsiteX98" y="connsiteY98"/>
-              </a:cxn>
-              <a:cxn ang="0">
-                <a:pos x="connsiteX99" y="connsiteY99"/>
-              </a:cxn>
-              <a:cxn ang="0">
-                <a:pos x="connsiteX100" y="connsiteY100"/>
-              </a:cxn>
-              <a:cxn ang="0">
-                <a:pos x="connsiteX101" y="connsiteY101"/>
-              </a:cxn>
-            </a:cxnLst>
-            <a:rect l="l" t="t" r="r" b="b"/>
-            <a:pathLst>
-              <a:path w="9517857" h="918356">
-                <a:moveTo>
-                  <a:pt x="4686423" y="247919"/>
-                </a:moveTo>
-                <a:lnTo>
-                  <a:pt x="4689051" y="250968"/>
-                </a:lnTo>
-                <a:lnTo>
-                  <a:pt x="4687244" y="251298"/>
-                </a:lnTo>
-                <a:close/>
-                <a:moveTo>
-                  <a:pt x="4685225" y="246530"/>
-                </a:moveTo>
-                <a:cubicBezTo>
-                  <a:pt x="4688837" y="243198"/>
-                  <a:pt x="4687468" y="244598"/>
-                  <a:pt x="4686133" y="246727"/>
-                </a:cubicBezTo>
-                <a:lnTo>
-                  <a:pt x="4686423" y="247919"/>
-                </a:lnTo>
-                <a:close/>
-                <a:moveTo>
-                  <a:pt x="9517856" y="0"/>
-                </a:moveTo>
-                <a:lnTo>
-                  <a:pt x="9517857" y="12"/>
-                </a:lnTo>
-                <a:lnTo>
-                  <a:pt x="9517857" y="918356"/>
-                </a:lnTo>
-                <a:lnTo>
-                  <a:pt x="14604" y="918356"/>
-                </a:lnTo>
-                <a:lnTo>
-                  <a:pt x="12841" y="917763"/>
-                </a:lnTo>
-                <a:cubicBezTo>
-                  <a:pt x="4532" y="914864"/>
-                  <a:pt x="-773" y="912807"/>
-                  <a:pt x="93" y="912471"/>
-                </a:cubicBezTo>
-                <a:cubicBezTo>
-                  <a:pt x="172" y="912298"/>
-                  <a:pt x="58594" y="890495"/>
-                  <a:pt x="58674" y="890322"/>
-                </a:cubicBezTo>
-                <a:cubicBezTo>
-                  <a:pt x="127436" y="929614"/>
-                  <a:pt x="206243" y="828226"/>
-                  <a:pt x="275005" y="807229"/>
-                </a:cubicBezTo>
-                <a:cubicBezTo>
-                  <a:pt x="303983" y="806087"/>
-                  <a:pt x="504960" y="777375"/>
-                  <a:pt x="587824" y="798195"/>
-                </a:cubicBezTo>
-                <a:cubicBezTo>
-                  <a:pt x="598733" y="769348"/>
-                  <a:pt x="682904" y="785924"/>
-                  <a:pt x="651826" y="738338"/>
-                </a:cubicBezTo>
-                <a:cubicBezTo>
-                  <a:pt x="688440" y="737862"/>
-                  <a:pt x="753255" y="750396"/>
-                  <a:pt x="727985" y="719826"/>
-                </a:cubicBezTo>
-                <a:cubicBezTo>
-                  <a:pt x="739648" y="718749"/>
-                  <a:pt x="775717" y="715087"/>
-                  <a:pt x="778982" y="710142"/>
-                </a:cubicBezTo>
-                <a:cubicBezTo>
-                  <a:pt x="779189" y="709407"/>
-                  <a:pt x="849736" y="718721"/>
-                  <a:pt x="849944" y="717987"/>
-                </a:cubicBezTo>
-                <a:lnTo>
-                  <a:pt x="921659" y="712695"/>
-                </a:lnTo>
-                <a:lnTo>
-                  <a:pt x="930946" y="734046"/>
-                </a:lnTo>
-                <a:lnTo>
-                  <a:pt x="986250" y="713530"/>
-                </a:lnTo>
-                <a:lnTo>
-                  <a:pt x="1013752" y="713361"/>
-                </a:lnTo>
-                <a:lnTo>
-                  <a:pt x="1023734" y="718571"/>
-                </a:lnTo>
-                <a:cubicBezTo>
-                  <a:pt x="1033291" y="721276"/>
-                  <a:pt x="1045398" y="721394"/>
-                  <a:pt x="1063207" y="715651"/>
-                </a:cubicBezTo>
-                <a:lnTo>
-                  <a:pt x="1081980" y="738455"/>
-                </a:lnTo>
-                <a:lnTo>
-                  <a:pt x="1218120" y="713280"/>
-                </a:lnTo>
-                <a:cubicBezTo>
-                  <a:pt x="1230137" y="716162"/>
-                  <a:pt x="1387179" y="685179"/>
-                  <a:pt x="1397459" y="691190"/>
-                </a:cubicBezTo>
-                <a:cubicBezTo>
-                  <a:pt x="1490025" y="704984"/>
-                  <a:pt x="1465878" y="715604"/>
-                  <a:pt x="1580688" y="693697"/>
-                </a:cubicBezTo>
-                <a:cubicBezTo>
-                  <a:pt x="1607067" y="704379"/>
-                  <a:pt x="1719477" y="658239"/>
-                  <a:pt x="1772334" y="710640"/>
-                </a:cubicBezTo>
-                <a:cubicBezTo>
-                  <a:pt x="1745536" y="644824"/>
-                  <a:pt x="1976078" y="716436"/>
-                  <a:pt x="2002561" y="659917"/>
-                </a:cubicBezTo>
-                <a:cubicBezTo>
-                  <a:pt x="2045346" y="660357"/>
-                  <a:pt x="2166676" y="654391"/>
-                  <a:pt x="2135144" y="636501"/>
-                </a:cubicBezTo>
-                <a:cubicBezTo>
-                  <a:pt x="2276591" y="665055"/>
-                  <a:pt x="2293173" y="591792"/>
-                  <a:pt x="2440292" y="593862"/>
-                </a:cubicBezTo>
-                <a:cubicBezTo>
-                  <a:pt x="2495160" y="534824"/>
-                  <a:pt x="2473343" y="585644"/>
-                  <a:pt x="2547829" y="566150"/>
-                </a:cubicBezTo>
-                <a:cubicBezTo>
-                  <a:pt x="2545438" y="614169"/>
-                  <a:pt x="2632278" y="528280"/>
-                  <a:pt x="2658055" y="578727"/>
-                </a:cubicBezTo>
-                <a:cubicBezTo>
-                  <a:pt x="2670795" y="573581"/>
-                  <a:pt x="2682322" y="567005"/>
-                  <a:pt x="2693698" y="560029"/>
-                </a:cubicBezTo>
-                <a:lnTo>
-                  <a:pt x="2699673" y="556400"/>
-                </a:lnTo>
-                <a:lnTo>
-                  <a:pt x="2727306" y="550698"/>
-                </a:lnTo>
-                <a:lnTo>
-                  <a:pt x="2730451" y="538058"/>
-                </a:lnTo>
-                <a:lnTo>
-                  <a:pt x="2768713" y="521575"/>
-                </a:lnTo>
-                <a:cubicBezTo>
-                  <a:pt x="2783756" y="517104"/>
-                  <a:pt x="2800788" y="514291"/>
-                  <a:pt x="2820868" y="514160"/>
-                </a:cubicBezTo>
-                <a:cubicBezTo>
-                  <a:pt x="2894791" y="532885"/>
-                  <a:pt x="2981506" y="465507"/>
-                  <a:pt x="3073635" y="491294"/>
-                </a:cubicBezTo>
-                <a:cubicBezTo>
-                  <a:pt x="3106872" y="496624"/>
-                  <a:pt x="3205785" y="487718"/>
-                  <a:pt x="3222071" y="470559"/>
-                </a:cubicBezTo>
-                <a:cubicBezTo>
-                  <a:pt x="3242193" y="465514"/>
-                  <a:pt x="3267163" y="469136"/>
-                  <a:pt x="3274069" y="451605"/>
-                </a:cubicBezTo>
-                <a:cubicBezTo>
-                  <a:pt x="3286659" y="430165"/>
-                  <a:pt x="3363648" y="455571"/>
-                  <a:pt x="3349632" y="432583"/>
-                </a:cubicBezTo>
-                <a:cubicBezTo>
-                  <a:pt x="3404182" y="449847"/>
-                  <a:pt x="3438210" y="404323"/>
-                  <a:pt x="3479593" y="390437"/>
-                </a:cubicBezTo>
-                <a:cubicBezTo>
-                  <a:pt x="3523240" y="408403"/>
-                  <a:pt x="3567027" y="361554"/>
-                  <a:pt x="3660110" y="348726"/>
-                </a:cubicBezTo>
-                <a:cubicBezTo>
-                  <a:pt x="3708299" y="369683"/>
-                  <a:pt x="3662447" y="344775"/>
-                  <a:pt x="3750023" y="370678"/>
-                </a:cubicBezTo>
-                <a:cubicBezTo>
-                  <a:pt x="3752092" y="367132"/>
-                  <a:pt x="3816880" y="365055"/>
-                  <a:pt x="3844133" y="360648"/>
-                </a:cubicBezTo>
-                <a:cubicBezTo>
-                  <a:pt x="3871386" y="356240"/>
-                  <a:pt x="3882848" y="332490"/>
-                  <a:pt x="3913545" y="344235"/>
-                </a:cubicBezTo>
-                <a:cubicBezTo>
-                  <a:pt x="4050255" y="376864"/>
-                  <a:pt x="4159924" y="363190"/>
-                  <a:pt x="4266740" y="361454"/>
-                </a:cubicBezTo>
-                <a:cubicBezTo>
-                  <a:pt x="4385770" y="354374"/>
-                  <a:pt x="4314535" y="340143"/>
-                  <a:pt x="4430770" y="342643"/>
-                </a:cubicBezTo>
-                <a:cubicBezTo>
-                  <a:pt x="4439969" y="322594"/>
-                  <a:pt x="4478290" y="314645"/>
-                  <a:pt x="4512664" y="319948"/>
-                </a:cubicBezTo>
-                <a:cubicBezTo>
-                  <a:pt x="4570011" y="315138"/>
-                  <a:pt x="4549085" y="269599"/>
-                  <a:pt x="4616423" y="290914"/>
-                </a:cubicBezTo>
-                <a:cubicBezTo>
-                  <a:pt x="4599641" y="270277"/>
-                  <a:pt x="4692085" y="269216"/>
-                  <a:pt x="4691675" y="254011"/>
-                </a:cubicBezTo>
-                <a:lnTo>
-                  <a:pt x="4689051" y="250968"/>
-                </a:lnTo>
-                <a:lnTo>
-                  <a:pt x="4719994" y="245307"/>
-                </a:lnTo>
-                <a:cubicBezTo>
-                  <a:pt x="4732635" y="242775"/>
-                  <a:pt x="4745300" y="240335"/>
-                  <a:pt x="4752894" y="239875"/>
-                </a:cubicBezTo>
-                <a:lnTo>
-                  <a:pt x="4769329" y="233585"/>
-                </a:lnTo>
-                <a:lnTo>
-                  <a:pt x="4775634" y="234063"/>
-                </a:lnTo>
-                <a:lnTo>
-                  <a:pt x="4790452" y="233572"/>
-                </a:lnTo>
-                <a:cubicBezTo>
-                  <a:pt x="4789989" y="236356"/>
-                  <a:pt x="4789525" y="239141"/>
-                  <a:pt x="4789062" y="241924"/>
-                </a:cubicBezTo>
-                <a:cubicBezTo>
-                  <a:pt x="4786342" y="249932"/>
-                  <a:pt x="4804560" y="248631"/>
-                  <a:pt x="4827826" y="246977"/>
-                </a:cubicBezTo>
-                <a:cubicBezTo>
-                  <a:pt x="4875782" y="239569"/>
-                  <a:pt x="4874112" y="283413"/>
-                  <a:pt x="4892569" y="249933"/>
-                </a:cubicBezTo>
-                <a:lnTo>
-                  <a:pt x="4896611" y="240448"/>
-                </a:lnTo>
-                <a:lnTo>
-                  <a:pt x="4917286" y="243659"/>
-                </a:lnTo>
-                <a:cubicBezTo>
-                  <a:pt x="4923060" y="243799"/>
-                  <a:pt x="4981729" y="240979"/>
-                  <a:pt x="4981173" y="247103"/>
-                </a:cubicBezTo>
-                <a:cubicBezTo>
-                  <a:pt x="5024880" y="220690"/>
-                  <a:pt x="5014146" y="257963"/>
-                  <a:pt x="5060397" y="263688"/>
-                </a:cubicBezTo>
-                <a:cubicBezTo>
-                  <a:pt x="5093356" y="238589"/>
-                  <a:pt x="5157892" y="275351"/>
-                  <a:pt x="5252996" y="270655"/>
-                </a:cubicBezTo>
-                <a:cubicBezTo>
-                  <a:pt x="5288840" y="241872"/>
-                  <a:pt x="5287005" y="287921"/>
-                  <a:pt x="5358056" y="247248"/>
-                </a:cubicBezTo>
-                <a:cubicBezTo>
-                  <a:pt x="5361752" y="250257"/>
-                  <a:pt x="5403312" y="238215"/>
-                  <a:pt x="5426496" y="235142"/>
-                </a:cubicBezTo>
-                <a:cubicBezTo>
-                  <a:pt x="5449679" y="232069"/>
-                  <a:pt x="5473549" y="245611"/>
-                  <a:pt x="5497161" y="228808"/>
-                </a:cubicBezTo>
-                <a:cubicBezTo>
-                  <a:pt x="5611861" y="172767"/>
-                  <a:pt x="5723211" y="165860"/>
-                  <a:pt x="5826043" y="148073"/>
-                </a:cubicBezTo>
-                <a:cubicBezTo>
-                  <a:pt x="5943127" y="133166"/>
-                  <a:pt x="5872659" y="193078"/>
-                  <a:pt x="6013415" y="137316"/>
-                </a:cubicBezTo>
-                <a:cubicBezTo>
-                  <a:pt x="6031924" y="154783"/>
-                  <a:pt x="6050745" y="154258"/>
-                  <a:pt x="6080994" y="142938"/>
-                </a:cubicBezTo>
-                <a:cubicBezTo>
-                  <a:pt x="6138083" y="137090"/>
-                  <a:pt x="6140195" y="184383"/>
-                  <a:pt x="6194152" y="151772"/>
-                </a:cubicBezTo>
-                <a:cubicBezTo>
-                  <a:pt x="6187280" y="177783"/>
-                  <a:pt x="6304222" y="153410"/>
-                  <a:pt x="6281379" y="181626"/>
-                </a:cubicBezTo>
-                <a:cubicBezTo>
-                  <a:pt x="6321899" y="201819"/>
-                  <a:pt x="6335111" y="162590"/>
-                  <a:pt x="6374947" y="179799"/>
-                </a:cubicBezTo>
-                <a:cubicBezTo>
-                  <a:pt x="6417404" y="181336"/>
-                  <a:pt x="6402484" y="169694"/>
-                  <a:pt x="6448518" y="164378"/>
-                </a:cubicBezTo>
-                <a:cubicBezTo>
-                  <a:pt x="6504958" y="162488"/>
-                  <a:pt x="6493438" y="111203"/>
-                  <a:pt x="6544700" y="167161"/>
-                </a:cubicBezTo>
-                <a:cubicBezTo>
-                  <a:pt x="6601507" y="148697"/>
-                  <a:pt x="6566269" y="164386"/>
-                  <a:pt x="6648353" y="172250"/>
-                </a:cubicBezTo>
-                <a:cubicBezTo>
-                  <a:pt x="6680008" y="155223"/>
-                  <a:pt x="6707960" y="160673"/>
-                  <a:pt x="6736227" y="173216"/>
-                </a:cubicBezTo>
-                <a:cubicBezTo>
-                  <a:pt x="6813963" y="164284"/>
-                  <a:pt x="6888143" y="181296"/>
-                  <a:pt x="6977218" y="184289"/>
-                </a:cubicBezTo>
-                <a:cubicBezTo>
-                  <a:pt x="7040424" y="188318"/>
-                  <a:pt x="7000278" y="216835"/>
-                  <a:pt x="7065221" y="227531"/>
-                </a:cubicBezTo>
-                <a:cubicBezTo>
-                  <a:pt x="7130163" y="238228"/>
-                  <a:pt x="7291878" y="238208"/>
-                  <a:pt x="7366876" y="248468"/>
-                </a:cubicBezTo>
-                <a:cubicBezTo>
-                  <a:pt x="7491356" y="206752"/>
-                  <a:pt x="7367734" y="280166"/>
-                  <a:pt x="7565449" y="258950"/>
-                </a:cubicBezTo>
-                <a:cubicBezTo>
-                  <a:pt x="7575959" y="252432"/>
-                  <a:pt x="7600854" y="257628"/>
-                  <a:pt x="7599285" y="266021"/>
-                </a:cubicBezTo>
-                <a:cubicBezTo>
-                  <a:pt x="7611616" y="262940"/>
-                  <a:pt x="7639946" y="245819"/>
-                  <a:pt x="7644411" y="258986"/>
-                </a:cubicBezTo>
-                <a:cubicBezTo>
-                  <a:pt x="7708015" y="258012"/>
-                  <a:pt x="7770249" y="247724"/>
-                  <a:pt x="7825110" y="229109"/>
-                </a:cubicBezTo>
-                <a:cubicBezTo>
-                  <a:pt x="7949762" y="247028"/>
-                  <a:pt x="7921956" y="197757"/>
-                  <a:pt x="7965804" y="190545"/>
-                </a:cubicBezTo>
-                <a:cubicBezTo>
-                  <a:pt x="8039439" y="213878"/>
-                  <a:pt x="8063651" y="191475"/>
-                  <a:pt x="8147401" y="205617"/>
-                </a:cubicBezTo>
-                <a:cubicBezTo>
-                  <a:pt x="8166453" y="196610"/>
-                  <a:pt x="8225048" y="207099"/>
-                  <a:pt x="8256033" y="193713"/>
-                </a:cubicBezTo>
-                <a:cubicBezTo>
-                  <a:pt x="8311388" y="242017"/>
-                  <a:pt x="8350376" y="178592"/>
-                  <a:pt x="8410677" y="172167"/>
-                </a:cubicBezTo>
-                <a:cubicBezTo>
-                  <a:pt x="8470978" y="165743"/>
-                  <a:pt x="8572470" y="206385"/>
-                  <a:pt x="8617841" y="155167"/>
-                </a:cubicBezTo>
-                <a:cubicBezTo>
-                  <a:pt x="8646050" y="160448"/>
-                  <a:pt x="8664949" y="183631"/>
-                  <a:pt x="8715976" y="178374"/>
-                </a:cubicBezTo>
-                <a:cubicBezTo>
-                  <a:pt x="8737194" y="188216"/>
-                  <a:pt x="8738009" y="189511"/>
-                  <a:pt x="8778827" y="172936"/>
-                </a:cubicBezTo>
-                <a:cubicBezTo>
-                  <a:pt x="8725277" y="146372"/>
-                  <a:pt x="8850819" y="175612"/>
-                  <a:pt x="8840778" y="143149"/>
-                </a:cubicBezTo>
-                <a:cubicBezTo>
-                  <a:pt x="8903519" y="121096"/>
-                  <a:pt x="9021861" y="150359"/>
-                  <a:pt x="9010380" y="91891"/>
-                </a:cubicBezTo>
-                <a:cubicBezTo>
-                  <a:pt x="9027103" y="56852"/>
-                  <a:pt x="9112524" y="108357"/>
-                  <a:pt x="9110856" y="70997"/>
-                </a:cubicBezTo>
-                <a:cubicBezTo>
-                  <a:pt x="9148189" y="94250"/>
-                  <a:pt x="9209809" y="53285"/>
-                  <a:pt x="9268817" y="53082"/>
-                </a:cubicBezTo>
-                <a:cubicBezTo>
-                  <a:pt x="9279135" y="35997"/>
-                  <a:pt x="9292736" y="36520"/>
-                  <a:pt x="9316667" y="45047"/>
-                </a:cubicBezTo>
-                <a:cubicBezTo>
-                  <a:pt x="9352186" y="45862"/>
-                  <a:pt x="9390008" y="39799"/>
-                  <a:pt x="9428209" y="29923"/>
-                </a:cubicBezTo>
-                <a:close/>
-              </a:path>
-            </a:pathLst>
-          </a:custGeom>
-          <a:solidFill>
-            <a:srgbClr val="82766A">
-              <a:alpha val="15000"/>
-            </a:srgbClr>
-          </a:solidFill>
-          <a:ln w="12700" cap="flat" cmpd="sng" algn="ctr">
-            <a:noFill/>
-            <a:prstDash val="solid"/>
-            <a:miter lim="800000"/>
+          </a:prstGeom>
+          <a:noFill/>
+          <a:ln w="19050">
+            <a:solidFill>
+              <a:schemeClr val="tx1">
+                <a:lumMod val="75000"/>
+                <a:lumOff val="25000"/>
+              </a:schemeClr>
+            </a:solidFill>
           </a:ln>
-          <a:effectLst/>
         </p:spPr>
         <p:style>
           <a:lnRef idx="2">
@@ -8921,6 +5560,48 @@
           <a:p>
             <a:pPr algn="ctr"/>
             <a:endParaRPr lang="en-US"/>
+          </a:p>
+        </p:txBody>
+      </p:sp>
+      <p:sp>
+        <p:nvSpPr>
+          <p:cNvPr id="2" name="Title 1">
+            <a:extLst>
+              <a:ext uri="{FF2B5EF4-FFF2-40B4-BE49-F238E27FC236}">
+                <a16:creationId xmlns:a16="http://schemas.microsoft.com/office/drawing/2014/main" id="{D7EA50A9-6E10-1C45-915D-DE60EBE882C7}"/>
+              </a:ext>
+            </a:extLst>
+          </p:cNvPr>
+          <p:cNvSpPr>
+            <a:spLocks noGrp="1"/>
+          </p:cNvSpPr>
+          <p:nvPr>
+            <p:ph type="title"/>
+          </p:nvPr>
+        </p:nvSpPr>
+        <p:spPr>
+          <a:xfrm>
+            <a:off x="1285241" y="1008993"/>
+            <a:ext cx="9231410" cy="3542045"/>
+          </a:xfrm>
+        </p:spPr>
+        <p:txBody>
+          <a:bodyPr vert="horz" lIns="91440" tIns="45720" rIns="91440" bIns="45720" rtlCol="0" anchor="b">
+            <a:normAutofit/>
+          </a:bodyPr>
+          <a:lstStyle/>
+          <a:p>
+            <a:r>
+              <a:rPr lang="en-US" sz="11500" kern="1200">
+                <a:solidFill>
+                  <a:schemeClr val="tx1"/>
+                </a:solidFill>
+                <a:latin typeface="+mj-lt"/>
+                <a:ea typeface="+mj-ea"/>
+                <a:cs typeface="+mj-cs"/>
+              </a:rPr>
+              <a:t>Proč ? </a:t>
+            </a:r>
           </a:p>
         </p:txBody>
       </p:sp>
@@ -9620,9 +6301,14 @@
           <a:lstStyle/>
           <a:p>
             <a:r>
-              <a:rPr lang="en-CZ"/>
+              <a:rPr lang="en-CZ" dirty="0"/>
               <a:t>Mapa</a:t>
             </a:r>
+            <a:r>
+              <a:rPr lang="cs-CZ" dirty="0"/>
+              <a:t> večerky</a:t>
+            </a:r>
+            <a:endParaRPr lang="en-CZ" dirty="0"/>
           </a:p>
         </p:txBody>
       </p:sp>
@@ -9648,6 +6334,180 @@
           <a:lstStyle/>
           <a:p>
             <a:endParaRPr lang="en-CZ" dirty="0"/>
+          </a:p>
+        </p:txBody>
+      </p:sp>
+      <p:pic>
+        <p:nvPicPr>
+          <p:cNvPr id="1026" name="Picture 2" descr="Photo">
+            <a:extLst>
+              <a:ext uri="{FF2B5EF4-FFF2-40B4-BE49-F238E27FC236}">
+                <a16:creationId xmlns:a16="http://schemas.microsoft.com/office/drawing/2014/main" id="{92608CDC-6AAC-4882-2B6D-0C63140E9CE5}"/>
+              </a:ext>
+            </a:extLst>
+          </p:cNvPr>
+          <p:cNvPicPr>
+            <a:picLocks noChangeAspect="1" noChangeArrowheads="1"/>
+          </p:cNvPicPr>
+          <p:nvPr/>
+        </p:nvPicPr>
+        <p:blipFill>
+          <a:blip r:embed="rId2">
+            <a:extLst>
+              <a:ext uri="{28A0092B-C50C-407E-A947-70E740481C1C}">
+                <a14:useLocalDpi xmlns:a14="http://schemas.microsoft.com/office/drawing/2010/main" val="0"/>
+              </a:ext>
+            </a:extLst>
+          </a:blip>
+          <a:srcRect/>
+          <a:stretch>
+            <a:fillRect/>
+          </a:stretch>
+        </p:blipFill>
+        <p:spPr bwMode="auto">
+          <a:xfrm>
+            <a:off x="838200" y="2036560"/>
+            <a:ext cx="5168766" cy="3876575"/>
+          </a:xfrm>
+          <a:prstGeom prst="rect">
+            <a:avLst/>
+          </a:prstGeom>
+          <a:ln w="38100" cap="sq">
+            <a:solidFill>
+              <a:srgbClr val="000000"/>
+            </a:solidFill>
+            <a:prstDash val="solid"/>
+            <a:miter lim="800000"/>
+          </a:ln>
+          <a:effectLst>
+            <a:outerShdw blurRad="50800" dist="38100" dir="2700000" algn="tl" rotWithShape="0">
+              <a:srgbClr val="000000">
+                <a:alpha val="43000"/>
+              </a:srgbClr>
+            </a:outerShdw>
+          </a:effectLst>
+          <a:extLst>
+            <a:ext uri="{909E8E84-426E-40DD-AFC4-6F175D3DCCD1}">
+              <a14:hiddenFill xmlns:a14="http://schemas.microsoft.com/office/drawing/2010/main">
+                <a:solidFill>
+                  <a:srgbClr val="FFFFFF"/>
+                </a:solidFill>
+              </a14:hiddenFill>
+            </a:ext>
+          </a:extLst>
+        </p:spPr>
+      </p:pic>
+      <p:sp>
+        <p:nvSpPr>
+          <p:cNvPr id="4" name="TextovéPole 3">
+            <a:extLst>
+              <a:ext uri="{FF2B5EF4-FFF2-40B4-BE49-F238E27FC236}">
+                <a16:creationId xmlns:a16="http://schemas.microsoft.com/office/drawing/2014/main" id="{C72A75EF-5E5C-F43B-75F1-0E078AC9BC9C}"/>
+              </a:ext>
+            </a:extLst>
+          </p:cNvPr>
+          <p:cNvSpPr txBox="1"/>
+          <p:nvPr/>
+        </p:nvSpPr>
+        <p:spPr>
+          <a:xfrm>
+            <a:off x="2727159" y="5913135"/>
+            <a:ext cx="1026694" cy="369332"/>
+          </a:xfrm>
+          <a:prstGeom prst="rect">
+            <a:avLst/>
+          </a:prstGeom>
+          <a:noFill/>
+        </p:spPr>
+        <p:txBody>
+          <a:bodyPr wrap="square" rtlCol="0">
+            <a:spAutoFit/>
+          </a:bodyPr>
+          <a:lstStyle/>
+          <a:p>
+            <a:r>
+              <a:rPr lang="cs-CZ" dirty="0"/>
+              <a:t>Inspirace </a:t>
+            </a:r>
+          </a:p>
+        </p:txBody>
+      </p:sp>
+      <p:pic>
+        <p:nvPicPr>
+          <p:cNvPr id="6" name="Obrázek 5">
+            <a:extLst>
+              <a:ext uri="{FF2B5EF4-FFF2-40B4-BE49-F238E27FC236}">
+                <a16:creationId xmlns:a16="http://schemas.microsoft.com/office/drawing/2014/main" id="{A779CA1A-A1F4-8132-F480-6C063DD89E79}"/>
+              </a:ext>
+            </a:extLst>
+          </p:cNvPr>
+          <p:cNvPicPr>
+            <a:picLocks noChangeAspect="1"/>
+          </p:cNvPicPr>
+          <p:nvPr/>
+        </p:nvPicPr>
+        <p:blipFill>
+          <a:blip r:embed="rId3"/>
+          <a:stretch>
+            <a:fillRect/>
+          </a:stretch>
+        </p:blipFill>
+        <p:spPr>
+          <a:xfrm>
+            <a:off x="6426630" y="2194560"/>
+            <a:ext cx="5292809" cy="2995068"/>
+          </a:xfrm>
+          <a:prstGeom prst="rect">
+            <a:avLst/>
+          </a:prstGeom>
+          <a:ln w="38100" cap="sq">
+            <a:solidFill>
+              <a:srgbClr val="000000"/>
+            </a:solidFill>
+            <a:prstDash val="solid"/>
+            <a:miter lim="800000"/>
+          </a:ln>
+          <a:effectLst>
+            <a:outerShdw blurRad="50800" dist="38100" dir="2700000" algn="tl" rotWithShape="0">
+              <a:srgbClr val="000000">
+                <a:alpha val="43000"/>
+              </a:srgbClr>
+            </a:outerShdw>
+          </a:effectLst>
+        </p:spPr>
+      </p:pic>
+      <p:sp>
+        <p:nvSpPr>
+          <p:cNvPr id="7" name="TextovéPole 6">
+            <a:extLst>
+              <a:ext uri="{FF2B5EF4-FFF2-40B4-BE49-F238E27FC236}">
+                <a16:creationId xmlns:a16="http://schemas.microsoft.com/office/drawing/2014/main" id="{C895C9B8-6B9F-7027-3789-6014A6F7EBBB}"/>
+              </a:ext>
+            </a:extLst>
+          </p:cNvPr>
+          <p:cNvSpPr txBox="1"/>
+          <p:nvPr/>
+        </p:nvSpPr>
+        <p:spPr>
+          <a:xfrm>
+            <a:off x="8110086" y="5189628"/>
+            <a:ext cx="3243714" cy="369332"/>
+          </a:xfrm>
+          <a:prstGeom prst="rect">
+            <a:avLst/>
+          </a:prstGeom>
+          <a:noFill/>
+        </p:spPr>
+        <p:txBody>
+          <a:bodyPr wrap="square" rtlCol="0">
+            <a:spAutoFit/>
+          </a:bodyPr>
+          <a:lstStyle/>
+          <a:p>
+            <a:r>
+              <a:rPr lang="cs-CZ" dirty="0"/>
+              <a:t>Nedokončený model </a:t>
+            </a:r>
           </a:p>
         </p:txBody>
       </p:sp>
@@ -9655,6 +6515,958 @@
     <p:extLst>
       <p:ext uri="{BB962C8B-B14F-4D97-AF65-F5344CB8AC3E}">
         <p14:creationId xmlns:p14="http://schemas.microsoft.com/office/powerpoint/2010/main" val="2474715559"/>
+      </p:ext>
+    </p:extLst>
+  </p:cSld>
+  <p:clrMapOvr>
+    <a:masterClrMapping/>
+  </p:clrMapOvr>
+</p:sld>
+</file>
+
+<file path=ppt/slides/slide5.xml><?xml version="1.0" encoding="utf-8"?>
+<p:sld xmlns:a="http://schemas.openxmlformats.org/drawingml/2006/main" xmlns:r="http://schemas.openxmlformats.org/officeDocument/2006/relationships" xmlns:p="http://schemas.openxmlformats.org/presentationml/2006/main">
+  <p:cSld>
+    <p:bg>
+      <p:bgPr>
+        <a:solidFill>
+          <a:schemeClr val="bg1"/>
+        </a:solidFill>
+        <a:effectLst/>
+      </p:bgPr>
+    </p:bg>
+    <p:spTree>
+      <p:nvGrpSpPr>
+        <p:cNvPr id="1" name=""/>
+        <p:cNvGrpSpPr/>
+        <p:nvPr/>
+      </p:nvGrpSpPr>
+      <p:grpSpPr>
+        <a:xfrm>
+          <a:off x="0" y="0"/>
+          <a:ext cx="0" cy="0"/>
+          <a:chOff x="0" y="0"/>
+          <a:chExt cx="0" cy="0"/>
+        </a:xfrm>
+      </p:grpSpPr>
+      <p:sp useBgFill="1">
+        <p:nvSpPr>
+          <p:cNvPr id="8" name="Rectangle 7">
+            <a:extLst>
+              <a:ext uri="{FF2B5EF4-FFF2-40B4-BE49-F238E27FC236}">
+                <a16:creationId xmlns:a16="http://schemas.microsoft.com/office/drawing/2014/main" id="{934F1179-B481-4F9E-BCA3-AFB972070F83}"/>
+              </a:ext>
+              <a:ext uri="{C183D7F6-B498-43B3-948B-1728B52AA6E4}">
+                <adec:decorative xmlns:adec="http://schemas.microsoft.com/office/drawing/2017/decorative" val="1"/>
+              </a:ext>
+            </a:extLst>
+          </p:cNvPr>
+          <p:cNvSpPr>
+            <a:spLocks noGrp="1" noRot="1" noChangeAspect="1" noMove="1" noResize="1" noEditPoints="1" noAdjustHandles="1" noChangeArrowheads="1" noChangeShapeType="1" noTextEdit="1"/>
+          </p:cNvSpPr>
+          <p:nvPr>
+            <p:extLst>
+              <p:ext uri="{386F3935-93C4-4BCD-93E2-E3B085C9AB24}">
+                <p16:designElem xmlns:p16="http://schemas.microsoft.com/office/powerpoint/2015/main" val="1"/>
+              </p:ext>
+            </p:extLst>
+          </p:nvPr>
+        </p:nvSpPr>
+        <p:spPr>
+          <a:xfrm>
+            <a:off x="0" y="0"/>
+            <a:ext cx="12192000" cy="6858000"/>
+          </a:xfrm>
+          <a:prstGeom prst="rect">
+            <a:avLst/>
+          </a:prstGeom>
+          <a:ln>
+            <a:noFill/>
+          </a:ln>
+        </p:spPr>
+        <p:style>
+          <a:lnRef idx="2">
+            <a:schemeClr val="accent1">
+              <a:shade val="50000"/>
+            </a:schemeClr>
+          </a:lnRef>
+          <a:fillRef idx="1">
+            <a:schemeClr val="accent1"/>
+          </a:fillRef>
+          <a:effectRef idx="0">
+            <a:schemeClr val="accent1"/>
+          </a:effectRef>
+          <a:fontRef idx="minor">
+            <a:schemeClr val="lt1"/>
+          </a:fontRef>
+        </p:style>
+        <p:txBody>
+          <a:bodyPr rtlCol="0" anchor="ctr"/>
+          <a:lstStyle/>
+          <a:p>
+            <a:pPr algn="ctr"/>
+            <a:endParaRPr lang="en-US"/>
+          </a:p>
+        </p:txBody>
+      </p:sp>
+      <p:sp>
+        <p:nvSpPr>
+          <p:cNvPr id="10" name="Right Triangle 9">
+            <a:extLst>
+              <a:ext uri="{FF2B5EF4-FFF2-40B4-BE49-F238E27FC236}">
+                <a16:creationId xmlns:a16="http://schemas.microsoft.com/office/drawing/2014/main" id="{827DC2C4-B485-428A-BF4A-472D2967F47F}"/>
+              </a:ext>
+              <a:ext uri="{C183D7F6-B498-43B3-948B-1728B52AA6E4}">
+                <adec:decorative xmlns:adec="http://schemas.microsoft.com/office/drawing/2017/decorative" val="1"/>
+              </a:ext>
+            </a:extLst>
+          </p:cNvPr>
+          <p:cNvSpPr>
+            <a:spLocks noGrp="1" noRot="1" noChangeAspect="1" noMove="1" noResize="1" noEditPoints="1" noAdjustHandles="1" noChangeArrowheads="1" noChangeShapeType="1" noTextEdit="1"/>
+          </p:cNvSpPr>
+          <p:nvPr>
+            <p:extLst>
+              <p:ext uri="{386F3935-93C4-4BCD-93E2-E3B085C9AB24}">
+                <p16:designElem xmlns:p16="http://schemas.microsoft.com/office/powerpoint/2015/main" val="1"/>
+              </p:ext>
+            </p:extLst>
+          </p:nvPr>
+        </p:nvSpPr>
+        <p:spPr>
+          <a:xfrm flipH="1">
+            <a:off x="8576720" y="3335867"/>
+            <a:ext cx="3291840" cy="3200400"/>
+          </a:xfrm>
+          <a:prstGeom prst="rtTriangle">
+            <a:avLst/>
+          </a:prstGeom>
+          <a:solidFill>
+            <a:schemeClr val="accent4"/>
+          </a:solidFill>
+          <a:ln>
+            <a:noFill/>
+          </a:ln>
+        </p:spPr>
+        <p:style>
+          <a:lnRef idx="2">
+            <a:schemeClr val="accent1">
+              <a:shade val="50000"/>
+            </a:schemeClr>
+          </a:lnRef>
+          <a:fillRef idx="1">
+            <a:schemeClr val="accent1"/>
+          </a:fillRef>
+          <a:effectRef idx="0">
+            <a:schemeClr val="accent1"/>
+          </a:effectRef>
+          <a:fontRef idx="minor">
+            <a:schemeClr val="lt1"/>
+          </a:fontRef>
+        </p:style>
+        <p:txBody>
+          <a:bodyPr rtlCol="0" anchor="ctr"/>
+          <a:lstStyle/>
+          <a:p>
+            <a:pPr algn="ctr"/>
+            <a:endParaRPr lang="en-US" dirty="0"/>
+          </a:p>
+        </p:txBody>
+      </p:sp>
+      <p:sp>
+        <p:nvSpPr>
+          <p:cNvPr id="12" name="Rectangle 11">
+            <a:extLst>
+              <a:ext uri="{FF2B5EF4-FFF2-40B4-BE49-F238E27FC236}">
+                <a16:creationId xmlns:a16="http://schemas.microsoft.com/office/drawing/2014/main" id="{EE04B5EB-F158-4507-90DD-BD23620C7CC9}"/>
+              </a:ext>
+              <a:ext uri="{C183D7F6-B498-43B3-948B-1728B52AA6E4}">
+                <adec:decorative xmlns:adec="http://schemas.microsoft.com/office/drawing/2017/decorative" val="1"/>
+              </a:ext>
+            </a:extLst>
+          </p:cNvPr>
+          <p:cNvSpPr>
+            <a:spLocks noGrp="1" noRot="1" noChangeAspect="1" noMove="1" noResize="1" noEditPoints="1" noAdjustHandles="1" noChangeArrowheads="1" noChangeShapeType="1" noTextEdit="1"/>
+          </p:cNvSpPr>
+          <p:nvPr>
+            <p:extLst>
+              <p:ext uri="{386F3935-93C4-4BCD-93E2-E3B085C9AB24}">
+                <p16:designElem xmlns:p16="http://schemas.microsoft.com/office/powerpoint/2015/main" val="1"/>
+              </p:ext>
+            </p:extLst>
+          </p:nvPr>
+        </p:nvSpPr>
+        <p:spPr>
+          <a:xfrm>
+            <a:off x="641774" y="623275"/>
+            <a:ext cx="10905053" cy="5607882"/>
+          </a:xfrm>
+          <a:prstGeom prst="rect">
+            <a:avLst/>
+          </a:prstGeom>
+          <a:noFill/>
+          <a:ln w="19050">
+            <a:solidFill>
+              <a:schemeClr val="tx1">
+                <a:lumMod val="75000"/>
+                <a:lumOff val="25000"/>
+              </a:schemeClr>
+            </a:solidFill>
+          </a:ln>
+        </p:spPr>
+        <p:style>
+          <a:lnRef idx="2">
+            <a:schemeClr val="accent1">
+              <a:shade val="50000"/>
+            </a:schemeClr>
+          </a:lnRef>
+          <a:fillRef idx="1">
+            <a:schemeClr val="accent1"/>
+          </a:fillRef>
+          <a:effectRef idx="0">
+            <a:schemeClr val="accent1"/>
+          </a:effectRef>
+          <a:fontRef idx="minor">
+            <a:schemeClr val="lt1"/>
+          </a:fontRef>
+        </p:style>
+        <p:txBody>
+          <a:bodyPr rtlCol="0" anchor="ctr"/>
+          <a:lstStyle/>
+          <a:p>
+            <a:pPr algn="ctr"/>
+            <a:endParaRPr lang="en-US"/>
+          </a:p>
+        </p:txBody>
+      </p:sp>
+      <p:sp>
+        <p:nvSpPr>
+          <p:cNvPr id="2" name="Nadpis 1">
+            <a:extLst>
+              <a:ext uri="{FF2B5EF4-FFF2-40B4-BE49-F238E27FC236}">
+                <a16:creationId xmlns:a16="http://schemas.microsoft.com/office/drawing/2014/main" id="{826F4194-41DE-FC8A-1A01-383687366643}"/>
+              </a:ext>
+            </a:extLst>
+          </p:cNvPr>
+          <p:cNvSpPr>
+            <a:spLocks noGrp="1"/>
+          </p:cNvSpPr>
+          <p:nvPr>
+            <p:ph type="title"/>
+          </p:nvPr>
+        </p:nvSpPr>
+        <p:spPr>
+          <a:xfrm>
+            <a:off x="1285241" y="1008993"/>
+            <a:ext cx="9231410" cy="3542045"/>
+          </a:xfrm>
+        </p:spPr>
+        <p:txBody>
+          <a:bodyPr vert="horz" lIns="91440" tIns="45720" rIns="91440" bIns="45720" rtlCol="0" anchor="b">
+            <a:normAutofit/>
+          </a:bodyPr>
+          <a:lstStyle/>
+          <a:p>
+            <a:r>
+              <a:rPr lang="en-US" sz="11500" kern="1200" dirty="0" err="1">
+                <a:solidFill>
+                  <a:schemeClr val="tx1"/>
+                </a:solidFill>
+                <a:latin typeface="+mj-lt"/>
+                <a:ea typeface="+mj-ea"/>
+                <a:cs typeface="+mj-cs"/>
+              </a:rPr>
+              <a:t>Ukázka</a:t>
+            </a:r>
+            <a:endParaRPr lang="en-US" sz="11500" kern="1200" dirty="0">
+              <a:solidFill>
+                <a:schemeClr val="tx1"/>
+              </a:solidFill>
+              <a:latin typeface="+mj-lt"/>
+              <a:ea typeface="+mj-ea"/>
+              <a:cs typeface="+mj-cs"/>
+            </a:endParaRPr>
+          </a:p>
+        </p:txBody>
+      </p:sp>
+    </p:spTree>
+    <p:extLst>
+      <p:ext uri="{BB962C8B-B14F-4D97-AF65-F5344CB8AC3E}">
+        <p14:creationId xmlns:p14="http://schemas.microsoft.com/office/powerpoint/2010/main" val="4072452912"/>
+      </p:ext>
+    </p:extLst>
+  </p:cSld>
+  <p:clrMapOvr>
+    <a:masterClrMapping/>
+  </p:clrMapOvr>
+</p:sld>
+</file>
+
+<file path=ppt/slides/slide6.xml><?xml version="1.0" encoding="utf-8"?>
+<p:sld xmlns:a="http://schemas.openxmlformats.org/drawingml/2006/main" xmlns:r="http://schemas.openxmlformats.org/officeDocument/2006/relationships" xmlns:p="http://schemas.openxmlformats.org/presentationml/2006/main">
+  <p:cSld>
+    <p:bg>
+      <p:bgPr>
+        <a:solidFill>
+          <a:schemeClr val="bg1"/>
+        </a:solidFill>
+        <a:effectLst/>
+      </p:bgPr>
+    </p:bg>
+    <p:spTree>
+      <p:nvGrpSpPr>
+        <p:cNvPr id="1" name=""/>
+        <p:cNvGrpSpPr/>
+        <p:nvPr/>
+      </p:nvGrpSpPr>
+      <p:grpSpPr>
+        <a:xfrm>
+          <a:off x="0" y="0"/>
+          <a:ext cx="0" cy="0"/>
+          <a:chOff x="0" y="0"/>
+          <a:chExt cx="0" cy="0"/>
+        </a:xfrm>
+      </p:grpSpPr>
+      <p:sp useBgFill="1">
+        <p:nvSpPr>
+          <p:cNvPr id="8" name="Rectangle 7">
+            <a:extLst>
+              <a:ext uri="{FF2B5EF4-FFF2-40B4-BE49-F238E27FC236}">
+                <a16:creationId xmlns:a16="http://schemas.microsoft.com/office/drawing/2014/main" id="{934F1179-B481-4F9E-BCA3-AFB972070F83}"/>
+              </a:ext>
+              <a:ext uri="{C183D7F6-B498-43B3-948B-1728B52AA6E4}">
+                <adec:decorative xmlns:adec="http://schemas.microsoft.com/office/drawing/2017/decorative" val="1"/>
+              </a:ext>
+            </a:extLst>
+          </p:cNvPr>
+          <p:cNvSpPr>
+            <a:spLocks noGrp="1" noRot="1" noChangeAspect="1" noMove="1" noResize="1" noEditPoints="1" noAdjustHandles="1" noChangeArrowheads="1" noChangeShapeType="1" noTextEdit="1"/>
+          </p:cNvSpPr>
+          <p:nvPr>
+            <p:extLst>
+              <p:ext uri="{386F3935-93C4-4BCD-93E2-E3B085C9AB24}">
+                <p16:designElem xmlns:p16="http://schemas.microsoft.com/office/powerpoint/2015/main" val="1"/>
+              </p:ext>
+            </p:extLst>
+          </p:nvPr>
+        </p:nvSpPr>
+        <p:spPr>
+          <a:xfrm>
+            <a:off x="0" y="0"/>
+            <a:ext cx="12192000" cy="6858000"/>
+          </a:xfrm>
+          <a:prstGeom prst="rect">
+            <a:avLst/>
+          </a:prstGeom>
+          <a:ln>
+            <a:noFill/>
+          </a:ln>
+        </p:spPr>
+        <p:style>
+          <a:lnRef idx="2">
+            <a:schemeClr val="accent1">
+              <a:shade val="50000"/>
+            </a:schemeClr>
+          </a:lnRef>
+          <a:fillRef idx="1">
+            <a:schemeClr val="accent1"/>
+          </a:fillRef>
+          <a:effectRef idx="0">
+            <a:schemeClr val="accent1"/>
+          </a:effectRef>
+          <a:fontRef idx="minor">
+            <a:schemeClr val="lt1"/>
+          </a:fontRef>
+        </p:style>
+        <p:txBody>
+          <a:bodyPr rtlCol="0" anchor="ctr"/>
+          <a:lstStyle/>
+          <a:p>
+            <a:pPr algn="ctr"/>
+            <a:endParaRPr lang="en-US"/>
+          </a:p>
+        </p:txBody>
+      </p:sp>
+      <p:sp>
+        <p:nvSpPr>
+          <p:cNvPr id="10" name="Right Triangle 9">
+            <a:extLst>
+              <a:ext uri="{FF2B5EF4-FFF2-40B4-BE49-F238E27FC236}">
+                <a16:creationId xmlns:a16="http://schemas.microsoft.com/office/drawing/2014/main" id="{827DC2C4-B485-428A-BF4A-472D2967F47F}"/>
+              </a:ext>
+              <a:ext uri="{C183D7F6-B498-43B3-948B-1728B52AA6E4}">
+                <adec:decorative xmlns:adec="http://schemas.microsoft.com/office/drawing/2017/decorative" val="1"/>
+              </a:ext>
+            </a:extLst>
+          </p:cNvPr>
+          <p:cNvSpPr>
+            <a:spLocks noGrp="1" noRot="1" noChangeAspect="1" noMove="1" noResize="1" noEditPoints="1" noAdjustHandles="1" noChangeArrowheads="1" noChangeShapeType="1" noTextEdit="1"/>
+          </p:cNvSpPr>
+          <p:nvPr>
+            <p:extLst>
+              <p:ext uri="{386F3935-93C4-4BCD-93E2-E3B085C9AB24}">
+                <p16:designElem xmlns:p16="http://schemas.microsoft.com/office/powerpoint/2015/main" val="1"/>
+              </p:ext>
+            </p:extLst>
+          </p:nvPr>
+        </p:nvSpPr>
+        <p:spPr>
+          <a:xfrm flipH="1">
+            <a:off x="8576720" y="3335867"/>
+            <a:ext cx="3291840" cy="3200400"/>
+          </a:xfrm>
+          <a:prstGeom prst="rtTriangle">
+            <a:avLst/>
+          </a:prstGeom>
+          <a:solidFill>
+            <a:schemeClr val="accent4"/>
+          </a:solidFill>
+          <a:ln>
+            <a:noFill/>
+          </a:ln>
+        </p:spPr>
+        <p:style>
+          <a:lnRef idx="2">
+            <a:schemeClr val="accent1">
+              <a:shade val="50000"/>
+            </a:schemeClr>
+          </a:lnRef>
+          <a:fillRef idx="1">
+            <a:schemeClr val="accent1"/>
+          </a:fillRef>
+          <a:effectRef idx="0">
+            <a:schemeClr val="accent1"/>
+          </a:effectRef>
+          <a:fontRef idx="minor">
+            <a:schemeClr val="lt1"/>
+          </a:fontRef>
+        </p:style>
+        <p:txBody>
+          <a:bodyPr rtlCol="0" anchor="ctr"/>
+          <a:lstStyle/>
+          <a:p>
+            <a:pPr algn="ctr"/>
+            <a:endParaRPr lang="en-US" dirty="0"/>
+          </a:p>
+        </p:txBody>
+      </p:sp>
+      <p:sp>
+        <p:nvSpPr>
+          <p:cNvPr id="12" name="Rectangle 11">
+            <a:extLst>
+              <a:ext uri="{FF2B5EF4-FFF2-40B4-BE49-F238E27FC236}">
+                <a16:creationId xmlns:a16="http://schemas.microsoft.com/office/drawing/2014/main" id="{EE04B5EB-F158-4507-90DD-BD23620C7CC9}"/>
+              </a:ext>
+              <a:ext uri="{C183D7F6-B498-43B3-948B-1728B52AA6E4}">
+                <adec:decorative xmlns:adec="http://schemas.microsoft.com/office/drawing/2017/decorative" val="1"/>
+              </a:ext>
+            </a:extLst>
+          </p:cNvPr>
+          <p:cNvSpPr>
+            <a:spLocks noGrp="1" noRot="1" noChangeAspect="1" noMove="1" noResize="1" noEditPoints="1" noAdjustHandles="1" noChangeArrowheads="1" noChangeShapeType="1" noTextEdit="1"/>
+          </p:cNvSpPr>
+          <p:nvPr>
+            <p:extLst>
+              <p:ext uri="{386F3935-93C4-4BCD-93E2-E3B085C9AB24}">
+                <p16:designElem xmlns:p16="http://schemas.microsoft.com/office/powerpoint/2015/main" val="1"/>
+              </p:ext>
+            </p:extLst>
+          </p:nvPr>
+        </p:nvSpPr>
+        <p:spPr>
+          <a:xfrm>
+            <a:off x="641774" y="623275"/>
+            <a:ext cx="10905053" cy="5607882"/>
+          </a:xfrm>
+          <a:prstGeom prst="rect">
+            <a:avLst/>
+          </a:prstGeom>
+          <a:noFill/>
+          <a:ln w="19050">
+            <a:solidFill>
+              <a:schemeClr val="tx1">
+                <a:lumMod val="75000"/>
+                <a:lumOff val="25000"/>
+              </a:schemeClr>
+            </a:solidFill>
+          </a:ln>
+        </p:spPr>
+        <p:style>
+          <a:lnRef idx="2">
+            <a:schemeClr val="accent1">
+              <a:shade val="50000"/>
+            </a:schemeClr>
+          </a:lnRef>
+          <a:fillRef idx="1">
+            <a:schemeClr val="accent1"/>
+          </a:fillRef>
+          <a:effectRef idx="0">
+            <a:schemeClr val="accent1"/>
+          </a:effectRef>
+          <a:fontRef idx="minor">
+            <a:schemeClr val="lt1"/>
+          </a:fontRef>
+        </p:style>
+        <p:txBody>
+          <a:bodyPr rtlCol="0" anchor="ctr"/>
+          <a:lstStyle/>
+          <a:p>
+            <a:pPr algn="ctr"/>
+            <a:endParaRPr lang="en-US"/>
+          </a:p>
+        </p:txBody>
+      </p:sp>
+      <p:sp>
+        <p:nvSpPr>
+          <p:cNvPr id="2" name="Nadpis 1">
+            <a:extLst>
+              <a:ext uri="{FF2B5EF4-FFF2-40B4-BE49-F238E27FC236}">
+                <a16:creationId xmlns:a16="http://schemas.microsoft.com/office/drawing/2014/main" id="{2C710C3B-510C-73C2-293A-5D4CC3B49A9C}"/>
+              </a:ext>
+            </a:extLst>
+          </p:cNvPr>
+          <p:cNvSpPr>
+            <a:spLocks noGrp="1"/>
+          </p:cNvSpPr>
+          <p:nvPr>
+            <p:ph type="title"/>
+          </p:nvPr>
+        </p:nvSpPr>
+        <p:spPr>
+          <a:xfrm>
+            <a:off x="1285241" y="1008993"/>
+            <a:ext cx="9231410" cy="3542045"/>
+          </a:xfrm>
+        </p:spPr>
+        <p:txBody>
+          <a:bodyPr vert="horz" lIns="91440" tIns="45720" rIns="91440" bIns="45720" rtlCol="0" anchor="b">
+            <a:normAutofit/>
+          </a:bodyPr>
+          <a:lstStyle/>
+          <a:p>
+            <a:r>
+              <a:rPr lang="en-US" sz="11500" kern="1200" dirty="0" err="1">
+                <a:solidFill>
+                  <a:schemeClr val="tx1"/>
+                </a:solidFill>
+                <a:latin typeface="+mj-lt"/>
+                <a:ea typeface="+mj-ea"/>
+                <a:cs typeface="+mj-cs"/>
+              </a:rPr>
+              <a:t>Prostor</a:t>
+            </a:r>
+            <a:r>
+              <a:rPr lang="en-US" sz="11500" kern="1200" dirty="0">
+                <a:solidFill>
+                  <a:schemeClr val="tx1"/>
+                </a:solidFill>
+                <a:latin typeface="+mj-lt"/>
+                <a:ea typeface="+mj-ea"/>
+                <a:cs typeface="+mj-cs"/>
+              </a:rPr>
+              <a:t> </a:t>
+            </a:r>
+            <a:r>
+              <a:rPr lang="en-US" sz="11500" kern="1200" dirty="0" err="1">
+                <a:solidFill>
+                  <a:schemeClr val="tx1"/>
+                </a:solidFill>
+                <a:latin typeface="+mj-lt"/>
+                <a:ea typeface="+mj-ea"/>
+                <a:cs typeface="+mj-cs"/>
+              </a:rPr>
+              <a:t>na</a:t>
+            </a:r>
+            <a:r>
+              <a:rPr lang="en-US" sz="11500" kern="1200" dirty="0">
+                <a:solidFill>
+                  <a:schemeClr val="tx1"/>
+                </a:solidFill>
+                <a:latin typeface="+mj-lt"/>
+                <a:ea typeface="+mj-ea"/>
+                <a:cs typeface="+mj-cs"/>
+              </a:rPr>
+              <a:t> </a:t>
+            </a:r>
+            <a:r>
+              <a:rPr lang="en-US" sz="11500" kern="1200" dirty="0" err="1">
+                <a:solidFill>
+                  <a:schemeClr val="tx1"/>
+                </a:solidFill>
+                <a:latin typeface="+mj-lt"/>
+                <a:ea typeface="+mj-ea"/>
+                <a:cs typeface="+mj-cs"/>
+              </a:rPr>
+              <a:t>otázky</a:t>
+            </a:r>
+            <a:endParaRPr lang="en-US" sz="11500" kern="1200" dirty="0">
+              <a:solidFill>
+                <a:schemeClr val="tx1"/>
+              </a:solidFill>
+              <a:latin typeface="+mj-lt"/>
+              <a:ea typeface="+mj-ea"/>
+              <a:cs typeface="+mj-cs"/>
+            </a:endParaRPr>
+          </a:p>
+        </p:txBody>
+      </p:sp>
+    </p:spTree>
+    <p:extLst>
+      <p:ext uri="{BB962C8B-B14F-4D97-AF65-F5344CB8AC3E}">
+        <p14:creationId xmlns:p14="http://schemas.microsoft.com/office/powerpoint/2010/main" val="1054097738"/>
+      </p:ext>
+    </p:extLst>
+  </p:cSld>
+  <p:clrMapOvr>
+    <a:masterClrMapping/>
+  </p:clrMapOvr>
+</p:sld>
+</file>
+
+<file path=ppt/slides/slide7.xml><?xml version="1.0" encoding="utf-8"?>
+<p:sld xmlns:a="http://schemas.openxmlformats.org/drawingml/2006/main" xmlns:r="http://schemas.openxmlformats.org/officeDocument/2006/relationships" xmlns:p="http://schemas.openxmlformats.org/presentationml/2006/main">
+  <p:cSld>
+    <p:bg>
+      <p:bgPr>
+        <a:solidFill>
+          <a:schemeClr val="bg1"/>
+        </a:solidFill>
+        <a:effectLst/>
+      </p:bgPr>
+    </p:bg>
+    <p:spTree>
+      <p:nvGrpSpPr>
+        <p:cNvPr id="1" name=""/>
+        <p:cNvGrpSpPr/>
+        <p:nvPr/>
+      </p:nvGrpSpPr>
+      <p:grpSpPr>
+        <a:xfrm>
+          <a:off x="0" y="0"/>
+          <a:ext cx="0" cy="0"/>
+          <a:chOff x="0" y="0"/>
+          <a:chExt cx="0" cy="0"/>
+        </a:xfrm>
+      </p:grpSpPr>
+      <p:sp useBgFill="1">
+        <p:nvSpPr>
+          <p:cNvPr id="8" name="Rectangle 7">
+            <a:extLst>
+              <a:ext uri="{FF2B5EF4-FFF2-40B4-BE49-F238E27FC236}">
+                <a16:creationId xmlns:a16="http://schemas.microsoft.com/office/drawing/2014/main" id="{934F1179-B481-4F9E-BCA3-AFB972070F83}"/>
+              </a:ext>
+              <a:ext uri="{C183D7F6-B498-43B3-948B-1728B52AA6E4}">
+                <adec:decorative xmlns:adec="http://schemas.microsoft.com/office/drawing/2017/decorative" val="1"/>
+              </a:ext>
+            </a:extLst>
+          </p:cNvPr>
+          <p:cNvSpPr>
+            <a:spLocks noGrp="1" noRot="1" noChangeAspect="1" noMove="1" noResize="1" noEditPoints="1" noAdjustHandles="1" noChangeArrowheads="1" noChangeShapeType="1" noTextEdit="1"/>
+          </p:cNvSpPr>
+          <p:nvPr>
+            <p:extLst>
+              <p:ext uri="{386F3935-93C4-4BCD-93E2-E3B085C9AB24}">
+                <p16:designElem xmlns:p16="http://schemas.microsoft.com/office/powerpoint/2015/main" val="1"/>
+              </p:ext>
+            </p:extLst>
+          </p:nvPr>
+        </p:nvSpPr>
+        <p:spPr>
+          <a:xfrm>
+            <a:off x="0" y="0"/>
+            <a:ext cx="12192000" cy="6858000"/>
+          </a:xfrm>
+          <a:prstGeom prst="rect">
+            <a:avLst/>
+          </a:prstGeom>
+          <a:ln>
+            <a:noFill/>
+          </a:ln>
+        </p:spPr>
+        <p:style>
+          <a:lnRef idx="2">
+            <a:schemeClr val="accent1">
+              <a:shade val="50000"/>
+            </a:schemeClr>
+          </a:lnRef>
+          <a:fillRef idx="1">
+            <a:schemeClr val="accent1"/>
+          </a:fillRef>
+          <a:effectRef idx="0">
+            <a:schemeClr val="accent1"/>
+          </a:effectRef>
+          <a:fontRef idx="minor">
+            <a:schemeClr val="lt1"/>
+          </a:fontRef>
+        </p:style>
+        <p:txBody>
+          <a:bodyPr rtlCol="0" anchor="ctr"/>
+          <a:lstStyle/>
+          <a:p>
+            <a:pPr algn="ctr"/>
+            <a:endParaRPr lang="en-US"/>
+          </a:p>
+        </p:txBody>
+      </p:sp>
+      <p:sp>
+        <p:nvSpPr>
+          <p:cNvPr id="10" name="Right Triangle 9">
+            <a:extLst>
+              <a:ext uri="{FF2B5EF4-FFF2-40B4-BE49-F238E27FC236}">
+                <a16:creationId xmlns:a16="http://schemas.microsoft.com/office/drawing/2014/main" id="{827DC2C4-B485-428A-BF4A-472D2967F47F}"/>
+              </a:ext>
+              <a:ext uri="{C183D7F6-B498-43B3-948B-1728B52AA6E4}">
+                <adec:decorative xmlns:adec="http://schemas.microsoft.com/office/drawing/2017/decorative" val="1"/>
+              </a:ext>
+            </a:extLst>
+          </p:cNvPr>
+          <p:cNvSpPr>
+            <a:spLocks noGrp="1" noRot="1" noChangeAspect="1" noMove="1" noResize="1" noEditPoints="1" noAdjustHandles="1" noChangeArrowheads="1" noChangeShapeType="1" noTextEdit="1"/>
+          </p:cNvSpPr>
+          <p:nvPr>
+            <p:extLst>
+              <p:ext uri="{386F3935-93C4-4BCD-93E2-E3B085C9AB24}">
+                <p16:designElem xmlns:p16="http://schemas.microsoft.com/office/powerpoint/2015/main" val="1"/>
+              </p:ext>
+            </p:extLst>
+          </p:nvPr>
+        </p:nvSpPr>
+        <p:spPr>
+          <a:xfrm flipH="1">
+            <a:off x="8576720" y="3335867"/>
+            <a:ext cx="3291840" cy="3200400"/>
+          </a:xfrm>
+          <a:prstGeom prst="rtTriangle">
+            <a:avLst/>
+          </a:prstGeom>
+          <a:solidFill>
+            <a:schemeClr val="accent4"/>
+          </a:solidFill>
+          <a:ln>
+            <a:noFill/>
+          </a:ln>
+        </p:spPr>
+        <p:style>
+          <a:lnRef idx="2">
+            <a:schemeClr val="accent1">
+              <a:shade val="50000"/>
+            </a:schemeClr>
+          </a:lnRef>
+          <a:fillRef idx="1">
+            <a:schemeClr val="accent1"/>
+          </a:fillRef>
+          <a:effectRef idx="0">
+            <a:schemeClr val="accent1"/>
+          </a:effectRef>
+          <a:fontRef idx="minor">
+            <a:schemeClr val="lt1"/>
+          </a:fontRef>
+        </p:style>
+        <p:txBody>
+          <a:bodyPr rtlCol="0" anchor="ctr"/>
+          <a:lstStyle/>
+          <a:p>
+            <a:pPr algn="ctr"/>
+            <a:endParaRPr lang="en-US" dirty="0"/>
+          </a:p>
+        </p:txBody>
+      </p:sp>
+      <p:sp>
+        <p:nvSpPr>
+          <p:cNvPr id="12" name="Rectangle 11">
+            <a:extLst>
+              <a:ext uri="{FF2B5EF4-FFF2-40B4-BE49-F238E27FC236}">
+                <a16:creationId xmlns:a16="http://schemas.microsoft.com/office/drawing/2014/main" id="{EE04B5EB-F158-4507-90DD-BD23620C7CC9}"/>
+              </a:ext>
+              <a:ext uri="{C183D7F6-B498-43B3-948B-1728B52AA6E4}">
+                <adec:decorative xmlns:adec="http://schemas.microsoft.com/office/drawing/2017/decorative" val="1"/>
+              </a:ext>
+            </a:extLst>
+          </p:cNvPr>
+          <p:cNvSpPr>
+            <a:spLocks noGrp="1" noRot="1" noChangeAspect="1" noMove="1" noResize="1" noEditPoints="1" noAdjustHandles="1" noChangeArrowheads="1" noChangeShapeType="1" noTextEdit="1"/>
+          </p:cNvSpPr>
+          <p:nvPr>
+            <p:extLst>
+              <p:ext uri="{386F3935-93C4-4BCD-93E2-E3B085C9AB24}">
+                <p16:designElem xmlns:p16="http://schemas.microsoft.com/office/powerpoint/2015/main" val="1"/>
+              </p:ext>
+            </p:extLst>
+          </p:nvPr>
+        </p:nvSpPr>
+        <p:spPr>
+          <a:xfrm>
+            <a:off x="641774" y="623275"/>
+            <a:ext cx="10905053" cy="5607882"/>
+          </a:xfrm>
+          <a:prstGeom prst="rect">
+            <a:avLst/>
+          </a:prstGeom>
+          <a:noFill/>
+          <a:ln w="19050">
+            <a:solidFill>
+              <a:schemeClr val="tx1">
+                <a:lumMod val="75000"/>
+                <a:lumOff val="25000"/>
+              </a:schemeClr>
+            </a:solidFill>
+          </a:ln>
+        </p:spPr>
+        <p:style>
+          <a:lnRef idx="2">
+            <a:schemeClr val="accent1">
+              <a:shade val="50000"/>
+            </a:schemeClr>
+          </a:lnRef>
+          <a:fillRef idx="1">
+            <a:schemeClr val="accent1"/>
+          </a:fillRef>
+          <a:effectRef idx="0">
+            <a:schemeClr val="accent1"/>
+          </a:effectRef>
+          <a:fontRef idx="minor">
+            <a:schemeClr val="lt1"/>
+          </a:fontRef>
+        </p:style>
+        <p:txBody>
+          <a:bodyPr rtlCol="0" anchor="ctr"/>
+          <a:lstStyle/>
+          <a:p>
+            <a:pPr algn="ctr"/>
+            <a:endParaRPr lang="en-US"/>
+          </a:p>
+        </p:txBody>
+      </p:sp>
+      <p:sp>
+        <p:nvSpPr>
+          <p:cNvPr id="2" name="Nadpis 1">
+            <a:extLst>
+              <a:ext uri="{FF2B5EF4-FFF2-40B4-BE49-F238E27FC236}">
+                <a16:creationId xmlns:a16="http://schemas.microsoft.com/office/drawing/2014/main" id="{73AF77F7-C0E8-9318-1EFC-7182FC9A7DB9}"/>
+              </a:ext>
+            </a:extLst>
+          </p:cNvPr>
+          <p:cNvSpPr>
+            <a:spLocks noGrp="1"/>
+          </p:cNvSpPr>
+          <p:nvPr>
+            <p:ph type="title"/>
+          </p:nvPr>
+        </p:nvSpPr>
+        <p:spPr>
+          <a:xfrm>
+            <a:off x="1285241" y="1008993"/>
+            <a:ext cx="9231410" cy="3542045"/>
+          </a:xfrm>
+        </p:spPr>
+        <p:txBody>
+          <a:bodyPr vert="horz" lIns="91440" tIns="45720" rIns="91440" bIns="45720" rtlCol="0" anchor="b">
+            <a:normAutofit/>
+          </a:bodyPr>
+          <a:lstStyle/>
+          <a:p>
+            <a:r>
+              <a:rPr lang="en-US" sz="11500" kern="1200" dirty="0" err="1">
+                <a:solidFill>
+                  <a:schemeClr val="tx1"/>
+                </a:solidFill>
+                <a:latin typeface="+mj-lt"/>
+                <a:ea typeface="+mj-ea"/>
+                <a:cs typeface="+mj-cs"/>
+              </a:rPr>
+              <a:t>Děkuji</a:t>
+            </a:r>
+            <a:r>
+              <a:rPr lang="en-US" sz="11500" kern="1200" dirty="0">
+                <a:solidFill>
+                  <a:schemeClr val="tx1"/>
+                </a:solidFill>
+                <a:latin typeface="+mj-lt"/>
+                <a:ea typeface="+mj-ea"/>
+                <a:cs typeface="+mj-cs"/>
+              </a:rPr>
+              <a:t> </a:t>
+            </a:r>
+            <a:r>
+              <a:rPr lang="en-US" sz="11500" kern="1200" dirty="0" err="1">
+                <a:solidFill>
+                  <a:schemeClr val="tx1"/>
+                </a:solidFill>
+                <a:latin typeface="+mj-lt"/>
+                <a:ea typeface="+mj-ea"/>
+                <a:cs typeface="+mj-cs"/>
+              </a:rPr>
+              <a:t>moc</a:t>
+            </a:r>
+            <a:r>
+              <a:rPr lang="en-US" sz="11500" kern="1200" dirty="0">
+                <a:solidFill>
+                  <a:schemeClr val="tx1"/>
+                </a:solidFill>
+                <a:latin typeface="+mj-lt"/>
+                <a:ea typeface="+mj-ea"/>
+                <a:cs typeface="+mj-cs"/>
+              </a:rPr>
+              <a:t> za </a:t>
+            </a:r>
+            <a:r>
+              <a:rPr lang="en-US" sz="11500" kern="1200" dirty="0" err="1">
+                <a:solidFill>
+                  <a:schemeClr val="tx1"/>
+                </a:solidFill>
+                <a:latin typeface="+mj-lt"/>
+                <a:ea typeface="+mj-ea"/>
+                <a:cs typeface="+mj-cs"/>
+              </a:rPr>
+              <a:t>vaš</a:t>
+            </a:r>
+            <a:r>
+              <a:rPr lang="cs-CZ" sz="11500" kern="1200">
+                <a:solidFill>
+                  <a:schemeClr val="tx1"/>
+                </a:solidFill>
+                <a:latin typeface="+mj-lt"/>
+                <a:ea typeface="+mj-ea"/>
+                <a:cs typeface="+mj-cs"/>
+              </a:rPr>
+              <a:t>i</a:t>
+            </a:r>
+            <a:r>
+              <a:rPr lang="en-US" sz="11500" kern="1200">
+                <a:solidFill>
+                  <a:schemeClr val="tx1"/>
+                </a:solidFill>
+                <a:latin typeface="+mj-lt"/>
+                <a:ea typeface="+mj-ea"/>
+                <a:cs typeface="+mj-cs"/>
+              </a:rPr>
+              <a:t> </a:t>
+            </a:r>
+            <a:r>
+              <a:rPr lang="en-US" sz="11500" kern="1200" dirty="0" err="1">
+                <a:solidFill>
+                  <a:schemeClr val="tx1"/>
+                </a:solidFill>
+                <a:latin typeface="+mj-lt"/>
+                <a:ea typeface="+mj-ea"/>
+                <a:cs typeface="+mj-cs"/>
+              </a:rPr>
+              <a:t>pozornost</a:t>
+            </a:r>
+            <a:endParaRPr lang="en-US" sz="11500" kern="1200" dirty="0">
+              <a:solidFill>
+                <a:schemeClr val="tx1"/>
+              </a:solidFill>
+              <a:latin typeface="+mj-lt"/>
+              <a:ea typeface="+mj-ea"/>
+              <a:cs typeface="+mj-cs"/>
+            </a:endParaRPr>
+          </a:p>
+        </p:txBody>
+      </p:sp>
+    </p:spTree>
+    <p:extLst>
+      <p:ext uri="{BB962C8B-B14F-4D97-AF65-F5344CB8AC3E}">
+        <p14:creationId xmlns:p14="http://schemas.microsoft.com/office/powerpoint/2010/main" val="1794572854"/>
       </p:ext>
     </p:extLst>
   </p:cSld>

</xml_diff>